<commit_message>
Add more information about threads.
</commit_message>
<xml_diff>
--- a/Lectures/Threads/Threads.pptx
+++ b/Lectures/Threads/Threads.pptx
@@ -5,7 +5,7 @@
     <p:sldMasterId id="2147483660" r:id="rId1"/>
   </p:sldMasterIdLst>
   <p:notesMasterIdLst>
-    <p:notesMasterId r:id="rId10"/>
+    <p:notesMasterId r:id="rId13"/>
   </p:notesMasterIdLst>
   <p:sldIdLst>
     <p:sldId id="256" r:id="rId2"/>
@@ -16,6 +16,9 @@
     <p:sldId id="261" r:id="rId7"/>
     <p:sldId id="262" r:id="rId8"/>
     <p:sldId id="263" r:id="rId9"/>
+    <p:sldId id="264" r:id="rId10"/>
+    <p:sldId id="265" r:id="rId11"/>
+    <p:sldId id="266" r:id="rId12"/>
   </p:sldIdLst>
   <p:sldSz cx="9144000" cy="6858000" type="screen4x3"/>
   <p:notesSz cx="6858000" cy="9144000"/>
@@ -199,7 +202,7 @@
           <a:p>
             <a:fld id="{DBE0ECA1-3FBF-48AE-AD2A-4439AE745E19}" type="datetimeFigureOut">
               <a:rPr lang="en-US" smtClean="0"/>
-              <a:t>10/29/2013</a:t>
+              <a:t>10/30/2013</a:t>
             </a:fld>
             <a:endParaRPr lang="en-US"/>
           </a:p>
@@ -660,7 +663,7 @@
           <a:p>
             <a:fld id="{9769DED8-28D4-45B9-A00F-7CFE9335FEA6}" type="datetime1">
               <a:rPr lang="en-US" smtClean="0"/>
-              <a:t>10/29/2013</a:t>
+              <a:t>10/30/2013</a:t>
             </a:fld>
             <a:endParaRPr lang="en-US"/>
           </a:p>
@@ -925,7 +928,7 @@
           <a:p>
             <a:fld id="{2DB3D439-1F88-44B4-B5F7-F9BCD4064257}" type="datetime1">
               <a:rPr lang="en-US" smtClean="0"/>
-              <a:t>10/29/2013</a:t>
+              <a:t>10/30/2013</a:t>
             </a:fld>
             <a:endParaRPr lang="en-US"/>
           </a:p>
@@ -1100,7 +1103,7 @@
           <a:p>
             <a:fld id="{99C5638F-6F55-4055-935C-67841BE78C36}" type="datetime1">
               <a:rPr lang="en-US" smtClean="0"/>
-              <a:t>10/29/2013</a:t>
+              <a:t>10/30/2013</a:t>
             </a:fld>
             <a:endParaRPr lang="en-US"/>
           </a:p>
@@ -1265,7 +1268,7 @@
           <a:p>
             <a:fld id="{E6987D90-0C92-4B22-A29D-FED15412CED2}" type="datetime1">
               <a:rPr lang="en-US" smtClean="0"/>
-              <a:t>10/29/2013</a:t>
+              <a:t>10/30/2013</a:t>
             </a:fld>
             <a:endParaRPr lang="en-US"/>
           </a:p>
@@ -1514,7 +1517,7 @@
           <a:p>
             <a:fld id="{DDB67BC4-9554-49E0-BCB3-D1EF965BA0B8}" type="datetime1">
               <a:rPr lang="en-US" smtClean="0"/>
-              <a:t>10/29/2013</a:t>
+              <a:t>10/30/2013</a:t>
             </a:fld>
             <a:endParaRPr lang="en-US"/>
           </a:p>
@@ -1797,7 +1800,7 @@
           <a:p>
             <a:fld id="{EC24D770-803D-4E01-921C-9C100DD8230C}" type="datetime1">
               <a:rPr lang="en-US" smtClean="0"/>
-              <a:t>10/29/2013</a:t>
+              <a:t>10/30/2013</a:t>
             </a:fld>
             <a:endParaRPr lang="en-US"/>
           </a:p>
@@ -2236,7 +2239,7 @@
           <a:p>
             <a:fld id="{356AD44B-78A4-4209-8070-7DCBE2DC4992}" type="datetime1">
               <a:rPr lang="en-US" smtClean="0"/>
-              <a:t>10/29/2013</a:t>
+              <a:t>10/30/2013</a:t>
             </a:fld>
             <a:endParaRPr lang="en-US"/>
           </a:p>
@@ -2349,7 +2352,7 @@
           <a:p>
             <a:fld id="{A993C59A-7CA2-467F-B7F1-9096881A01B8}" type="datetime1">
               <a:rPr lang="en-US" smtClean="0"/>
-              <a:t>10/29/2013</a:t>
+              <a:t>10/30/2013</a:t>
             </a:fld>
             <a:endParaRPr lang="en-US"/>
           </a:p>
@@ -2439,7 +2442,7 @@
           <a:p>
             <a:fld id="{2B6B58D0-2488-434A-8ED1-692E09B85CC5}" type="datetime1">
               <a:rPr lang="en-US" smtClean="0"/>
-              <a:t>10/29/2013</a:t>
+              <a:t>10/30/2013</a:t>
             </a:fld>
             <a:endParaRPr lang="en-US"/>
           </a:p>
@@ -2681,7 +2684,7 @@
           <a:p>
             <a:fld id="{FDB0AFC2-7D64-4F61-A7B7-9932D3305DDA}" type="datetime1">
               <a:rPr lang="en-US" smtClean="0"/>
-              <a:t>10/29/2013</a:t>
+              <a:t>10/30/2013</a:t>
             </a:fld>
             <a:endParaRPr lang="en-US"/>
           </a:p>
@@ -2975,7 +2978,7 @@
           <a:p>
             <a:fld id="{4983D17A-D7B2-4ECE-8A2C-93679B9D177B}" type="datetime1">
               <a:rPr lang="en-US" smtClean="0"/>
-              <a:t>10/29/2013</a:t>
+              <a:t>10/30/2013</a:t>
             </a:fld>
             <a:endParaRPr lang="en-US"/>
           </a:p>
@@ -3269,7 +3272,7 @@
           <a:p>
             <a:fld id="{2A5275F7-419E-4C23-8A3D-2EE5742B2EC9}" type="datetime1">
               <a:rPr lang="en-US" smtClean="0"/>
-              <a:t>10/29/2013</a:t>
+              <a:t>10/30/2013</a:t>
             </a:fld>
             <a:endParaRPr lang="en-US"/>
           </a:p>
@@ -3847,6 +3850,341 @@
 </p:sld>
 </file>
 
+<file path=ppt/slides/slide10.xml><?xml version="1.0" encoding="utf-8"?>
+<p:sld xmlns:a="http://schemas.openxmlformats.org/drawingml/2006/main" xmlns:r="http://schemas.openxmlformats.org/officeDocument/2006/relationships" xmlns:p="http://schemas.openxmlformats.org/presentationml/2006/main">
+  <p:cSld>
+    <p:spTree>
+      <p:nvGrpSpPr>
+        <p:cNvPr id="1" name=""/>
+        <p:cNvGrpSpPr/>
+        <p:nvPr/>
+      </p:nvGrpSpPr>
+      <p:grpSpPr>
+        <a:xfrm>
+          <a:off x="0" y="0"/>
+          <a:ext cx="0" cy="0"/>
+          <a:chOff x="0" y="0"/>
+          <a:chExt cx="0" cy="0"/>
+        </a:xfrm>
+      </p:grpSpPr>
+      <p:sp>
+        <p:nvSpPr>
+          <p:cNvPr id="2" name="Title 1"/>
+          <p:cNvSpPr>
+            <a:spLocks noGrp="1"/>
+          </p:cNvSpPr>
+          <p:nvPr>
+            <p:ph type="title"/>
+          </p:nvPr>
+        </p:nvSpPr>
+        <p:spPr/>
+        <p:txBody>
+          <a:bodyPr/>
+          <a:lstStyle/>
+          <a:p>
+            <a:r>
+              <a:rPr lang="en-US" dirty="0" smtClean="0"/>
+              <a:t>Thread details</a:t>
+            </a:r>
+            <a:endParaRPr lang="en-US" dirty="0"/>
+          </a:p>
+        </p:txBody>
+      </p:sp>
+      <p:sp>
+        <p:nvSpPr>
+          <p:cNvPr id="3" name="Content Placeholder 2"/>
+          <p:cNvSpPr>
+            <a:spLocks noGrp="1"/>
+          </p:cNvSpPr>
+          <p:nvPr>
+            <p:ph idx="1"/>
+          </p:nvPr>
+        </p:nvSpPr>
+        <p:spPr/>
+        <p:txBody>
+          <a:bodyPr/>
+          <a:lstStyle/>
+          <a:p>
+            <a:r>
+              <a:rPr lang="en-US" dirty="0" smtClean="0"/>
+              <a:t>To use </a:t>
+            </a:r>
+            <a:r>
+              <a:rPr lang="en-US" dirty="0" err="1" smtClean="0">
+                <a:latin typeface="Courier New" panose="02070309020205020404" pitchFamily="49" charset="0"/>
+                <a:cs typeface="Courier New" panose="02070309020205020404" pitchFamily="49" charset="0"/>
+              </a:rPr>
+              <a:t>std</a:t>
+            </a:r>
+            <a:r>
+              <a:rPr lang="en-US" dirty="0" smtClean="0">
+                <a:latin typeface="Courier New" panose="02070309020205020404" pitchFamily="49" charset="0"/>
+                <a:cs typeface="Courier New" panose="02070309020205020404" pitchFamily="49" charset="0"/>
+              </a:rPr>
+              <a:t>::thread</a:t>
+            </a:r>
+            <a:r>
+              <a:rPr lang="en-US" dirty="0" smtClean="0"/>
+              <a:t>, we need to consider a few details</a:t>
+            </a:r>
+          </a:p>
+          <a:p>
+            <a:pPr marL="800100" lvl="1" indent="-342900"/>
+            <a:r>
+              <a:rPr lang="en-US" dirty="0" smtClean="0"/>
+              <a:t>How to start a thread</a:t>
+            </a:r>
+          </a:p>
+          <a:p>
+            <a:pPr marL="800100" lvl="1" indent="-342900"/>
+            <a:r>
+              <a:rPr lang="en-US" dirty="0"/>
+              <a:t>How to pass arguments to a </a:t>
+            </a:r>
+            <a:r>
+              <a:rPr lang="en-US" dirty="0" smtClean="0"/>
+              <a:t>thread</a:t>
+            </a:r>
+          </a:p>
+          <a:p>
+            <a:pPr marL="800100" lvl="1" indent="-342900"/>
+            <a:r>
+              <a:rPr lang="en-US" dirty="0" smtClean="0"/>
+              <a:t>How to stop a thread</a:t>
+            </a:r>
+          </a:p>
+          <a:p>
+            <a:pPr marL="800100" lvl="1" indent="-342900"/>
+            <a:r>
+              <a:rPr lang="en-US" dirty="0" smtClean="0"/>
+              <a:t>How to identify a thread</a:t>
+            </a:r>
+          </a:p>
+          <a:p>
+            <a:pPr marL="800100" lvl="1" indent="-342900"/>
+            <a:r>
+              <a:rPr lang="en-US" dirty="0" smtClean="0"/>
+              <a:t>How to transfer ownership of a thread</a:t>
+            </a:r>
+            <a:endParaRPr lang="en-US" dirty="0"/>
+          </a:p>
+        </p:txBody>
+      </p:sp>
+      <p:sp>
+        <p:nvSpPr>
+          <p:cNvPr id="4" name="Slide Number Placeholder 3"/>
+          <p:cNvSpPr>
+            <a:spLocks noGrp="1"/>
+          </p:cNvSpPr>
+          <p:nvPr>
+            <p:ph type="sldNum" sz="quarter" idx="12"/>
+          </p:nvPr>
+        </p:nvSpPr>
+        <p:spPr/>
+        <p:txBody>
+          <a:bodyPr/>
+          <a:lstStyle/>
+          <a:p>
+            <a:fld id="{6DA12B36-9664-4CB0-8B2E-F4A2F44AE97E}" type="slidenum">
+              <a:rPr lang="en-US" smtClean="0"/>
+              <a:t>10</a:t>
+            </a:fld>
+            <a:endParaRPr lang="en-US"/>
+          </a:p>
+        </p:txBody>
+      </p:sp>
+    </p:spTree>
+    <p:extLst>
+      <p:ext uri="{BB962C8B-B14F-4D97-AF65-F5344CB8AC3E}">
+        <p14:creationId xmlns:p14="http://schemas.microsoft.com/office/powerpoint/2010/main" val="2076375163"/>
+      </p:ext>
+    </p:extLst>
+  </p:cSld>
+  <p:clrMapOvr>
+    <a:masterClrMapping/>
+  </p:clrMapOvr>
+</p:sld>
+</file>
+
+<file path=ppt/slides/slide11.xml><?xml version="1.0" encoding="utf-8"?>
+<p:sld xmlns:a="http://schemas.openxmlformats.org/drawingml/2006/main" xmlns:r="http://schemas.openxmlformats.org/officeDocument/2006/relationships" xmlns:p="http://schemas.openxmlformats.org/presentationml/2006/main">
+  <p:cSld>
+    <p:spTree>
+      <p:nvGrpSpPr>
+        <p:cNvPr id="1" name=""/>
+        <p:cNvGrpSpPr/>
+        <p:nvPr/>
+      </p:nvGrpSpPr>
+      <p:grpSpPr>
+        <a:xfrm>
+          <a:off x="0" y="0"/>
+          <a:ext cx="0" cy="0"/>
+          <a:chOff x="0" y="0"/>
+          <a:chExt cx="0" cy="0"/>
+        </a:xfrm>
+      </p:grpSpPr>
+      <p:sp>
+        <p:nvSpPr>
+          <p:cNvPr id="2" name="Title 1"/>
+          <p:cNvSpPr>
+            <a:spLocks noGrp="1"/>
+          </p:cNvSpPr>
+          <p:nvPr>
+            <p:ph type="title"/>
+          </p:nvPr>
+        </p:nvSpPr>
+        <p:spPr/>
+        <p:txBody>
+          <a:bodyPr/>
+          <a:lstStyle/>
+          <a:p>
+            <a:r>
+              <a:rPr lang="en-US" dirty="0" smtClean="0"/>
+              <a:t>How to start a thread</a:t>
+            </a:r>
+            <a:endParaRPr lang="en-US" dirty="0"/>
+          </a:p>
+        </p:txBody>
+      </p:sp>
+      <p:sp>
+        <p:nvSpPr>
+          <p:cNvPr id="3" name="Content Placeholder 2"/>
+          <p:cNvSpPr>
+            <a:spLocks noGrp="1"/>
+          </p:cNvSpPr>
+          <p:nvPr>
+            <p:ph idx="1"/>
+          </p:nvPr>
+        </p:nvSpPr>
+        <p:spPr/>
+        <p:txBody>
+          <a:bodyPr/>
+          <a:lstStyle/>
+          <a:p>
+            <a:r>
+              <a:rPr lang="en-US" dirty="0" smtClean="0"/>
+              <a:t>A thread creates a new path of execution</a:t>
+            </a:r>
+          </a:p>
+          <a:p>
+            <a:pPr marL="800100" lvl="1" indent="-342900"/>
+            <a:r>
+              <a:rPr lang="en-US" dirty="0" smtClean="0"/>
+              <a:t>Each thread has its own stack</a:t>
+            </a:r>
+          </a:p>
+          <a:p>
+            <a:pPr marL="800100" lvl="1" indent="-342900"/>
+            <a:r>
+              <a:rPr lang="en-US" dirty="0" smtClean="0"/>
+              <a:t>The thread exits when the “executing thing” returns</a:t>
+            </a:r>
+          </a:p>
+          <a:p>
+            <a:pPr marL="342900" indent="-342900"/>
+            <a:r>
+              <a:rPr lang="en-US" dirty="0" smtClean="0"/>
+              <a:t>A thread can execute any </a:t>
+            </a:r>
+            <a:r>
+              <a:rPr lang="en-US" i="1" dirty="0" smtClean="0"/>
+              <a:t>callable type</a:t>
+            </a:r>
+          </a:p>
+          <a:p>
+            <a:pPr marL="800100" lvl="1" indent="-342900"/>
+            <a:r>
+              <a:rPr lang="en-US" dirty="0" smtClean="0"/>
+              <a:t>Free function</a:t>
+            </a:r>
+          </a:p>
+          <a:p>
+            <a:pPr marL="800100" lvl="1" indent="-342900"/>
+            <a:r>
+              <a:rPr lang="en-US" dirty="0" err="1" smtClean="0"/>
+              <a:t>Functor</a:t>
+            </a:r>
+            <a:r>
+              <a:rPr lang="en-US" dirty="0" smtClean="0"/>
+              <a:t> (function object)</a:t>
+            </a:r>
+          </a:p>
+          <a:p>
+            <a:pPr marL="800100" lvl="1" indent="-342900"/>
+            <a:r>
+              <a:rPr lang="en-US" dirty="0" smtClean="0"/>
+              <a:t>Member function</a:t>
+            </a:r>
+          </a:p>
+          <a:p>
+            <a:pPr marL="800100" lvl="1" indent="-342900"/>
+            <a:r>
+              <a:rPr lang="en-US" dirty="0" smtClean="0"/>
+              <a:t>Lambda expression</a:t>
+            </a:r>
+            <a:endParaRPr lang="en-US" dirty="0"/>
+          </a:p>
+        </p:txBody>
+      </p:sp>
+      <p:sp>
+        <p:nvSpPr>
+          <p:cNvPr id="4" name="Slide Number Placeholder 3"/>
+          <p:cNvSpPr>
+            <a:spLocks noGrp="1"/>
+          </p:cNvSpPr>
+          <p:nvPr>
+            <p:ph type="sldNum" sz="quarter" idx="12"/>
+          </p:nvPr>
+        </p:nvSpPr>
+        <p:spPr/>
+        <p:txBody>
+          <a:bodyPr/>
+          <a:lstStyle/>
+          <a:p>
+            <a:fld id="{6DA12B36-9664-4CB0-8B2E-F4A2F44AE97E}" type="slidenum">
+              <a:rPr lang="en-US" smtClean="0"/>
+              <a:t>11</a:t>
+            </a:fld>
+            <a:endParaRPr lang="en-US"/>
+          </a:p>
+        </p:txBody>
+      </p:sp>
+      <p:sp>
+        <p:nvSpPr>
+          <p:cNvPr id="5" name="Footer Placeholder 4"/>
+          <p:cNvSpPr>
+            <a:spLocks noGrp="1"/>
+          </p:cNvSpPr>
+          <p:nvPr>
+            <p:ph type="ftr" sz="quarter" idx="11"/>
+          </p:nvPr>
+        </p:nvSpPr>
+        <p:spPr/>
+        <p:txBody>
+          <a:bodyPr/>
+          <a:lstStyle/>
+          <a:p>
+            <a:r>
+              <a:rPr lang="en-US" smtClean="0"/>
+              <a:t>Source: Williams, Chapter 2</a:t>
+            </a:r>
+            <a:endParaRPr lang="en-US"/>
+          </a:p>
+        </p:txBody>
+      </p:sp>
+    </p:spTree>
+    <p:extLst>
+      <p:ext uri="{BB962C8B-B14F-4D97-AF65-F5344CB8AC3E}">
+        <p14:creationId xmlns:p14="http://schemas.microsoft.com/office/powerpoint/2010/main" val="2143830193"/>
+      </p:ext>
+    </p:extLst>
+  </p:cSld>
+  <p:clrMapOvr>
+    <a:masterClrMapping/>
+  </p:clrMapOvr>
+</p:sld>
+</file>
+
 <file path=ppt/slides/slide2.xml><?xml version="1.0" encoding="utf-8"?>
 <p:sld xmlns:a="http://schemas.openxmlformats.org/drawingml/2006/main" xmlns:r="http://schemas.openxmlformats.org/officeDocument/2006/relationships" xmlns:p="http://schemas.openxmlformats.org/presentationml/2006/main">
   <p:cSld>
@@ -5355,6 +5693,451 @@
     <p:extLst>
       <p:ext uri="{BB962C8B-B14F-4D97-AF65-F5344CB8AC3E}">
         <p14:creationId xmlns:p14="http://schemas.microsoft.com/office/powerpoint/2010/main" val="3891065453"/>
+      </p:ext>
+    </p:extLst>
+  </p:cSld>
+  <p:clrMapOvr>
+    <a:masterClrMapping/>
+  </p:clrMapOvr>
+</p:sld>
+</file>
+
+<file path=ppt/slides/slide9.xml><?xml version="1.0" encoding="utf-8"?>
+<p:sld xmlns:a="http://schemas.openxmlformats.org/drawingml/2006/main" xmlns:r="http://schemas.openxmlformats.org/officeDocument/2006/relationships" xmlns:p="http://schemas.openxmlformats.org/presentationml/2006/main">
+  <p:cSld>
+    <p:spTree>
+      <p:nvGrpSpPr>
+        <p:cNvPr id="1" name=""/>
+        <p:cNvGrpSpPr/>
+        <p:nvPr/>
+      </p:nvGrpSpPr>
+      <p:grpSpPr>
+        <a:xfrm>
+          <a:off x="0" y="0"/>
+          <a:ext cx="0" cy="0"/>
+          <a:chOff x="0" y="0"/>
+          <a:chExt cx="0" cy="0"/>
+        </a:xfrm>
+      </p:grpSpPr>
+      <p:sp>
+        <p:nvSpPr>
+          <p:cNvPr id="2" name="Title 1"/>
+          <p:cNvSpPr>
+            <a:spLocks noGrp="1"/>
+          </p:cNvSpPr>
+          <p:nvPr>
+            <p:ph type="title"/>
+          </p:nvPr>
+        </p:nvSpPr>
+        <p:spPr/>
+        <p:txBody>
+          <a:bodyPr/>
+          <a:lstStyle/>
+          <a:p>
+            <a:r>
+              <a:rPr lang="en-US" dirty="0" smtClean="0"/>
+              <a:t>Thread hello world</a:t>
+            </a:r>
+            <a:endParaRPr lang="en-US" dirty="0"/>
+          </a:p>
+        </p:txBody>
+      </p:sp>
+      <p:sp>
+        <p:nvSpPr>
+          <p:cNvPr id="3" name="Content Placeholder 2"/>
+          <p:cNvSpPr>
+            <a:spLocks noGrp="1"/>
+          </p:cNvSpPr>
+          <p:nvPr>
+            <p:ph idx="1"/>
+          </p:nvPr>
+        </p:nvSpPr>
+        <p:spPr/>
+        <p:txBody>
+          <a:bodyPr>
+            <a:normAutofit/>
+          </a:bodyPr>
+          <a:lstStyle/>
+          <a:p>
+            <a:r>
+              <a:rPr lang="en-US" dirty="0">
+                <a:solidFill>
+                  <a:srgbClr val="7F0055"/>
+                </a:solidFill>
+                <a:latin typeface="Courier New" panose="02070309020205020404" pitchFamily="49" charset="0"/>
+                <a:cs typeface="Courier New" panose="02070309020205020404" pitchFamily="49" charset="0"/>
+              </a:rPr>
+              <a:t>#include </a:t>
+            </a:r>
+            <a:r>
+              <a:rPr lang="en-US" dirty="0">
+                <a:solidFill>
+                  <a:srgbClr val="2A00FF"/>
+                </a:solidFill>
+                <a:latin typeface="Courier New" panose="02070309020205020404" pitchFamily="49" charset="0"/>
+                <a:cs typeface="Courier New" panose="02070309020205020404" pitchFamily="49" charset="0"/>
+              </a:rPr>
+              <a:t>&lt;</a:t>
+            </a:r>
+            <a:r>
+              <a:rPr lang="en-US" dirty="0" err="1">
+                <a:solidFill>
+                  <a:srgbClr val="3F3FBF"/>
+                </a:solidFill>
+                <a:latin typeface="Courier New" panose="02070309020205020404" pitchFamily="49" charset="0"/>
+                <a:cs typeface="Courier New" panose="02070309020205020404" pitchFamily="49" charset="0"/>
+              </a:rPr>
+              <a:t>iostream</a:t>
+            </a:r>
+            <a:r>
+              <a:rPr lang="en-US" dirty="0" smtClean="0">
+                <a:solidFill>
+                  <a:srgbClr val="2A00FF"/>
+                </a:solidFill>
+                <a:latin typeface="Courier New" panose="02070309020205020404" pitchFamily="49" charset="0"/>
+                <a:cs typeface="Courier New" panose="02070309020205020404" pitchFamily="49" charset="0"/>
+              </a:rPr>
+              <a:t>&gt;</a:t>
+            </a:r>
+            <a:endParaRPr lang="en-US" dirty="0" smtClean="0">
+              <a:latin typeface="Courier New" panose="02070309020205020404" pitchFamily="49" charset="0"/>
+              <a:cs typeface="Courier New" panose="02070309020205020404" pitchFamily="49" charset="0"/>
+            </a:endParaRPr>
+          </a:p>
+          <a:p>
+            <a:r>
+              <a:rPr lang="en-US" dirty="0" smtClean="0">
+                <a:solidFill>
+                  <a:srgbClr val="7F0055"/>
+                </a:solidFill>
+                <a:latin typeface="Courier New" panose="02070309020205020404" pitchFamily="49" charset="0"/>
+                <a:cs typeface="Courier New" panose="02070309020205020404" pitchFamily="49" charset="0"/>
+              </a:rPr>
+              <a:t>#</a:t>
+            </a:r>
+            <a:r>
+              <a:rPr lang="en-US" dirty="0">
+                <a:solidFill>
+                  <a:srgbClr val="7F0055"/>
+                </a:solidFill>
+                <a:latin typeface="Courier New" panose="02070309020205020404" pitchFamily="49" charset="0"/>
+                <a:cs typeface="Courier New" panose="02070309020205020404" pitchFamily="49" charset="0"/>
+              </a:rPr>
+              <a:t>include </a:t>
+            </a:r>
+            <a:r>
+              <a:rPr lang="en-US" dirty="0">
+                <a:solidFill>
+                  <a:srgbClr val="2A00FF"/>
+                </a:solidFill>
+                <a:latin typeface="Courier New" panose="02070309020205020404" pitchFamily="49" charset="0"/>
+                <a:cs typeface="Courier New" panose="02070309020205020404" pitchFamily="49" charset="0"/>
+              </a:rPr>
+              <a:t>&lt;</a:t>
+            </a:r>
+            <a:r>
+              <a:rPr lang="en-US" dirty="0">
+                <a:solidFill>
+                  <a:srgbClr val="3F3FBF"/>
+                </a:solidFill>
+                <a:latin typeface="Courier New" panose="02070309020205020404" pitchFamily="49" charset="0"/>
+                <a:cs typeface="Courier New" panose="02070309020205020404" pitchFamily="49" charset="0"/>
+              </a:rPr>
+              <a:t>thread</a:t>
+            </a:r>
+            <a:r>
+              <a:rPr lang="en-US" dirty="0">
+                <a:solidFill>
+                  <a:srgbClr val="2A00FF"/>
+                </a:solidFill>
+                <a:latin typeface="Courier New" panose="02070309020205020404" pitchFamily="49" charset="0"/>
+                <a:cs typeface="Courier New" panose="02070309020205020404" pitchFamily="49" charset="0"/>
+              </a:rPr>
+              <a:t>&gt;</a:t>
+            </a:r>
+            <a:r>
+              <a:rPr lang="en-US" dirty="0">
+                <a:latin typeface="Courier New" panose="02070309020205020404" pitchFamily="49" charset="0"/>
+                <a:cs typeface="Courier New" panose="02070309020205020404" pitchFamily="49" charset="0"/>
+              </a:rPr>
+              <a:t> </a:t>
+            </a:r>
+            <a:endParaRPr lang="en-US" dirty="0" smtClean="0">
+              <a:latin typeface="Courier New" panose="02070309020205020404" pitchFamily="49" charset="0"/>
+              <a:cs typeface="Courier New" panose="02070309020205020404" pitchFamily="49" charset="0"/>
+            </a:endParaRPr>
+          </a:p>
+          <a:p>
+            <a:r>
+              <a:rPr lang="en-US" dirty="0" smtClean="0">
+                <a:solidFill>
+                  <a:srgbClr val="7F0055"/>
+                </a:solidFill>
+                <a:latin typeface="Courier New" panose="02070309020205020404" pitchFamily="49" charset="0"/>
+                <a:cs typeface="Courier New" panose="02070309020205020404" pitchFamily="49" charset="0"/>
+              </a:rPr>
+              <a:t>void</a:t>
+            </a:r>
+            <a:r>
+              <a:rPr lang="en-US" dirty="0" smtClean="0">
+                <a:latin typeface="Courier New" panose="02070309020205020404" pitchFamily="49" charset="0"/>
+                <a:cs typeface="Courier New" panose="02070309020205020404" pitchFamily="49" charset="0"/>
+              </a:rPr>
+              <a:t> </a:t>
+            </a:r>
+            <a:r>
+              <a:rPr lang="en-US" dirty="0">
+                <a:latin typeface="Courier New" panose="02070309020205020404" pitchFamily="49" charset="0"/>
+                <a:cs typeface="Courier New" panose="02070309020205020404" pitchFamily="49" charset="0"/>
+              </a:rPr>
+              <a:t>hello() </a:t>
+            </a:r>
+            <a:r>
+              <a:rPr lang="en-US" dirty="0" smtClean="0">
+                <a:latin typeface="Courier New" panose="02070309020205020404" pitchFamily="49" charset="0"/>
+                <a:cs typeface="Courier New" panose="02070309020205020404" pitchFamily="49" charset="0"/>
+              </a:rPr>
+              <a:t>{</a:t>
+            </a:r>
+          </a:p>
+          <a:p>
+            <a:r>
+              <a:rPr lang="en-US" dirty="0">
+                <a:latin typeface="Courier New" panose="02070309020205020404" pitchFamily="49" charset="0"/>
+                <a:cs typeface="Courier New" panose="02070309020205020404" pitchFamily="49" charset="0"/>
+              </a:rPr>
+              <a:t> </a:t>
+            </a:r>
+            <a:r>
+              <a:rPr lang="en-US" dirty="0" smtClean="0">
+                <a:latin typeface="Courier New" panose="02070309020205020404" pitchFamily="49" charset="0"/>
+                <a:cs typeface="Courier New" panose="02070309020205020404" pitchFamily="49" charset="0"/>
+              </a:rPr>
+              <a:t> </a:t>
+            </a:r>
+            <a:r>
+              <a:rPr lang="en-US" dirty="0" err="1" smtClean="0">
+                <a:latin typeface="Courier New" panose="02070309020205020404" pitchFamily="49" charset="0"/>
+                <a:cs typeface="Courier New" panose="02070309020205020404" pitchFamily="49" charset="0"/>
+              </a:rPr>
+              <a:t>std</a:t>
+            </a:r>
+            <a:r>
+              <a:rPr lang="en-US" dirty="0">
+                <a:latin typeface="Courier New" panose="02070309020205020404" pitchFamily="49" charset="0"/>
+                <a:cs typeface="Courier New" panose="02070309020205020404" pitchFamily="49" charset="0"/>
+              </a:rPr>
+              <a:t>::</a:t>
+            </a:r>
+            <a:r>
+              <a:rPr lang="en-US" dirty="0" err="1">
+                <a:solidFill>
+                  <a:srgbClr val="7F0055"/>
+                </a:solidFill>
+                <a:latin typeface="Courier New" panose="02070309020205020404" pitchFamily="49" charset="0"/>
+                <a:cs typeface="Courier New" panose="02070309020205020404" pitchFamily="49" charset="0"/>
+              </a:rPr>
+              <a:t>cout</a:t>
+            </a:r>
+            <a:r>
+              <a:rPr lang="en-US" dirty="0">
+                <a:latin typeface="Courier New" panose="02070309020205020404" pitchFamily="49" charset="0"/>
+                <a:cs typeface="Courier New" panose="02070309020205020404" pitchFamily="49" charset="0"/>
+              </a:rPr>
+              <a:t> &lt;&lt; “Hello, world\n</a:t>
+            </a:r>
+            <a:r>
+              <a:rPr lang="en-US" dirty="0" smtClean="0">
+                <a:latin typeface="Courier New" panose="02070309020205020404" pitchFamily="49" charset="0"/>
+                <a:cs typeface="Courier New" panose="02070309020205020404" pitchFamily="49" charset="0"/>
+              </a:rPr>
+              <a:t>”;</a:t>
+            </a:r>
+          </a:p>
+          <a:p>
+            <a:r>
+              <a:rPr lang="en-US" dirty="0" smtClean="0">
+                <a:latin typeface="Courier New" panose="02070309020205020404" pitchFamily="49" charset="0"/>
+                <a:cs typeface="Courier New" panose="02070309020205020404" pitchFamily="49" charset="0"/>
+              </a:rPr>
+              <a:t>} </a:t>
+            </a:r>
+          </a:p>
+          <a:p>
+            <a:r>
+              <a:rPr lang="en-US" dirty="0" err="1" smtClean="0">
+                <a:solidFill>
+                  <a:srgbClr val="7F0055"/>
+                </a:solidFill>
+                <a:latin typeface="Courier New" panose="02070309020205020404" pitchFamily="49" charset="0"/>
+                <a:cs typeface="Courier New" panose="02070309020205020404" pitchFamily="49" charset="0"/>
+              </a:rPr>
+              <a:t>int</a:t>
+            </a:r>
+            <a:r>
+              <a:rPr lang="en-US" dirty="0" smtClean="0">
+                <a:latin typeface="Courier New" panose="02070309020205020404" pitchFamily="49" charset="0"/>
+                <a:cs typeface="Courier New" panose="02070309020205020404" pitchFamily="49" charset="0"/>
+              </a:rPr>
+              <a:t> </a:t>
+            </a:r>
+            <a:r>
+              <a:rPr lang="en-US" dirty="0">
+                <a:solidFill>
+                  <a:srgbClr val="7F0055"/>
+                </a:solidFill>
+                <a:latin typeface="Courier New" panose="02070309020205020404" pitchFamily="49" charset="0"/>
+                <a:cs typeface="Courier New" panose="02070309020205020404" pitchFamily="49" charset="0"/>
+              </a:rPr>
+              <a:t>main</a:t>
+            </a:r>
+            <a:r>
+              <a:rPr lang="en-US" dirty="0">
+                <a:latin typeface="Courier New" panose="02070309020205020404" pitchFamily="49" charset="0"/>
+                <a:cs typeface="Courier New" panose="02070309020205020404" pitchFamily="49" charset="0"/>
+              </a:rPr>
+              <a:t>() </a:t>
+            </a:r>
+            <a:r>
+              <a:rPr lang="en-US" dirty="0" smtClean="0">
+                <a:latin typeface="Courier New" panose="02070309020205020404" pitchFamily="49" charset="0"/>
+                <a:cs typeface="Courier New" panose="02070309020205020404" pitchFamily="49" charset="0"/>
+              </a:rPr>
+              <a:t>{</a:t>
+            </a:r>
+          </a:p>
+          <a:p>
+            <a:r>
+              <a:rPr lang="en-US" dirty="0">
+                <a:latin typeface="Courier New" panose="02070309020205020404" pitchFamily="49" charset="0"/>
+                <a:cs typeface="Courier New" panose="02070309020205020404" pitchFamily="49" charset="0"/>
+              </a:rPr>
+              <a:t> </a:t>
+            </a:r>
+            <a:r>
+              <a:rPr lang="en-US" dirty="0" smtClean="0">
+                <a:latin typeface="Courier New" panose="02070309020205020404" pitchFamily="49" charset="0"/>
+                <a:cs typeface="Courier New" panose="02070309020205020404" pitchFamily="49" charset="0"/>
+              </a:rPr>
+              <a:t> </a:t>
+            </a:r>
+            <a:r>
+              <a:rPr lang="en-US" dirty="0" err="1" smtClean="0">
+                <a:latin typeface="Courier New" panose="02070309020205020404" pitchFamily="49" charset="0"/>
+                <a:cs typeface="Courier New" panose="02070309020205020404" pitchFamily="49" charset="0"/>
+              </a:rPr>
+              <a:t>std</a:t>
+            </a:r>
+            <a:r>
+              <a:rPr lang="en-US" dirty="0">
+                <a:latin typeface="Courier New" panose="02070309020205020404" pitchFamily="49" charset="0"/>
+                <a:cs typeface="Courier New" panose="02070309020205020404" pitchFamily="49" charset="0"/>
+              </a:rPr>
+              <a:t>::thread t(hello</a:t>
+            </a:r>
+            <a:r>
+              <a:rPr lang="en-US" dirty="0" smtClean="0">
+                <a:latin typeface="Courier New" panose="02070309020205020404" pitchFamily="49" charset="0"/>
+                <a:cs typeface="Courier New" panose="02070309020205020404" pitchFamily="49" charset="0"/>
+              </a:rPr>
+              <a:t>);</a:t>
+            </a:r>
+          </a:p>
+          <a:p>
+            <a:r>
+              <a:rPr lang="en-US" dirty="0">
+                <a:latin typeface="Courier New" panose="02070309020205020404" pitchFamily="49" charset="0"/>
+                <a:cs typeface="Courier New" panose="02070309020205020404" pitchFamily="49" charset="0"/>
+              </a:rPr>
+              <a:t> </a:t>
+            </a:r>
+            <a:r>
+              <a:rPr lang="en-US" dirty="0" smtClean="0">
+                <a:latin typeface="Courier New" panose="02070309020205020404" pitchFamily="49" charset="0"/>
+                <a:cs typeface="Courier New" panose="02070309020205020404" pitchFamily="49" charset="0"/>
+              </a:rPr>
+              <a:t> </a:t>
+            </a:r>
+            <a:r>
+              <a:rPr lang="en-US" dirty="0" err="1" smtClean="0">
+                <a:latin typeface="Courier New" panose="02070309020205020404" pitchFamily="49" charset="0"/>
+                <a:cs typeface="Courier New" panose="02070309020205020404" pitchFamily="49" charset="0"/>
+              </a:rPr>
+              <a:t>t.join</a:t>
+            </a:r>
+            <a:r>
+              <a:rPr lang="en-US" dirty="0" smtClean="0">
+                <a:latin typeface="Courier New" panose="02070309020205020404" pitchFamily="49" charset="0"/>
+                <a:cs typeface="Courier New" panose="02070309020205020404" pitchFamily="49" charset="0"/>
+              </a:rPr>
+              <a:t>();</a:t>
+            </a:r>
+          </a:p>
+          <a:p>
+            <a:r>
+              <a:rPr lang="en-US" dirty="0" smtClean="0">
+                <a:latin typeface="Courier New" panose="02070309020205020404" pitchFamily="49" charset="0"/>
+                <a:cs typeface="Courier New" panose="02070309020205020404" pitchFamily="49" charset="0"/>
+              </a:rPr>
+              <a:t>}</a:t>
+            </a:r>
+            <a:endParaRPr lang="en-US" dirty="0">
+              <a:latin typeface="Courier New" panose="02070309020205020404" pitchFamily="49" charset="0"/>
+              <a:cs typeface="Courier New" panose="02070309020205020404" pitchFamily="49" charset="0"/>
+            </a:endParaRPr>
+          </a:p>
+        </p:txBody>
+      </p:sp>
+      <p:sp>
+        <p:nvSpPr>
+          <p:cNvPr id="4" name="Slide Number Placeholder 3"/>
+          <p:cNvSpPr>
+            <a:spLocks noGrp="1"/>
+          </p:cNvSpPr>
+          <p:nvPr>
+            <p:ph type="sldNum" sz="quarter" idx="12"/>
+          </p:nvPr>
+        </p:nvSpPr>
+        <p:spPr/>
+        <p:txBody>
+          <a:bodyPr/>
+          <a:lstStyle/>
+          <a:p>
+            <a:fld id="{6DA12B36-9664-4CB0-8B2E-F4A2F44AE97E}" type="slidenum">
+              <a:rPr lang="en-US" smtClean="0"/>
+              <a:t>9</a:t>
+            </a:fld>
+            <a:endParaRPr lang="en-US"/>
+          </a:p>
+        </p:txBody>
+      </p:sp>
+      <p:sp>
+        <p:nvSpPr>
+          <p:cNvPr id="5" name="Footer Placeholder 4"/>
+          <p:cNvSpPr>
+            <a:spLocks noGrp="1"/>
+          </p:cNvSpPr>
+          <p:nvPr>
+            <p:ph type="ftr" sz="quarter" idx="11"/>
+          </p:nvPr>
+        </p:nvSpPr>
+        <p:spPr/>
+        <p:txBody>
+          <a:bodyPr/>
+          <a:lstStyle/>
+          <a:p>
+            <a:r>
+              <a:rPr lang="en-US" smtClean="0"/>
+              <a:t>Source: Williams, Chapter 1</a:t>
+            </a:r>
+            <a:endParaRPr lang="en-US"/>
+          </a:p>
+        </p:txBody>
+      </p:sp>
+    </p:spTree>
+    <p:extLst>
+      <p:ext uri="{BB962C8B-B14F-4D97-AF65-F5344CB8AC3E}">
+        <p14:creationId xmlns:p14="http://schemas.microsoft.com/office/powerpoint/2010/main" val="3394249714"/>
       </p:ext>
     </p:extLst>
   </p:cSld>

</xml_diff>

<commit_message>
Add a callable types example.
</commit_message>
<xml_diff>
--- a/Lectures/Threads/Threads.pptx
+++ b/Lectures/Threads/Threads.pptx
@@ -5,7 +5,7 @@
     <p:sldMasterId id="2147483660" r:id="rId1"/>
   </p:sldMasterIdLst>
   <p:notesMasterIdLst>
-    <p:notesMasterId r:id="rId13"/>
+    <p:notesMasterId r:id="rId15"/>
   </p:notesMasterIdLst>
   <p:sldIdLst>
     <p:sldId id="256" r:id="rId2"/>
@@ -19,6 +19,8 @@
     <p:sldId id="264" r:id="rId10"/>
     <p:sldId id="265" r:id="rId11"/>
     <p:sldId id="266" r:id="rId12"/>
+    <p:sldId id="267" r:id="rId13"/>
+    <p:sldId id="268" r:id="rId14"/>
   </p:sldIdLst>
   <p:sldSz cx="9144000" cy="6858000" type="screen4x3"/>
   <p:notesSz cx="6858000" cy="9144000"/>
@@ -202,7 +204,7 @@
           <a:p>
             <a:fld id="{DBE0ECA1-3FBF-48AE-AD2A-4439AE745E19}" type="datetimeFigureOut">
               <a:rPr lang="en-US" smtClean="0"/>
-              <a:t>10/30/2013</a:t>
+              <a:t>10/31/2013</a:t>
             </a:fld>
             <a:endParaRPr lang="en-US"/>
           </a:p>
@@ -663,7 +665,7 @@
           <a:p>
             <a:fld id="{9769DED8-28D4-45B9-A00F-7CFE9335FEA6}" type="datetime1">
               <a:rPr lang="en-US" smtClean="0"/>
-              <a:t>10/30/2013</a:t>
+              <a:t>10/31/2013</a:t>
             </a:fld>
             <a:endParaRPr lang="en-US"/>
           </a:p>
@@ -928,7 +930,7 @@
           <a:p>
             <a:fld id="{2DB3D439-1F88-44B4-B5F7-F9BCD4064257}" type="datetime1">
               <a:rPr lang="en-US" smtClean="0"/>
-              <a:t>10/30/2013</a:t>
+              <a:t>10/31/2013</a:t>
             </a:fld>
             <a:endParaRPr lang="en-US"/>
           </a:p>
@@ -1103,7 +1105,7 @@
           <a:p>
             <a:fld id="{99C5638F-6F55-4055-935C-67841BE78C36}" type="datetime1">
               <a:rPr lang="en-US" smtClean="0"/>
-              <a:t>10/30/2013</a:t>
+              <a:t>10/31/2013</a:t>
             </a:fld>
             <a:endParaRPr lang="en-US"/>
           </a:p>
@@ -1268,7 +1270,7 @@
           <a:p>
             <a:fld id="{E6987D90-0C92-4B22-A29D-FED15412CED2}" type="datetime1">
               <a:rPr lang="en-US" smtClean="0"/>
-              <a:t>10/30/2013</a:t>
+              <a:t>10/31/2013</a:t>
             </a:fld>
             <a:endParaRPr lang="en-US"/>
           </a:p>
@@ -1517,7 +1519,7 @@
           <a:p>
             <a:fld id="{DDB67BC4-9554-49E0-BCB3-D1EF965BA0B8}" type="datetime1">
               <a:rPr lang="en-US" smtClean="0"/>
-              <a:t>10/30/2013</a:t>
+              <a:t>10/31/2013</a:t>
             </a:fld>
             <a:endParaRPr lang="en-US"/>
           </a:p>
@@ -1800,7 +1802,7 @@
           <a:p>
             <a:fld id="{EC24D770-803D-4E01-921C-9C100DD8230C}" type="datetime1">
               <a:rPr lang="en-US" smtClean="0"/>
-              <a:t>10/30/2013</a:t>
+              <a:t>10/31/2013</a:t>
             </a:fld>
             <a:endParaRPr lang="en-US"/>
           </a:p>
@@ -2239,7 +2241,7 @@
           <a:p>
             <a:fld id="{356AD44B-78A4-4209-8070-7DCBE2DC4992}" type="datetime1">
               <a:rPr lang="en-US" smtClean="0"/>
-              <a:t>10/30/2013</a:t>
+              <a:t>10/31/2013</a:t>
             </a:fld>
             <a:endParaRPr lang="en-US"/>
           </a:p>
@@ -2352,7 +2354,7 @@
           <a:p>
             <a:fld id="{A993C59A-7CA2-467F-B7F1-9096881A01B8}" type="datetime1">
               <a:rPr lang="en-US" smtClean="0"/>
-              <a:t>10/30/2013</a:t>
+              <a:t>10/31/2013</a:t>
             </a:fld>
             <a:endParaRPr lang="en-US"/>
           </a:p>
@@ -2442,7 +2444,7 @@
           <a:p>
             <a:fld id="{2B6B58D0-2488-434A-8ED1-692E09B85CC5}" type="datetime1">
               <a:rPr lang="en-US" smtClean="0"/>
-              <a:t>10/30/2013</a:t>
+              <a:t>10/31/2013</a:t>
             </a:fld>
             <a:endParaRPr lang="en-US"/>
           </a:p>
@@ -2684,7 +2686,7 @@
           <a:p>
             <a:fld id="{FDB0AFC2-7D64-4F61-A7B7-9932D3305DDA}" type="datetime1">
               <a:rPr lang="en-US" smtClean="0"/>
-              <a:t>10/30/2013</a:t>
+              <a:t>10/31/2013</a:t>
             </a:fld>
             <a:endParaRPr lang="en-US"/>
           </a:p>
@@ -2978,7 +2980,7 @@
           <a:p>
             <a:fld id="{4983D17A-D7B2-4ECE-8A2C-93679B9D177B}" type="datetime1">
               <a:rPr lang="en-US" smtClean="0"/>
-              <a:t>10/30/2013</a:t>
+              <a:t>10/31/2013</a:t>
             </a:fld>
             <a:endParaRPr lang="en-US"/>
           </a:p>
@@ -3272,7 +3274,7 @@
           <a:p>
             <a:fld id="{2A5275F7-419E-4C23-8A3D-2EE5742B2EC9}" type="datetime1">
               <a:rPr lang="en-US" smtClean="0"/>
-              <a:t>10/30/2013</a:t>
+              <a:t>10/31/2013</a:t>
             </a:fld>
             <a:endParaRPr lang="en-US"/>
           </a:p>
@@ -4120,7 +4122,33 @@
             <a:pPr marL="800100" lvl="1" indent="-342900"/>
             <a:r>
               <a:rPr lang="en-US" dirty="0" smtClean="0"/>
-              <a:t>Lambda expression</a:t>
+              <a:t>Lambda </a:t>
+            </a:r>
+            <a:r>
+              <a:rPr lang="en-US" dirty="0" smtClean="0"/>
+              <a:t>expression</a:t>
+            </a:r>
+          </a:p>
+          <a:p>
+            <a:pPr marL="342900" indent="-342900"/>
+            <a:r>
+              <a:rPr lang="en-US" dirty="0" smtClean="0"/>
+              <a:t>Let’s see an example</a:t>
+            </a:r>
+          </a:p>
+          <a:p>
+            <a:pPr marL="800100" lvl="1" indent="-342900"/>
+            <a:r>
+              <a:rPr lang="en-US" dirty="0" smtClean="0"/>
+              <a:t>Consider when the </a:t>
+            </a:r>
+            <a:r>
+              <a:rPr lang="en-US" dirty="0" err="1" smtClean="0"/>
+              <a:t>functor</a:t>
+            </a:r>
+            <a:r>
+              <a:rPr lang="en-US" dirty="0" smtClean="0"/>
+              <a:t> and example objects will be copied</a:t>
             </a:r>
             <a:endParaRPr lang="en-US" dirty="0"/>
           </a:p>
@@ -4176,6 +4204,486 @@
     <p:extLst>
       <p:ext uri="{BB962C8B-B14F-4D97-AF65-F5344CB8AC3E}">
         <p14:creationId xmlns:p14="http://schemas.microsoft.com/office/powerpoint/2010/main" val="2143830193"/>
+      </p:ext>
+    </p:extLst>
+  </p:cSld>
+  <p:clrMapOvr>
+    <a:masterClrMapping/>
+  </p:clrMapOvr>
+</p:sld>
+</file>
+
+<file path=ppt/slides/slide12.xml><?xml version="1.0" encoding="utf-8"?>
+<p:sld xmlns:a="http://schemas.openxmlformats.org/drawingml/2006/main" xmlns:r="http://schemas.openxmlformats.org/officeDocument/2006/relationships" xmlns:p="http://schemas.openxmlformats.org/presentationml/2006/main">
+  <p:cSld>
+    <p:spTree>
+      <p:nvGrpSpPr>
+        <p:cNvPr id="1" name=""/>
+        <p:cNvGrpSpPr/>
+        <p:nvPr/>
+      </p:nvGrpSpPr>
+      <p:grpSpPr>
+        <a:xfrm>
+          <a:off x="0" y="0"/>
+          <a:ext cx="0" cy="0"/>
+          <a:chOff x="0" y="0"/>
+          <a:chExt cx="0" cy="0"/>
+        </a:xfrm>
+      </p:grpSpPr>
+      <p:sp>
+        <p:nvSpPr>
+          <p:cNvPr id="2" name="Title 1"/>
+          <p:cNvSpPr>
+            <a:spLocks noGrp="1"/>
+          </p:cNvSpPr>
+          <p:nvPr>
+            <p:ph type="title"/>
+          </p:nvPr>
+        </p:nvSpPr>
+        <p:spPr/>
+        <p:txBody>
+          <a:bodyPr/>
+          <a:lstStyle/>
+          <a:p>
+            <a:r>
+              <a:rPr lang="en-US" dirty="0" smtClean="0"/>
+              <a:t>Let’s make it testable</a:t>
+            </a:r>
+            <a:endParaRPr lang="en-US" dirty="0"/>
+          </a:p>
+        </p:txBody>
+      </p:sp>
+      <p:sp>
+        <p:nvSpPr>
+          <p:cNvPr id="3" name="Content Placeholder 2"/>
+          <p:cNvSpPr>
+            <a:spLocks noGrp="1"/>
+          </p:cNvSpPr>
+          <p:nvPr>
+            <p:ph idx="1"/>
+          </p:nvPr>
+        </p:nvSpPr>
+        <p:spPr/>
+        <p:txBody>
+          <a:bodyPr/>
+          <a:lstStyle/>
+          <a:p>
+            <a:r>
+              <a:rPr lang="en-US" dirty="0" smtClean="0"/>
+              <a:t>I don’t like this code, because it is not easy to test.</a:t>
+            </a:r>
+          </a:p>
+          <a:p>
+            <a:pPr marL="800100" lvl="1" indent="-342900"/>
+            <a:r>
+              <a:rPr lang="en-US" dirty="0" smtClean="0"/>
+              <a:t>How could we verify that each method prints the correct message?</a:t>
+            </a:r>
+            <a:endParaRPr lang="en-US" dirty="0"/>
+          </a:p>
+        </p:txBody>
+      </p:sp>
+      <p:sp>
+        <p:nvSpPr>
+          <p:cNvPr id="4" name="Slide Number Placeholder 3"/>
+          <p:cNvSpPr>
+            <a:spLocks noGrp="1"/>
+          </p:cNvSpPr>
+          <p:nvPr>
+            <p:ph type="sldNum" sz="quarter" idx="12"/>
+          </p:nvPr>
+        </p:nvSpPr>
+        <p:spPr/>
+        <p:txBody>
+          <a:bodyPr/>
+          <a:lstStyle/>
+          <a:p>
+            <a:fld id="{6DA12B36-9664-4CB0-8B2E-F4A2F44AE97E}" type="slidenum">
+              <a:rPr lang="en-US" smtClean="0"/>
+              <a:t>12</a:t>
+            </a:fld>
+            <a:endParaRPr lang="en-US"/>
+          </a:p>
+        </p:txBody>
+      </p:sp>
+    </p:spTree>
+    <p:extLst>
+      <p:ext uri="{BB962C8B-B14F-4D97-AF65-F5344CB8AC3E}">
+        <p14:creationId xmlns:p14="http://schemas.microsoft.com/office/powerpoint/2010/main" val="3115583928"/>
+      </p:ext>
+    </p:extLst>
+  </p:cSld>
+  <p:clrMapOvr>
+    <a:masterClrMapping/>
+  </p:clrMapOvr>
+</p:sld>
+</file>
+
+<file path=ppt/slides/slide13.xml><?xml version="1.0" encoding="utf-8"?>
+<p:sld xmlns:a="http://schemas.openxmlformats.org/drawingml/2006/main" xmlns:r="http://schemas.openxmlformats.org/officeDocument/2006/relationships" xmlns:p="http://schemas.openxmlformats.org/presentationml/2006/main">
+  <p:cSld>
+    <p:spTree>
+      <p:nvGrpSpPr>
+        <p:cNvPr id="1" name=""/>
+        <p:cNvGrpSpPr/>
+        <p:nvPr/>
+      </p:nvGrpSpPr>
+      <p:grpSpPr>
+        <a:xfrm>
+          <a:off x="0" y="0"/>
+          <a:ext cx="0" cy="0"/>
+          <a:chOff x="0" y="0"/>
+          <a:chExt cx="0" cy="0"/>
+        </a:xfrm>
+      </p:grpSpPr>
+      <p:sp>
+        <p:nvSpPr>
+          <p:cNvPr id="2" name="Title 1"/>
+          <p:cNvSpPr>
+            <a:spLocks noGrp="1"/>
+          </p:cNvSpPr>
+          <p:nvPr>
+            <p:ph type="title"/>
+          </p:nvPr>
+        </p:nvSpPr>
+        <p:spPr/>
+        <p:txBody>
+          <a:bodyPr/>
+          <a:lstStyle/>
+          <a:p>
+            <a:r>
+              <a:rPr lang="en-US" dirty="0" smtClean="0"/>
+              <a:t>Dependency Injection</a:t>
+            </a:r>
+            <a:endParaRPr lang="en-US" dirty="0"/>
+          </a:p>
+        </p:txBody>
+      </p:sp>
+      <p:sp>
+        <p:nvSpPr>
+          <p:cNvPr id="3" name="Content Placeholder 2"/>
+          <p:cNvSpPr>
+            <a:spLocks noGrp="1"/>
+          </p:cNvSpPr>
+          <p:nvPr>
+            <p:ph idx="1"/>
+          </p:nvPr>
+        </p:nvSpPr>
+        <p:spPr/>
+        <p:txBody>
+          <a:bodyPr/>
+          <a:lstStyle/>
+          <a:p>
+            <a:r>
+              <a:rPr lang="en-US" dirty="0" smtClean="0"/>
+              <a:t>Dependency injection is a technique to allow unit testing</a:t>
+            </a:r>
+          </a:p>
+          <a:p>
+            <a:r>
+              <a:rPr lang="en-US" dirty="0" smtClean="0">
+                <a:solidFill>
+                  <a:srgbClr val="7F0055"/>
+                </a:solidFill>
+                <a:latin typeface="Courier New" panose="02070309020205020404" pitchFamily="49" charset="0"/>
+                <a:cs typeface="Courier New" panose="02070309020205020404" pitchFamily="49" charset="0"/>
+              </a:rPr>
+              <a:t>void</a:t>
+            </a:r>
+            <a:r>
+              <a:rPr lang="en-US" dirty="0" smtClean="0">
+                <a:latin typeface="Courier New" panose="02070309020205020404" pitchFamily="49" charset="0"/>
+                <a:cs typeface="Courier New" panose="02070309020205020404" pitchFamily="49" charset="0"/>
+              </a:rPr>
+              <a:t> </a:t>
+            </a:r>
+            <a:r>
+              <a:rPr lang="en-US" dirty="0" err="1">
+                <a:latin typeface="Courier New" panose="02070309020205020404" pitchFamily="49" charset="0"/>
+                <a:cs typeface="Courier New" panose="02070309020205020404" pitchFamily="49" charset="0"/>
+              </a:rPr>
+              <a:t>free_function</a:t>
+            </a:r>
+            <a:r>
+              <a:rPr lang="en-US" dirty="0">
+                <a:latin typeface="Courier New" panose="02070309020205020404" pitchFamily="49" charset="0"/>
+                <a:cs typeface="Courier New" panose="02070309020205020404" pitchFamily="49" charset="0"/>
+              </a:rPr>
+              <a:t>() </a:t>
+            </a:r>
+            <a:r>
+              <a:rPr lang="en-US" dirty="0" smtClean="0">
+                <a:latin typeface="Courier New" panose="02070309020205020404" pitchFamily="49" charset="0"/>
+                <a:cs typeface="Courier New" panose="02070309020205020404" pitchFamily="49" charset="0"/>
+              </a:rPr>
+              <a:t>{</a:t>
+            </a:r>
+          </a:p>
+          <a:p>
+            <a:r>
+              <a:rPr lang="en-US" dirty="0">
+                <a:latin typeface="Courier New" panose="02070309020205020404" pitchFamily="49" charset="0"/>
+                <a:cs typeface="Courier New" panose="02070309020205020404" pitchFamily="49" charset="0"/>
+              </a:rPr>
+              <a:t> </a:t>
+            </a:r>
+            <a:r>
+              <a:rPr lang="en-US" dirty="0" smtClean="0">
+                <a:latin typeface="Courier New" panose="02070309020205020404" pitchFamily="49" charset="0"/>
+                <a:cs typeface="Courier New" panose="02070309020205020404" pitchFamily="49" charset="0"/>
+              </a:rPr>
+              <a:t> </a:t>
+            </a:r>
+            <a:r>
+              <a:rPr lang="en-US" dirty="0" err="1" smtClean="0">
+                <a:latin typeface="Courier New" panose="02070309020205020404" pitchFamily="49" charset="0"/>
+                <a:cs typeface="Courier New" panose="02070309020205020404" pitchFamily="49" charset="0"/>
+              </a:rPr>
+              <a:t>std</a:t>
+            </a:r>
+            <a:r>
+              <a:rPr lang="en-US" dirty="0">
+                <a:latin typeface="Courier New" panose="02070309020205020404" pitchFamily="49" charset="0"/>
+                <a:cs typeface="Courier New" panose="02070309020205020404" pitchFamily="49" charset="0"/>
+              </a:rPr>
+              <a:t>::</a:t>
+            </a:r>
+            <a:r>
+              <a:rPr lang="en-US" dirty="0" err="1">
+                <a:solidFill>
+                  <a:srgbClr val="7F0055"/>
+                </a:solidFill>
+                <a:latin typeface="Courier New" panose="02070309020205020404" pitchFamily="49" charset="0"/>
+                <a:cs typeface="Courier New" panose="02070309020205020404" pitchFamily="49" charset="0"/>
+              </a:rPr>
+              <a:t>cout</a:t>
+            </a:r>
+            <a:r>
+              <a:rPr lang="en-US" dirty="0">
+                <a:latin typeface="Courier New" panose="02070309020205020404" pitchFamily="49" charset="0"/>
+                <a:cs typeface="Courier New" panose="02070309020205020404" pitchFamily="49" charset="0"/>
+              </a:rPr>
+              <a:t> &lt;&lt; </a:t>
+            </a:r>
+            <a:r>
+              <a:rPr lang="en-US" dirty="0">
+                <a:solidFill>
+                  <a:srgbClr val="2A00FF"/>
+                </a:solidFill>
+                <a:latin typeface="Courier New" panose="02070309020205020404" pitchFamily="49" charset="0"/>
+                <a:cs typeface="Courier New" panose="02070309020205020404" pitchFamily="49" charset="0"/>
+              </a:rPr>
+              <a:t>"Free function\n</a:t>
+            </a:r>
+            <a:r>
+              <a:rPr lang="en-US" dirty="0" smtClean="0">
+                <a:solidFill>
+                  <a:srgbClr val="2A00FF"/>
+                </a:solidFill>
+                <a:latin typeface="Courier New" panose="02070309020205020404" pitchFamily="49" charset="0"/>
+                <a:cs typeface="Courier New" panose="02070309020205020404" pitchFamily="49" charset="0"/>
+              </a:rPr>
+              <a:t>"</a:t>
+            </a:r>
+            <a:r>
+              <a:rPr lang="en-US" dirty="0" smtClean="0">
+                <a:latin typeface="Courier New" panose="02070309020205020404" pitchFamily="49" charset="0"/>
+                <a:cs typeface="Courier New" panose="02070309020205020404" pitchFamily="49" charset="0"/>
+              </a:rPr>
+              <a:t>;</a:t>
+            </a:r>
+          </a:p>
+          <a:p>
+            <a:r>
+              <a:rPr lang="en-US" dirty="0" smtClean="0">
+                <a:latin typeface="Courier New" panose="02070309020205020404" pitchFamily="49" charset="0"/>
+                <a:cs typeface="Courier New" panose="02070309020205020404" pitchFamily="49" charset="0"/>
+              </a:rPr>
+              <a:t>}</a:t>
+            </a:r>
+          </a:p>
+          <a:p>
+            <a:pPr marL="800100" lvl="1" indent="-342900"/>
+            <a:r>
+              <a:rPr lang="en-US" dirty="0" smtClean="0">
+                <a:cs typeface="Courier New" panose="02070309020205020404" pitchFamily="49" charset="0"/>
+              </a:rPr>
+              <a:t>The function depends upon </a:t>
+            </a:r>
+            <a:r>
+              <a:rPr lang="en-US" dirty="0" err="1">
+                <a:latin typeface="Courier New" panose="02070309020205020404" pitchFamily="49" charset="0"/>
+                <a:cs typeface="Courier New" panose="02070309020205020404" pitchFamily="49" charset="0"/>
+              </a:rPr>
+              <a:t>std</a:t>
+            </a:r>
+            <a:r>
+              <a:rPr lang="en-US" dirty="0">
+                <a:latin typeface="Courier New" panose="02070309020205020404" pitchFamily="49" charset="0"/>
+                <a:cs typeface="Courier New" panose="02070309020205020404" pitchFamily="49" charset="0"/>
+              </a:rPr>
+              <a:t>::</a:t>
+            </a:r>
+            <a:r>
+              <a:rPr lang="en-US" dirty="0" err="1" smtClean="0">
+                <a:solidFill>
+                  <a:srgbClr val="7F0055"/>
+                </a:solidFill>
+                <a:latin typeface="Courier New" panose="02070309020205020404" pitchFamily="49" charset="0"/>
+                <a:cs typeface="Courier New" panose="02070309020205020404" pitchFamily="49" charset="0"/>
+              </a:rPr>
+              <a:t>cout</a:t>
+            </a:r>
+            <a:endParaRPr lang="en-US" dirty="0" smtClean="0">
+              <a:solidFill>
+                <a:srgbClr val="7F0055"/>
+              </a:solidFill>
+              <a:latin typeface="Courier New" panose="02070309020205020404" pitchFamily="49" charset="0"/>
+              <a:cs typeface="Courier New" panose="02070309020205020404" pitchFamily="49" charset="0"/>
+            </a:endParaRPr>
+          </a:p>
+          <a:p>
+            <a:pPr marL="800100" lvl="1" indent="-342900"/>
+            <a:r>
+              <a:rPr lang="en-US" dirty="0" smtClean="0">
+                <a:cs typeface="Courier New" panose="02070309020205020404" pitchFamily="49" charset="0"/>
+              </a:rPr>
+              <a:t>Instead, inject the dependency into the function</a:t>
+            </a:r>
+          </a:p>
+          <a:p>
+            <a:pPr marL="342900" indent="-342900"/>
+            <a:endParaRPr lang="en-US" dirty="0" smtClean="0">
+              <a:solidFill>
+                <a:srgbClr val="7F0055"/>
+              </a:solidFill>
+            </a:endParaRPr>
+          </a:p>
+          <a:p>
+            <a:pPr marL="342900" indent="-342900"/>
+            <a:r>
+              <a:rPr lang="en-US" dirty="0" smtClean="0">
+                <a:solidFill>
+                  <a:srgbClr val="7F0055"/>
+                </a:solidFill>
+              </a:rPr>
+              <a:t>void</a:t>
+            </a:r>
+            <a:r>
+              <a:rPr lang="en-US" dirty="0" smtClean="0"/>
+              <a:t> </a:t>
+            </a:r>
+            <a:r>
+              <a:rPr lang="en-US" dirty="0" err="1"/>
+              <a:t>free_function</a:t>
+            </a:r>
+            <a:r>
+              <a:rPr lang="en-US" dirty="0"/>
+              <a:t>(</a:t>
+            </a:r>
+            <a:r>
+              <a:rPr lang="en-US" dirty="0" err="1"/>
+              <a:t>std</a:t>
+            </a:r>
+            <a:r>
+              <a:rPr lang="en-US" dirty="0"/>
+              <a:t>::</a:t>
+            </a:r>
+            <a:r>
+              <a:rPr lang="en-US" dirty="0" err="1" smtClean="0">
+                <a:solidFill>
+                  <a:srgbClr val="7F0055"/>
+                </a:solidFill>
+              </a:rPr>
+              <a:t>ostream</a:t>
+            </a:r>
+            <a:r>
+              <a:rPr lang="en-US" dirty="0" smtClean="0"/>
+              <a:t>&amp; </a:t>
+            </a:r>
+            <a:r>
+              <a:rPr lang="en-US" dirty="0"/>
+              <a:t>out</a:t>
+            </a:r>
+            <a:r>
+              <a:rPr lang="en-US" dirty="0" smtClean="0"/>
+              <a:t>) {</a:t>
+            </a:r>
+          </a:p>
+          <a:p>
+            <a:pPr marL="342900" indent="-342900"/>
+            <a:r>
+              <a:rPr lang="en-US" dirty="0"/>
+              <a:t> </a:t>
+            </a:r>
+            <a:r>
+              <a:rPr lang="en-US" dirty="0" smtClean="0"/>
+              <a:t> out </a:t>
+            </a:r>
+            <a:r>
+              <a:rPr lang="en-US" dirty="0"/>
+              <a:t>&lt;&lt; </a:t>
+            </a:r>
+            <a:r>
+              <a:rPr lang="en-US" dirty="0">
+                <a:solidFill>
+                  <a:srgbClr val="2A00FF"/>
+                </a:solidFill>
+              </a:rPr>
+              <a:t>"Free function\n</a:t>
+            </a:r>
+            <a:r>
+              <a:rPr lang="en-US" dirty="0" smtClean="0">
+                <a:solidFill>
+                  <a:srgbClr val="2A00FF"/>
+                </a:solidFill>
+              </a:rPr>
+              <a:t>"</a:t>
+            </a:r>
+            <a:r>
+              <a:rPr lang="en-US" dirty="0" smtClean="0"/>
+              <a:t>;</a:t>
+            </a:r>
+          </a:p>
+          <a:p>
+            <a:pPr marL="342900" indent="-342900"/>
+            <a:r>
+              <a:rPr lang="en-US" dirty="0" smtClean="0"/>
+              <a:t>}</a:t>
+            </a:r>
+            <a:endParaRPr lang="en-US" dirty="0" smtClean="0">
+              <a:cs typeface="Courier New" panose="02070309020205020404" pitchFamily="49" charset="0"/>
+            </a:endParaRPr>
+          </a:p>
+        </p:txBody>
+      </p:sp>
+      <p:sp>
+        <p:nvSpPr>
+          <p:cNvPr id="4" name="Slide Number Placeholder 3"/>
+          <p:cNvSpPr>
+            <a:spLocks noGrp="1"/>
+          </p:cNvSpPr>
+          <p:nvPr>
+            <p:ph type="sldNum" sz="quarter" idx="12"/>
+          </p:nvPr>
+        </p:nvSpPr>
+        <p:spPr/>
+        <p:txBody>
+          <a:bodyPr/>
+          <a:lstStyle/>
+          <a:p>
+            <a:fld id="{6DA12B36-9664-4CB0-8B2E-F4A2F44AE97E}" type="slidenum">
+              <a:rPr lang="en-US" smtClean="0"/>
+              <a:t>13</a:t>
+            </a:fld>
+            <a:endParaRPr lang="en-US"/>
+          </a:p>
+        </p:txBody>
+      </p:sp>
+    </p:spTree>
+    <p:extLst>
+      <p:ext uri="{BB962C8B-B14F-4D97-AF65-F5344CB8AC3E}">
+        <p14:creationId xmlns:p14="http://schemas.microsoft.com/office/powerpoint/2010/main" val="2896668148"/>
       </p:ext>
     </p:extLst>
   </p:cSld>

</xml_diff>

<commit_message>
Add information about thread argument passing and thread stopping.
</commit_message>
<xml_diff>
--- a/Lectures/Threads/Threads.pptx
+++ b/Lectures/Threads/Threads.pptx
@@ -5,7 +5,7 @@
     <p:sldMasterId id="2147483660" r:id="rId1"/>
   </p:sldMasterIdLst>
   <p:notesMasterIdLst>
-    <p:notesMasterId r:id="rId15"/>
+    <p:notesMasterId r:id="rId27"/>
   </p:notesMasterIdLst>
   <p:sldIdLst>
     <p:sldId id="256" r:id="rId2"/>
@@ -21,6 +21,18 @@
     <p:sldId id="266" r:id="rId12"/>
     <p:sldId id="267" r:id="rId13"/>
     <p:sldId id="268" r:id="rId14"/>
+    <p:sldId id="269" r:id="rId15"/>
+    <p:sldId id="270" r:id="rId16"/>
+    <p:sldId id="271" r:id="rId17"/>
+    <p:sldId id="272" r:id="rId18"/>
+    <p:sldId id="273" r:id="rId19"/>
+    <p:sldId id="274" r:id="rId20"/>
+    <p:sldId id="275" r:id="rId21"/>
+    <p:sldId id="276" r:id="rId22"/>
+    <p:sldId id="277" r:id="rId23"/>
+    <p:sldId id="278" r:id="rId24"/>
+    <p:sldId id="279" r:id="rId25"/>
+    <p:sldId id="280" r:id="rId26"/>
   </p:sldIdLst>
   <p:sldSz cx="9144000" cy="6858000" type="screen4x3"/>
   <p:notesSz cx="6858000" cy="9144000"/>
@@ -204,7 +216,7 @@
           <a:p>
             <a:fld id="{DBE0ECA1-3FBF-48AE-AD2A-4439AE745E19}" type="datetimeFigureOut">
               <a:rPr lang="en-US" smtClean="0"/>
-              <a:t>10/31/2013</a:t>
+              <a:t>11/1/2013</a:t>
             </a:fld>
             <a:endParaRPr lang="en-US"/>
           </a:p>
@@ -665,7 +677,7 @@
           <a:p>
             <a:fld id="{9769DED8-28D4-45B9-A00F-7CFE9335FEA6}" type="datetime1">
               <a:rPr lang="en-US" smtClean="0"/>
-              <a:t>10/31/2013</a:t>
+              <a:t>11/1/2013</a:t>
             </a:fld>
             <a:endParaRPr lang="en-US"/>
           </a:p>
@@ -930,7 +942,7 @@
           <a:p>
             <a:fld id="{2DB3D439-1F88-44B4-B5F7-F9BCD4064257}" type="datetime1">
               <a:rPr lang="en-US" smtClean="0"/>
-              <a:t>10/31/2013</a:t>
+              <a:t>11/1/2013</a:t>
             </a:fld>
             <a:endParaRPr lang="en-US"/>
           </a:p>
@@ -1105,7 +1117,7 @@
           <a:p>
             <a:fld id="{99C5638F-6F55-4055-935C-67841BE78C36}" type="datetime1">
               <a:rPr lang="en-US" smtClean="0"/>
-              <a:t>10/31/2013</a:t>
+              <a:t>11/1/2013</a:t>
             </a:fld>
             <a:endParaRPr lang="en-US"/>
           </a:p>
@@ -1270,7 +1282,7 @@
           <a:p>
             <a:fld id="{E6987D90-0C92-4B22-A29D-FED15412CED2}" type="datetime1">
               <a:rPr lang="en-US" smtClean="0"/>
-              <a:t>10/31/2013</a:t>
+              <a:t>11/1/2013</a:t>
             </a:fld>
             <a:endParaRPr lang="en-US"/>
           </a:p>
@@ -1519,7 +1531,7 @@
           <a:p>
             <a:fld id="{DDB67BC4-9554-49E0-BCB3-D1EF965BA0B8}" type="datetime1">
               <a:rPr lang="en-US" smtClean="0"/>
-              <a:t>10/31/2013</a:t>
+              <a:t>11/1/2013</a:t>
             </a:fld>
             <a:endParaRPr lang="en-US"/>
           </a:p>
@@ -1802,7 +1814,7 @@
           <a:p>
             <a:fld id="{EC24D770-803D-4E01-921C-9C100DD8230C}" type="datetime1">
               <a:rPr lang="en-US" smtClean="0"/>
-              <a:t>10/31/2013</a:t>
+              <a:t>11/1/2013</a:t>
             </a:fld>
             <a:endParaRPr lang="en-US"/>
           </a:p>
@@ -2241,7 +2253,7 @@
           <a:p>
             <a:fld id="{356AD44B-78A4-4209-8070-7DCBE2DC4992}" type="datetime1">
               <a:rPr lang="en-US" smtClean="0"/>
-              <a:t>10/31/2013</a:t>
+              <a:t>11/1/2013</a:t>
             </a:fld>
             <a:endParaRPr lang="en-US"/>
           </a:p>
@@ -2354,7 +2366,7 @@
           <a:p>
             <a:fld id="{A993C59A-7CA2-467F-B7F1-9096881A01B8}" type="datetime1">
               <a:rPr lang="en-US" smtClean="0"/>
-              <a:t>10/31/2013</a:t>
+              <a:t>11/1/2013</a:t>
             </a:fld>
             <a:endParaRPr lang="en-US"/>
           </a:p>
@@ -2444,7 +2456,7 @@
           <a:p>
             <a:fld id="{2B6B58D0-2488-434A-8ED1-692E09B85CC5}" type="datetime1">
               <a:rPr lang="en-US" smtClean="0"/>
-              <a:t>10/31/2013</a:t>
+              <a:t>11/1/2013</a:t>
             </a:fld>
             <a:endParaRPr lang="en-US"/>
           </a:p>
@@ -2686,7 +2698,7 @@
           <a:p>
             <a:fld id="{FDB0AFC2-7D64-4F61-A7B7-9932D3305DDA}" type="datetime1">
               <a:rPr lang="en-US" smtClean="0"/>
-              <a:t>10/31/2013</a:t>
+              <a:t>11/1/2013</a:t>
             </a:fld>
             <a:endParaRPr lang="en-US"/>
           </a:p>
@@ -2980,7 +2992,7 @@
           <a:p>
             <a:fld id="{4983D17A-D7B2-4ECE-8A2C-93679B9D177B}" type="datetime1">
               <a:rPr lang="en-US" smtClean="0"/>
-              <a:t>10/31/2013</a:t>
+              <a:t>11/1/2013</a:t>
             </a:fld>
             <a:endParaRPr lang="en-US"/>
           </a:p>
@@ -3274,7 +3286,7 @@
           <a:p>
             <a:fld id="{2A5275F7-419E-4C23-8A3D-2EE5742B2EC9}" type="datetime1">
               <a:rPr lang="en-US" smtClean="0"/>
-              <a:t>10/31/2013</a:t>
+              <a:t>11/1/2013</a:t>
             </a:fld>
             <a:endParaRPr lang="en-US"/>
           </a:p>
@@ -4005,6 +4017,13 @@
   <p:clrMapOvr>
     <a:masterClrMapping/>
   </p:clrMapOvr>
+  <p:timing>
+    <p:tnLst>
+      <p:par>
+        <p:cTn id="1" dur="indefinite" restart="never" nodeType="tmRoot"/>
+      </p:par>
+    </p:tnLst>
+  </p:timing>
 </p:sld>
 </file>
 
@@ -4122,11 +4141,7 @@
             <a:pPr marL="800100" lvl="1" indent="-342900"/>
             <a:r>
               <a:rPr lang="en-US" dirty="0" smtClean="0"/>
-              <a:t>Lambda </a:t>
-            </a:r>
-            <a:r>
-              <a:rPr lang="en-US" dirty="0" smtClean="0"/>
-              <a:t>expression</a:t>
+              <a:t>Lambda expression</a:t>
             </a:r>
           </a:p>
           <a:p>
@@ -4210,6 +4225,13 @@
   <p:clrMapOvr>
     <a:masterClrMapping/>
   </p:clrMapOvr>
+  <p:timing>
+    <p:tnLst>
+      <p:par>
+        <p:cTn id="1" dur="indefinite" restart="never" nodeType="tmRoot"/>
+      </p:par>
+    </p:tnLst>
+  </p:timing>
 </p:sld>
 </file>
 
@@ -4316,6 +4338,13 @@
   <p:clrMapOvr>
     <a:masterClrMapping/>
   </p:clrMapOvr>
+  <p:timing>
+    <p:tnLst>
+      <p:par>
+        <p:cTn id="1" dur="indefinite" restart="never" nodeType="tmRoot"/>
+      </p:par>
+    </p:tnLst>
+  </p:timing>
 </p:sld>
 </file>
 
@@ -4566,27 +4595,44 @@
                 <a:solidFill>
                   <a:srgbClr val="7F0055"/>
                 </a:solidFill>
+                <a:latin typeface="Courier New" panose="02070309020205020404" pitchFamily="49" charset="0"/>
+                <a:cs typeface="Courier New" panose="02070309020205020404" pitchFamily="49" charset="0"/>
               </a:rPr>
               <a:t>void</a:t>
             </a:r>
             <a:r>
-              <a:rPr lang="en-US" dirty="0" smtClean="0"/>
+              <a:rPr lang="en-US" dirty="0" smtClean="0">
+                <a:latin typeface="Courier New" panose="02070309020205020404" pitchFamily="49" charset="0"/>
+                <a:cs typeface="Courier New" panose="02070309020205020404" pitchFamily="49" charset="0"/>
+              </a:rPr>
               <a:t> </a:t>
             </a:r>
             <a:r>
-              <a:rPr lang="en-US" dirty="0" err="1"/>
+              <a:rPr lang="en-US" dirty="0" err="1">
+                <a:latin typeface="Courier New" panose="02070309020205020404" pitchFamily="49" charset="0"/>
+                <a:cs typeface="Courier New" panose="02070309020205020404" pitchFamily="49" charset="0"/>
+              </a:rPr>
               <a:t>free_function</a:t>
             </a:r>
             <a:r>
-              <a:rPr lang="en-US" dirty="0"/>
+              <a:rPr lang="en-US" dirty="0">
+                <a:latin typeface="Courier New" panose="02070309020205020404" pitchFamily="49" charset="0"/>
+                <a:cs typeface="Courier New" panose="02070309020205020404" pitchFamily="49" charset="0"/>
+              </a:rPr>
               <a:t>(</a:t>
             </a:r>
             <a:r>
-              <a:rPr lang="en-US" dirty="0" err="1"/>
+              <a:rPr lang="en-US" dirty="0" err="1">
+                <a:latin typeface="Courier New" panose="02070309020205020404" pitchFamily="49" charset="0"/>
+                <a:cs typeface="Courier New" panose="02070309020205020404" pitchFamily="49" charset="0"/>
+              </a:rPr>
               <a:t>std</a:t>
             </a:r>
             <a:r>
-              <a:rPr lang="en-US" dirty="0"/>
+              <a:rPr lang="en-US" dirty="0">
+                <a:latin typeface="Courier New" panose="02070309020205020404" pitchFamily="49" charset="0"/>
+                <a:cs typeface="Courier New" panose="02070309020205020404" pitchFamily="49" charset="0"/>
+              </a:rPr>
               <a:t>::</a:t>
             </a:r>
             <a:r>
@@ -4594,34 +4640,54 @@
                 <a:solidFill>
                   <a:srgbClr val="7F0055"/>
                 </a:solidFill>
+                <a:latin typeface="Courier New" panose="02070309020205020404" pitchFamily="49" charset="0"/>
+                <a:cs typeface="Courier New" panose="02070309020205020404" pitchFamily="49" charset="0"/>
               </a:rPr>
               <a:t>ostream</a:t>
             </a:r>
             <a:r>
-              <a:rPr lang="en-US" dirty="0" smtClean="0"/>
+              <a:rPr lang="en-US" dirty="0" smtClean="0">
+                <a:latin typeface="Courier New" panose="02070309020205020404" pitchFamily="49" charset="0"/>
+                <a:cs typeface="Courier New" panose="02070309020205020404" pitchFamily="49" charset="0"/>
+              </a:rPr>
               <a:t>&amp; </a:t>
             </a:r>
             <a:r>
-              <a:rPr lang="en-US" dirty="0"/>
+              <a:rPr lang="en-US" dirty="0">
+                <a:latin typeface="Courier New" panose="02070309020205020404" pitchFamily="49" charset="0"/>
+                <a:cs typeface="Courier New" panose="02070309020205020404" pitchFamily="49" charset="0"/>
+              </a:rPr>
               <a:t>out</a:t>
             </a:r>
             <a:r>
-              <a:rPr lang="en-US" dirty="0" smtClean="0"/>
+              <a:rPr lang="en-US" dirty="0" smtClean="0">
+                <a:latin typeface="Courier New" panose="02070309020205020404" pitchFamily="49" charset="0"/>
+                <a:cs typeface="Courier New" panose="02070309020205020404" pitchFamily="49" charset="0"/>
+              </a:rPr>
               <a:t>) {</a:t>
             </a:r>
           </a:p>
           <a:p>
             <a:pPr marL="342900" indent="-342900"/>
             <a:r>
-              <a:rPr lang="en-US" dirty="0"/>
+              <a:rPr lang="en-US" dirty="0">
+                <a:latin typeface="Courier New" panose="02070309020205020404" pitchFamily="49" charset="0"/>
+                <a:cs typeface="Courier New" panose="02070309020205020404" pitchFamily="49" charset="0"/>
+              </a:rPr>
               <a:t> </a:t>
             </a:r>
             <a:r>
-              <a:rPr lang="en-US" dirty="0" smtClean="0"/>
+              <a:rPr lang="en-US" dirty="0" smtClean="0">
+                <a:latin typeface="Courier New" panose="02070309020205020404" pitchFamily="49" charset="0"/>
+                <a:cs typeface="Courier New" panose="02070309020205020404" pitchFamily="49" charset="0"/>
+              </a:rPr>
               <a:t> out </a:t>
             </a:r>
             <a:r>
-              <a:rPr lang="en-US" dirty="0"/>
+              <a:rPr lang="en-US" dirty="0">
+                <a:latin typeface="Courier New" panose="02070309020205020404" pitchFamily="49" charset="0"/>
+                <a:cs typeface="Courier New" panose="02070309020205020404" pitchFamily="49" charset="0"/>
+              </a:rPr>
               <a:t>&lt;&lt; </a:t>
             </a:r>
             <a:r>
@@ -4629,6 +4695,8 @@
                 <a:solidFill>
                   <a:srgbClr val="2A00FF"/>
                 </a:solidFill>
+                <a:latin typeface="Courier New" panose="02070309020205020404" pitchFamily="49" charset="0"/>
+                <a:cs typeface="Courier New" panose="02070309020205020404" pitchFamily="49" charset="0"/>
               </a:rPr>
               <a:t>"Free function\n</a:t>
             </a:r>
@@ -4637,23 +4705,28 @@
                 <a:solidFill>
                   <a:srgbClr val="2A00FF"/>
                 </a:solidFill>
+                <a:latin typeface="Courier New" panose="02070309020205020404" pitchFamily="49" charset="0"/>
+                <a:cs typeface="Courier New" panose="02070309020205020404" pitchFamily="49" charset="0"/>
               </a:rPr>
               <a:t>"</a:t>
             </a:r>
             <a:r>
-              <a:rPr lang="en-US" dirty="0" smtClean="0"/>
+              <a:rPr lang="en-US" dirty="0" smtClean="0">
+                <a:latin typeface="Courier New" panose="02070309020205020404" pitchFamily="49" charset="0"/>
+                <a:cs typeface="Courier New" panose="02070309020205020404" pitchFamily="49" charset="0"/>
+              </a:rPr>
               <a:t>;</a:t>
             </a:r>
           </a:p>
           <a:p>
             <a:pPr marL="342900" indent="-342900"/>
             <a:r>
-              <a:rPr lang="en-US" dirty="0" smtClean="0"/>
+              <a:rPr lang="en-US" dirty="0" smtClean="0">
+                <a:latin typeface="Courier New" panose="02070309020205020404" pitchFamily="49" charset="0"/>
+                <a:cs typeface="Courier New" panose="02070309020205020404" pitchFamily="49" charset="0"/>
+              </a:rPr>
               <a:t>}</a:t>
             </a:r>
-            <a:endParaRPr lang="en-US" dirty="0" smtClean="0">
-              <a:cs typeface="Courier New" panose="02070309020205020404" pitchFamily="49" charset="0"/>
-            </a:endParaRPr>
           </a:p>
         </p:txBody>
       </p:sp>
@@ -4690,6 +4763,2554 @@
   <p:clrMapOvr>
     <a:masterClrMapping/>
   </p:clrMapOvr>
+  <p:timing>
+    <p:tnLst>
+      <p:par>
+        <p:cTn id="1" dur="indefinite" restart="never" nodeType="tmRoot"/>
+      </p:par>
+    </p:tnLst>
+  </p:timing>
+</p:sld>
+</file>
+
+<file path=ppt/slides/slide14.xml><?xml version="1.0" encoding="utf-8"?>
+<p:sld xmlns:a="http://schemas.openxmlformats.org/drawingml/2006/main" xmlns:r="http://schemas.openxmlformats.org/officeDocument/2006/relationships" xmlns:p="http://schemas.openxmlformats.org/presentationml/2006/main">
+  <p:cSld>
+    <p:spTree>
+      <p:nvGrpSpPr>
+        <p:cNvPr id="1" name=""/>
+        <p:cNvGrpSpPr/>
+        <p:nvPr/>
+      </p:nvGrpSpPr>
+      <p:grpSpPr>
+        <a:xfrm>
+          <a:off x="0" y="0"/>
+          <a:ext cx="0" cy="0"/>
+          <a:chOff x="0" y="0"/>
+          <a:chExt cx="0" cy="0"/>
+        </a:xfrm>
+      </p:grpSpPr>
+      <p:sp>
+        <p:nvSpPr>
+          <p:cNvPr id="2" name="Title 1"/>
+          <p:cNvSpPr>
+            <a:spLocks noGrp="1"/>
+          </p:cNvSpPr>
+          <p:nvPr>
+            <p:ph type="title"/>
+          </p:nvPr>
+        </p:nvSpPr>
+        <p:spPr/>
+        <p:txBody>
+          <a:bodyPr>
+            <a:normAutofit/>
+          </a:bodyPr>
+          <a:lstStyle/>
+          <a:p>
+            <a:r>
+              <a:rPr lang="en-US" dirty="0" smtClean="0"/>
+              <a:t>Passing arguments to a thread</a:t>
+            </a:r>
+            <a:endParaRPr lang="en-US" dirty="0"/>
+          </a:p>
+        </p:txBody>
+      </p:sp>
+      <p:sp>
+        <p:nvSpPr>
+          <p:cNvPr id="3" name="Content Placeholder 2"/>
+          <p:cNvSpPr>
+            <a:spLocks noGrp="1"/>
+          </p:cNvSpPr>
+          <p:nvPr>
+            <p:ph idx="1"/>
+          </p:nvPr>
+        </p:nvSpPr>
+        <p:spPr/>
+        <p:txBody>
+          <a:bodyPr/>
+          <a:lstStyle/>
+          <a:p>
+            <a:r>
+              <a:rPr lang="en-US" dirty="0" smtClean="0"/>
+              <a:t>Arguments passed to the </a:t>
+            </a:r>
+            <a:r>
+              <a:rPr lang="en-US" dirty="0" err="1" smtClean="0">
+                <a:latin typeface="Courier New" panose="02070309020205020404" pitchFamily="49" charset="0"/>
+                <a:cs typeface="Courier New" panose="02070309020205020404" pitchFamily="49" charset="0"/>
+              </a:rPr>
+              <a:t>std</a:t>
+            </a:r>
+            <a:r>
+              <a:rPr lang="en-US" dirty="0" smtClean="0">
+                <a:latin typeface="Courier New" panose="02070309020205020404" pitchFamily="49" charset="0"/>
+                <a:cs typeface="Courier New" panose="02070309020205020404" pitchFamily="49" charset="0"/>
+              </a:rPr>
+              <a:t>::thread</a:t>
+            </a:r>
+            <a:r>
+              <a:rPr lang="en-US" dirty="0" smtClean="0"/>
+              <a:t> constructor are forwarded to the callable object.</a:t>
+            </a:r>
+          </a:p>
+          <a:p>
+            <a:pPr marL="800100" lvl="1" indent="-342900"/>
+            <a:r>
+              <a:rPr lang="en-US" dirty="0" smtClean="0"/>
+              <a:t>Arguments are copied by default</a:t>
+            </a:r>
+          </a:p>
+          <a:p>
+            <a:pPr marL="800100" lvl="1" indent="-342900"/>
+            <a:r>
+              <a:rPr lang="en-US" dirty="0" smtClean="0"/>
+              <a:t>Consider the lifetime of the thread and the object</a:t>
+            </a:r>
+          </a:p>
+          <a:p>
+            <a:pPr marL="1485900" lvl="2" indent="-342900"/>
+            <a:r>
+              <a:rPr lang="en-US" dirty="0" smtClean="0"/>
+              <a:t>Argument passed by pointer</a:t>
+            </a:r>
+          </a:p>
+          <a:p>
+            <a:pPr marL="1485900" lvl="2" indent="-342900"/>
+            <a:r>
+              <a:rPr lang="en-US" dirty="0" smtClean="0"/>
+              <a:t>Argument passed by reference</a:t>
+            </a:r>
+          </a:p>
+          <a:p>
+            <a:pPr marL="800100" lvl="1" indent="-342900"/>
+            <a:r>
+              <a:rPr lang="en-US" dirty="0" smtClean="0"/>
+              <a:t>Consider automatic conversion of the argument</a:t>
+            </a:r>
+          </a:p>
+          <a:p>
+            <a:pPr marL="1485900" lvl="2" indent="-342900"/>
+            <a:r>
+              <a:rPr lang="en-US" dirty="0" smtClean="0"/>
+              <a:t>Object of type </a:t>
+            </a:r>
+            <a:r>
+              <a:rPr lang="en-US" dirty="0" err="1" smtClean="0">
+                <a:latin typeface="Courier New" panose="02070309020205020404" pitchFamily="49" charset="0"/>
+                <a:cs typeface="Courier New" panose="02070309020205020404" pitchFamily="49" charset="0"/>
+              </a:rPr>
+              <a:t>const</a:t>
+            </a:r>
+            <a:r>
+              <a:rPr lang="en-US" dirty="0" smtClean="0">
+                <a:latin typeface="Courier New" panose="02070309020205020404" pitchFamily="49" charset="0"/>
+                <a:cs typeface="Courier New" panose="02070309020205020404" pitchFamily="49" charset="0"/>
+              </a:rPr>
+              <a:t> char*</a:t>
+            </a:r>
+          </a:p>
+          <a:p>
+            <a:pPr marL="1485900" lvl="2" indent="-342900"/>
+            <a:r>
+              <a:rPr lang="en-US" dirty="0" smtClean="0">
+                <a:cs typeface="Courier New" panose="02070309020205020404" pitchFamily="49" charset="0"/>
+              </a:rPr>
+              <a:t>Argument is reference type</a:t>
+            </a:r>
+          </a:p>
+          <a:p>
+            <a:pPr marL="1485900" lvl="2" indent="-342900"/>
+            <a:r>
+              <a:rPr lang="en-US" dirty="0" smtClean="0">
+                <a:cs typeface="Courier New" panose="02070309020205020404" pitchFamily="49" charset="0"/>
+              </a:rPr>
+              <a:t>Object is movable, but not </a:t>
+            </a:r>
+            <a:r>
+              <a:rPr lang="en-US" dirty="0" err="1" smtClean="0">
+                <a:cs typeface="Courier New" panose="02070309020205020404" pitchFamily="49" charset="0"/>
+              </a:rPr>
+              <a:t>copyable</a:t>
+            </a:r>
+            <a:r>
+              <a:rPr lang="en-US" dirty="0" smtClean="0">
+                <a:cs typeface="Courier New" panose="02070309020205020404" pitchFamily="49" charset="0"/>
+              </a:rPr>
+              <a:t> type</a:t>
+            </a:r>
+            <a:endParaRPr lang="en-US" dirty="0">
+              <a:cs typeface="Courier New" panose="02070309020205020404" pitchFamily="49" charset="0"/>
+            </a:endParaRPr>
+          </a:p>
+        </p:txBody>
+      </p:sp>
+      <p:sp>
+        <p:nvSpPr>
+          <p:cNvPr id="4" name="Slide Number Placeholder 3"/>
+          <p:cNvSpPr>
+            <a:spLocks noGrp="1"/>
+          </p:cNvSpPr>
+          <p:nvPr>
+            <p:ph type="sldNum" sz="quarter" idx="12"/>
+          </p:nvPr>
+        </p:nvSpPr>
+        <p:spPr/>
+        <p:txBody>
+          <a:bodyPr/>
+          <a:lstStyle/>
+          <a:p>
+            <a:fld id="{6DA12B36-9664-4CB0-8B2E-F4A2F44AE97E}" type="slidenum">
+              <a:rPr lang="en-US" smtClean="0"/>
+              <a:t>14</a:t>
+            </a:fld>
+            <a:endParaRPr lang="en-US"/>
+          </a:p>
+        </p:txBody>
+      </p:sp>
+      <p:sp>
+        <p:nvSpPr>
+          <p:cNvPr id="5" name="Footer Placeholder 4"/>
+          <p:cNvSpPr>
+            <a:spLocks noGrp="1"/>
+          </p:cNvSpPr>
+          <p:nvPr>
+            <p:ph type="ftr" sz="quarter" idx="11"/>
+          </p:nvPr>
+        </p:nvSpPr>
+        <p:spPr/>
+        <p:txBody>
+          <a:bodyPr/>
+          <a:lstStyle/>
+          <a:p>
+            <a:r>
+              <a:rPr lang="en-US" smtClean="0"/>
+              <a:t>Source: Williams, Chapter 2</a:t>
+            </a:r>
+            <a:endParaRPr lang="en-US"/>
+          </a:p>
+        </p:txBody>
+      </p:sp>
+    </p:spTree>
+    <p:extLst>
+      <p:ext uri="{BB962C8B-B14F-4D97-AF65-F5344CB8AC3E}">
+        <p14:creationId xmlns:p14="http://schemas.microsoft.com/office/powerpoint/2010/main" val="3163633689"/>
+      </p:ext>
+    </p:extLst>
+  </p:cSld>
+  <p:clrMapOvr>
+    <a:masterClrMapping/>
+  </p:clrMapOvr>
+  <p:timing>
+    <p:tnLst>
+      <p:par>
+        <p:cTn id="1" dur="indefinite" restart="never" nodeType="tmRoot"/>
+      </p:par>
+    </p:tnLst>
+  </p:timing>
+</p:sld>
+</file>
+
+<file path=ppt/slides/slide15.xml><?xml version="1.0" encoding="utf-8"?>
+<p:sld xmlns:a="http://schemas.openxmlformats.org/drawingml/2006/main" xmlns:r="http://schemas.openxmlformats.org/officeDocument/2006/relationships" xmlns:p="http://schemas.openxmlformats.org/presentationml/2006/main">
+  <p:cSld>
+    <p:spTree>
+      <p:nvGrpSpPr>
+        <p:cNvPr id="1" name=""/>
+        <p:cNvGrpSpPr/>
+        <p:nvPr/>
+      </p:nvGrpSpPr>
+      <p:grpSpPr>
+        <a:xfrm>
+          <a:off x="0" y="0"/>
+          <a:ext cx="0" cy="0"/>
+          <a:chOff x="0" y="0"/>
+          <a:chExt cx="0" cy="0"/>
+        </a:xfrm>
+      </p:grpSpPr>
+      <p:sp>
+        <p:nvSpPr>
+          <p:cNvPr id="2" name="Title 1"/>
+          <p:cNvSpPr>
+            <a:spLocks noGrp="1"/>
+          </p:cNvSpPr>
+          <p:nvPr>
+            <p:ph type="title"/>
+          </p:nvPr>
+        </p:nvSpPr>
+        <p:spPr/>
+        <p:txBody>
+          <a:bodyPr/>
+          <a:lstStyle/>
+          <a:p>
+            <a:r>
+              <a:rPr lang="en-US" dirty="0" smtClean="0"/>
+              <a:t>Lifetime of arguments</a:t>
+            </a:r>
+            <a:endParaRPr lang="en-US" dirty="0"/>
+          </a:p>
+        </p:txBody>
+      </p:sp>
+      <p:sp>
+        <p:nvSpPr>
+          <p:cNvPr id="3" name="Content Placeholder 2"/>
+          <p:cNvSpPr>
+            <a:spLocks noGrp="1"/>
+          </p:cNvSpPr>
+          <p:nvPr>
+            <p:ph idx="1"/>
+          </p:nvPr>
+        </p:nvSpPr>
+        <p:spPr/>
+        <p:txBody>
+          <a:bodyPr>
+            <a:normAutofit lnSpcReduction="10000"/>
+          </a:bodyPr>
+          <a:lstStyle/>
+          <a:p>
+            <a:r>
+              <a:rPr lang="en-US" dirty="0" smtClean="0">
+                <a:cs typeface="Courier New" panose="02070309020205020404" pitchFamily="49" charset="0"/>
+              </a:rPr>
+              <a:t>No problem with this code:</a:t>
+            </a:r>
+          </a:p>
+          <a:p>
+            <a:r>
+              <a:rPr lang="en-US" dirty="0" smtClean="0">
+                <a:solidFill>
+                  <a:srgbClr val="7F0055"/>
+                </a:solidFill>
+                <a:latin typeface="Courier New" panose="02070309020205020404" pitchFamily="49" charset="0"/>
+                <a:cs typeface="Courier New" panose="02070309020205020404" pitchFamily="49" charset="0"/>
+              </a:rPr>
+              <a:t>void</a:t>
+            </a:r>
+            <a:r>
+              <a:rPr lang="en-US" dirty="0" smtClean="0">
+                <a:latin typeface="Courier New" panose="02070309020205020404" pitchFamily="49" charset="0"/>
+                <a:cs typeface="Courier New" panose="02070309020205020404" pitchFamily="49" charset="0"/>
+              </a:rPr>
+              <a:t> </a:t>
+            </a:r>
+            <a:r>
+              <a:rPr lang="en-US" dirty="0">
+                <a:latin typeface="Courier New" panose="02070309020205020404" pitchFamily="49" charset="0"/>
+                <a:cs typeface="Courier New" panose="02070309020205020404" pitchFamily="49" charset="0"/>
+              </a:rPr>
+              <a:t>f(</a:t>
+            </a:r>
+            <a:r>
+              <a:rPr lang="en-US" dirty="0" err="1">
+                <a:solidFill>
+                  <a:srgbClr val="7F0055"/>
+                </a:solidFill>
+                <a:latin typeface="Courier New" panose="02070309020205020404" pitchFamily="49" charset="0"/>
+                <a:cs typeface="Courier New" panose="02070309020205020404" pitchFamily="49" charset="0"/>
+              </a:rPr>
+              <a:t>int</a:t>
+            </a:r>
+            <a:r>
+              <a:rPr lang="en-US" dirty="0">
+                <a:latin typeface="Courier New" panose="02070309020205020404" pitchFamily="49" charset="0"/>
+                <a:cs typeface="Courier New" panose="02070309020205020404" pitchFamily="49" charset="0"/>
+              </a:rPr>
+              <a:t> </a:t>
+            </a:r>
+            <a:r>
+              <a:rPr lang="en-US" dirty="0" err="1">
+                <a:latin typeface="Courier New" panose="02070309020205020404" pitchFamily="49" charset="0"/>
+                <a:cs typeface="Courier New" panose="02070309020205020404" pitchFamily="49" charset="0"/>
+              </a:rPr>
+              <a:t>i</a:t>
+            </a:r>
+            <a:r>
+              <a:rPr lang="en-US" dirty="0">
+                <a:latin typeface="Courier New" panose="02070309020205020404" pitchFamily="49" charset="0"/>
+                <a:cs typeface="Courier New" panose="02070309020205020404" pitchFamily="49" charset="0"/>
+              </a:rPr>
+              <a:t>, </a:t>
+            </a:r>
+            <a:r>
+              <a:rPr lang="en-US" dirty="0" err="1">
+                <a:solidFill>
+                  <a:srgbClr val="7F0055"/>
+                </a:solidFill>
+                <a:latin typeface="Courier New" panose="02070309020205020404" pitchFamily="49" charset="0"/>
+                <a:cs typeface="Courier New" panose="02070309020205020404" pitchFamily="49" charset="0"/>
+              </a:rPr>
+              <a:t>const</a:t>
+            </a:r>
+            <a:r>
+              <a:rPr lang="en-US" dirty="0">
+                <a:latin typeface="Courier New" panose="02070309020205020404" pitchFamily="49" charset="0"/>
+                <a:cs typeface="Courier New" panose="02070309020205020404" pitchFamily="49" charset="0"/>
+              </a:rPr>
+              <a:t> </a:t>
+            </a:r>
+            <a:r>
+              <a:rPr lang="en-US" dirty="0">
+                <a:solidFill>
+                  <a:srgbClr val="7F0055"/>
+                </a:solidFill>
+                <a:latin typeface="Courier New" panose="02070309020205020404" pitchFamily="49" charset="0"/>
+                <a:cs typeface="Courier New" panose="02070309020205020404" pitchFamily="49" charset="0"/>
+              </a:rPr>
+              <a:t>char</a:t>
+            </a:r>
+            <a:r>
+              <a:rPr lang="en-US" dirty="0">
+                <a:latin typeface="Courier New" panose="02070309020205020404" pitchFamily="49" charset="0"/>
+                <a:cs typeface="Courier New" panose="02070309020205020404" pitchFamily="49" charset="0"/>
+              </a:rPr>
+              <a:t>* s</a:t>
+            </a:r>
+            <a:r>
+              <a:rPr lang="en-US" dirty="0" smtClean="0">
+                <a:latin typeface="Courier New" panose="02070309020205020404" pitchFamily="49" charset="0"/>
+                <a:cs typeface="Courier New" panose="02070309020205020404" pitchFamily="49" charset="0"/>
+              </a:rPr>
+              <a:t>);</a:t>
+            </a:r>
+          </a:p>
+          <a:p>
+            <a:r>
+              <a:rPr lang="en-US" dirty="0" err="1">
+                <a:latin typeface="Courier New" panose="02070309020205020404" pitchFamily="49" charset="0"/>
+                <a:cs typeface="Courier New" panose="02070309020205020404" pitchFamily="49" charset="0"/>
+              </a:rPr>
+              <a:t>std</a:t>
+            </a:r>
+            <a:r>
+              <a:rPr lang="en-US" dirty="0">
+                <a:latin typeface="Courier New" panose="02070309020205020404" pitchFamily="49" charset="0"/>
+                <a:cs typeface="Courier New" panose="02070309020205020404" pitchFamily="49" charset="0"/>
+              </a:rPr>
+              <a:t>::</a:t>
+            </a:r>
+            <a:r>
+              <a:rPr lang="en-US" dirty="0" smtClean="0">
+                <a:latin typeface="Courier New" panose="02070309020205020404" pitchFamily="49" charset="0"/>
+                <a:cs typeface="Courier New" panose="02070309020205020404" pitchFamily="49" charset="0"/>
+              </a:rPr>
+              <a:t>thread </a:t>
+            </a:r>
+            <a:r>
+              <a:rPr lang="en-US" dirty="0">
+                <a:latin typeface="Courier New" panose="02070309020205020404" pitchFamily="49" charset="0"/>
+                <a:cs typeface="Courier New" panose="02070309020205020404" pitchFamily="49" charset="0"/>
+              </a:rPr>
+              <a:t>t(f, 3, </a:t>
+            </a:r>
+            <a:r>
+              <a:rPr lang="en-US" dirty="0">
+                <a:solidFill>
+                  <a:srgbClr val="2A00FF"/>
+                </a:solidFill>
+                <a:latin typeface="Courier New" panose="02070309020205020404" pitchFamily="49" charset="0"/>
+                <a:cs typeface="Courier New" panose="02070309020205020404" pitchFamily="49" charset="0"/>
+              </a:rPr>
+              <a:t>"hello</a:t>
+            </a:r>
+            <a:r>
+              <a:rPr lang="en-US" dirty="0" smtClean="0">
+                <a:solidFill>
+                  <a:srgbClr val="2A00FF"/>
+                </a:solidFill>
+                <a:latin typeface="Courier New" panose="02070309020205020404" pitchFamily="49" charset="0"/>
+                <a:cs typeface="Courier New" panose="02070309020205020404" pitchFamily="49" charset="0"/>
+              </a:rPr>
+              <a:t>"</a:t>
+            </a:r>
+            <a:r>
+              <a:rPr lang="en-US" dirty="0" smtClean="0">
+                <a:latin typeface="Courier New" panose="02070309020205020404" pitchFamily="49" charset="0"/>
+                <a:cs typeface="Courier New" panose="02070309020205020404" pitchFamily="49" charset="0"/>
+              </a:rPr>
+              <a:t>);</a:t>
+            </a:r>
+          </a:p>
+          <a:p>
+            <a:r>
+              <a:rPr lang="en-US" dirty="0" smtClean="0">
+                <a:cs typeface="Courier New" panose="02070309020205020404" pitchFamily="49" charset="0"/>
+              </a:rPr>
+              <a:t>What is the problem with this code?</a:t>
+            </a:r>
+          </a:p>
+          <a:p>
+            <a:r>
+              <a:rPr lang="en-US" dirty="0" smtClean="0">
+                <a:solidFill>
+                  <a:srgbClr val="7F0055"/>
+                </a:solidFill>
+                <a:latin typeface="Courier New" panose="02070309020205020404" pitchFamily="49" charset="0"/>
+                <a:cs typeface="Courier New" panose="02070309020205020404" pitchFamily="49" charset="0"/>
+              </a:rPr>
+              <a:t>void</a:t>
+            </a:r>
+            <a:r>
+              <a:rPr lang="en-US" dirty="0" smtClean="0">
+                <a:latin typeface="Courier New" panose="02070309020205020404" pitchFamily="49" charset="0"/>
+                <a:cs typeface="Courier New" panose="02070309020205020404" pitchFamily="49" charset="0"/>
+              </a:rPr>
+              <a:t> oops(</a:t>
+            </a:r>
+            <a:r>
+              <a:rPr lang="en-US" dirty="0" err="1" smtClean="0">
+                <a:solidFill>
+                  <a:srgbClr val="7F0055"/>
+                </a:solidFill>
+                <a:latin typeface="Courier New" panose="02070309020205020404" pitchFamily="49" charset="0"/>
+                <a:cs typeface="Courier New" panose="02070309020205020404" pitchFamily="49" charset="0"/>
+              </a:rPr>
+              <a:t>int</a:t>
+            </a:r>
+            <a:r>
+              <a:rPr lang="en-US" dirty="0" smtClean="0">
+                <a:latin typeface="Courier New" panose="02070309020205020404" pitchFamily="49" charset="0"/>
+                <a:cs typeface="Courier New" panose="02070309020205020404" pitchFamily="49" charset="0"/>
+              </a:rPr>
+              <a:t> j) {</a:t>
+            </a:r>
+          </a:p>
+          <a:p>
+            <a:r>
+              <a:rPr lang="en-US" dirty="0" smtClean="0">
+                <a:solidFill>
+                  <a:srgbClr val="7F0055"/>
+                </a:solidFill>
+                <a:latin typeface="Courier New" panose="02070309020205020404" pitchFamily="49" charset="0"/>
+                <a:cs typeface="Courier New" panose="02070309020205020404" pitchFamily="49" charset="0"/>
+              </a:rPr>
+              <a:t>  char</a:t>
+            </a:r>
+            <a:r>
+              <a:rPr lang="en-US" dirty="0" smtClean="0">
+                <a:latin typeface="Courier New" panose="02070309020205020404" pitchFamily="49" charset="0"/>
+                <a:cs typeface="Courier New" panose="02070309020205020404" pitchFamily="49" charset="0"/>
+              </a:rPr>
+              <a:t> buffer[1024];</a:t>
+            </a:r>
+          </a:p>
+          <a:p>
+            <a:r>
+              <a:rPr lang="en-US" dirty="0" smtClean="0">
+                <a:solidFill>
+                  <a:srgbClr val="7F0055"/>
+                </a:solidFill>
+                <a:latin typeface="Courier New" panose="02070309020205020404" pitchFamily="49" charset="0"/>
+                <a:cs typeface="Courier New" panose="02070309020205020404" pitchFamily="49" charset="0"/>
+              </a:rPr>
+              <a:t>  </a:t>
+            </a:r>
+            <a:r>
+              <a:rPr lang="en-US" dirty="0" err="1" smtClean="0">
+                <a:solidFill>
+                  <a:srgbClr val="7F0055"/>
+                </a:solidFill>
+                <a:latin typeface="Courier New" panose="02070309020205020404" pitchFamily="49" charset="0"/>
+                <a:cs typeface="Courier New" panose="02070309020205020404" pitchFamily="49" charset="0"/>
+              </a:rPr>
+              <a:t>sprintf</a:t>
+            </a:r>
+            <a:r>
+              <a:rPr lang="en-US" dirty="0" smtClean="0">
+                <a:latin typeface="Courier New" panose="02070309020205020404" pitchFamily="49" charset="0"/>
+                <a:cs typeface="Courier New" panose="02070309020205020404" pitchFamily="49" charset="0"/>
+              </a:rPr>
+              <a:t>(buffer, </a:t>
+            </a:r>
+            <a:r>
+              <a:rPr lang="en-US" dirty="0" smtClean="0">
+                <a:solidFill>
+                  <a:srgbClr val="2A00FF"/>
+                </a:solidFill>
+                <a:latin typeface="Courier New" panose="02070309020205020404" pitchFamily="49" charset="0"/>
+                <a:cs typeface="Courier New" panose="02070309020205020404" pitchFamily="49" charset="0"/>
+              </a:rPr>
+              <a:t>"%</a:t>
+            </a:r>
+            <a:r>
+              <a:rPr lang="en-US" dirty="0" err="1" smtClean="0">
+                <a:solidFill>
+                  <a:srgbClr val="2A00FF"/>
+                </a:solidFill>
+                <a:latin typeface="Courier New" panose="02070309020205020404" pitchFamily="49" charset="0"/>
+                <a:cs typeface="Courier New" panose="02070309020205020404" pitchFamily="49" charset="0"/>
+              </a:rPr>
+              <a:t>i</a:t>
+            </a:r>
+            <a:r>
+              <a:rPr lang="en-US" dirty="0" smtClean="0">
+                <a:solidFill>
+                  <a:srgbClr val="2A00FF"/>
+                </a:solidFill>
+                <a:latin typeface="Courier New" panose="02070309020205020404" pitchFamily="49" charset="0"/>
+                <a:cs typeface="Courier New" panose="02070309020205020404" pitchFamily="49" charset="0"/>
+              </a:rPr>
+              <a:t>"</a:t>
+            </a:r>
+            <a:r>
+              <a:rPr lang="en-US" dirty="0" smtClean="0">
+                <a:latin typeface="Courier New" panose="02070309020205020404" pitchFamily="49" charset="0"/>
+                <a:cs typeface="Courier New" panose="02070309020205020404" pitchFamily="49" charset="0"/>
+              </a:rPr>
+              <a:t>, j);</a:t>
+            </a:r>
+          </a:p>
+          <a:p>
+            <a:r>
+              <a:rPr lang="en-US" dirty="0" smtClean="0">
+                <a:latin typeface="Courier New" panose="02070309020205020404" pitchFamily="49" charset="0"/>
+                <a:cs typeface="Courier New" panose="02070309020205020404" pitchFamily="49" charset="0"/>
+              </a:rPr>
+              <a:t>  </a:t>
+            </a:r>
+            <a:r>
+              <a:rPr lang="en-US" dirty="0" err="1" smtClean="0">
+                <a:latin typeface="Courier New" panose="02070309020205020404" pitchFamily="49" charset="0"/>
+                <a:cs typeface="Courier New" panose="02070309020205020404" pitchFamily="49" charset="0"/>
+              </a:rPr>
+              <a:t>std</a:t>
+            </a:r>
+            <a:r>
+              <a:rPr lang="en-US" dirty="0" smtClean="0">
+                <a:latin typeface="Courier New" panose="02070309020205020404" pitchFamily="49" charset="0"/>
+                <a:cs typeface="Courier New" panose="02070309020205020404" pitchFamily="49" charset="0"/>
+              </a:rPr>
+              <a:t>::thread t(f, 3, buffer);</a:t>
+            </a:r>
+          </a:p>
+          <a:p>
+            <a:r>
+              <a:rPr lang="en-US" dirty="0" smtClean="0">
+                <a:latin typeface="Courier New" panose="02070309020205020404" pitchFamily="49" charset="0"/>
+                <a:cs typeface="Courier New" panose="02070309020205020404" pitchFamily="49" charset="0"/>
+              </a:rPr>
+              <a:t>  </a:t>
+            </a:r>
+            <a:r>
+              <a:rPr lang="en-US" dirty="0" err="1" smtClean="0">
+                <a:latin typeface="Courier New" panose="02070309020205020404" pitchFamily="49" charset="0"/>
+                <a:cs typeface="Courier New" panose="02070309020205020404" pitchFamily="49" charset="0"/>
+              </a:rPr>
+              <a:t>t.detach</a:t>
+            </a:r>
+            <a:r>
+              <a:rPr lang="en-US" dirty="0" smtClean="0">
+                <a:latin typeface="Courier New" panose="02070309020205020404" pitchFamily="49" charset="0"/>
+                <a:cs typeface="Courier New" panose="02070309020205020404" pitchFamily="49" charset="0"/>
+              </a:rPr>
+              <a:t>();</a:t>
+            </a:r>
+          </a:p>
+          <a:p>
+            <a:r>
+              <a:rPr lang="en-US" dirty="0" smtClean="0">
+                <a:latin typeface="Courier New" panose="02070309020205020404" pitchFamily="49" charset="0"/>
+                <a:cs typeface="Courier New" panose="02070309020205020404" pitchFamily="49" charset="0"/>
+              </a:rPr>
+              <a:t>}</a:t>
+            </a:r>
+            <a:endParaRPr lang="en-US" dirty="0">
+              <a:latin typeface="Courier New" panose="02070309020205020404" pitchFamily="49" charset="0"/>
+              <a:cs typeface="Courier New" panose="02070309020205020404" pitchFamily="49" charset="0"/>
+            </a:endParaRPr>
+          </a:p>
+        </p:txBody>
+      </p:sp>
+      <p:sp>
+        <p:nvSpPr>
+          <p:cNvPr id="4" name="Slide Number Placeholder 3"/>
+          <p:cNvSpPr>
+            <a:spLocks noGrp="1"/>
+          </p:cNvSpPr>
+          <p:nvPr>
+            <p:ph type="sldNum" sz="quarter" idx="12"/>
+          </p:nvPr>
+        </p:nvSpPr>
+        <p:spPr/>
+        <p:txBody>
+          <a:bodyPr/>
+          <a:lstStyle/>
+          <a:p>
+            <a:fld id="{6DA12B36-9664-4CB0-8B2E-F4A2F44AE97E}" type="slidenum">
+              <a:rPr lang="en-US" smtClean="0"/>
+              <a:t>15</a:t>
+            </a:fld>
+            <a:endParaRPr lang="en-US"/>
+          </a:p>
+        </p:txBody>
+      </p:sp>
+      <p:sp>
+        <p:nvSpPr>
+          <p:cNvPr id="5" name="Footer Placeholder 4"/>
+          <p:cNvSpPr>
+            <a:spLocks noGrp="1"/>
+          </p:cNvSpPr>
+          <p:nvPr>
+            <p:ph type="ftr" sz="quarter" idx="11"/>
+          </p:nvPr>
+        </p:nvSpPr>
+        <p:spPr/>
+        <p:txBody>
+          <a:bodyPr/>
+          <a:lstStyle/>
+          <a:p>
+            <a:r>
+              <a:rPr lang="en-US" smtClean="0"/>
+              <a:t>Source: Williams, Chapter 2</a:t>
+            </a:r>
+            <a:endParaRPr lang="en-US"/>
+          </a:p>
+        </p:txBody>
+      </p:sp>
+    </p:spTree>
+    <p:extLst>
+      <p:ext uri="{BB962C8B-B14F-4D97-AF65-F5344CB8AC3E}">
+        <p14:creationId xmlns:p14="http://schemas.microsoft.com/office/powerpoint/2010/main" val="685214048"/>
+      </p:ext>
+    </p:extLst>
+  </p:cSld>
+  <p:clrMapOvr>
+    <a:masterClrMapping/>
+  </p:clrMapOvr>
+  <p:timing>
+    <p:tnLst>
+      <p:par>
+        <p:cTn id="1" dur="indefinite" restart="never" nodeType="tmRoot"/>
+      </p:par>
+    </p:tnLst>
+  </p:timing>
+</p:sld>
+</file>
+
+<file path=ppt/slides/slide16.xml><?xml version="1.0" encoding="utf-8"?>
+<p:sld xmlns:a="http://schemas.openxmlformats.org/drawingml/2006/main" xmlns:r="http://schemas.openxmlformats.org/officeDocument/2006/relationships" xmlns:p="http://schemas.openxmlformats.org/presentationml/2006/main">
+  <p:cSld>
+    <p:spTree>
+      <p:nvGrpSpPr>
+        <p:cNvPr id="1" name=""/>
+        <p:cNvGrpSpPr/>
+        <p:nvPr/>
+      </p:nvGrpSpPr>
+      <p:grpSpPr>
+        <a:xfrm>
+          <a:off x="0" y="0"/>
+          <a:ext cx="0" cy="0"/>
+          <a:chOff x="0" y="0"/>
+          <a:chExt cx="0" cy="0"/>
+        </a:xfrm>
+      </p:grpSpPr>
+      <p:sp>
+        <p:nvSpPr>
+          <p:cNvPr id="2" name="Title 1"/>
+          <p:cNvSpPr>
+            <a:spLocks noGrp="1"/>
+          </p:cNvSpPr>
+          <p:nvPr>
+            <p:ph type="title"/>
+          </p:nvPr>
+        </p:nvSpPr>
+        <p:spPr/>
+        <p:txBody>
+          <a:bodyPr/>
+          <a:lstStyle/>
+          <a:p>
+            <a:r>
+              <a:rPr lang="en-US" dirty="0" smtClean="0"/>
+              <a:t>Automatic conversion</a:t>
+            </a:r>
+            <a:endParaRPr lang="en-US" dirty="0"/>
+          </a:p>
+        </p:txBody>
+      </p:sp>
+      <p:sp>
+        <p:nvSpPr>
+          <p:cNvPr id="3" name="Content Placeholder 2"/>
+          <p:cNvSpPr>
+            <a:spLocks noGrp="1"/>
+          </p:cNvSpPr>
+          <p:nvPr>
+            <p:ph idx="1"/>
+          </p:nvPr>
+        </p:nvSpPr>
+        <p:spPr/>
+        <p:txBody>
+          <a:bodyPr/>
+          <a:lstStyle/>
+          <a:p>
+            <a:r>
+              <a:rPr lang="en-US" dirty="0" smtClean="0"/>
+              <a:t>Suppose instead we have this function:</a:t>
+            </a:r>
+          </a:p>
+          <a:p>
+            <a:r>
+              <a:rPr lang="en-US" dirty="0">
+                <a:solidFill>
+                  <a:srgbClr val="7F0055"/>
+                </a:solidFill>
+                <a:latin typeface="Courier New" panose="02070309020205020404" pitchFamily="49" charset="0"/>
+                <a:cs typeface="Courier New" panose="02070309020205020404" pitchFamily="49" charset="0"/>
+              </a:rPr>
+              <a:t>void</a:t>
+            </a:r>
+            <a:r>
+              <a:rPr lang="en-US" dirty="0">
+                <a:latin typeface="Courier New" panose="02070309020205020404" pitchFamily="49" charset="0"/>
+                <a:cs typeface="Courier New" panose="02070309020205020404" pitchFamily="49" charset="0"/>
+              </a:rPr>
+              <a:t> f(</a:t>
+            </a:r>
+            <a:r>
+              <a:rPr lang="en-US" dirty="0" err="1">
+                <a:solidFill>
+                  <a:srgbClr val="7F0055"/>
+                </a:solidFill>
+                <a:latin typeface="Courier New" panose="02070309020205020404" pitchFamily="49" charset="0"/>
+                <a:cs typeface="Courier New" panose="02070309020205020404" pitchFamily="49" charset="0"/>
+              </a:rPr>
+              <a:t>int</a:t>
+            </a:r>
+            <a:r>
+              <a:rPr lang="en-US" dirty="0">
+                <a:latin typeface="Courier New" panose="02070309020205020404" pitchFamily="49" charset="0"/>
+                <a:cs typeface="Courier New" panose="02070309020205020404" pitchFamily="49" charset="0"/>
+              </a:rPr>
+              <a:t> </a:t>
+            </a:r>
+            <a:r>
+              <a:rPr lang="en-US" dirty="0" err="1">
+                <a:latin typeface="Courier New" panose="02070309020205020404" pitchFamily="49" charset="0"/>
+                <a:cs typeface="Courier New" panose="02070309020205020404" pitchFamily="49" charset="0"/>
+              </a:rPr>
+              <a:t>i</a:t>
+            </a:r>
+            <a:r>
+              <a:rPr lang="en-US" dirty="0">
+                <a:latin typeface="Courier New" panose="02070309020205020404" pitchFamily="49" charset="0"/>
+                <a:cs typeface="Courier New" panose="02070309020205020404" pitchFamily="49" charset="0"/>
+              </a:rPr>
+              <a:t>, </a:t>
+            </a:r>
+            <a:r>
+              <a:rPr lang="en-US" dirty="0" err="1">
+                <a:solidFill>
+                  <a:srgbClr val="7F0055"/>
+                </a:solidFill>
+                <a:latin typeface="Courier New" panose="02070309020205020404" pitchFamily="49" charset="0"/>
+                <a:cs typeface="Courier New" panose="02070309020205020404" pitchFamily="49" charset="0"/>
+              </a:rPr>
+              <a:t>const</a:t>
+            </a:r>
+            <a:r>
+              <a:rPr lang="en-US" dirty="0">
+                <a:latin typeface="Courier New" panose="02070309020205020404" pitchFamily="49" charset="0"/>
+                <a:cs typeface="Courier New" panose="02070309020205020404" pitchFamily="49" charset="0"/>
+              </a:rPr>
+              <a:t> </a:t>
+            </a:r>
+            <a:r>
+              <a:rPr lang="en-US" dirty="0" err="1" smtClean="0">
+                <a:solidFill>
+                  <a:srgbClr val="7F0055"/>
+                </a:solidFill>
+                <a:latin typeface="Courier New" panose="02070309020205020404" pitchFamily="49" charset="0"/>
+                <a:cs typeface="Courier New" panose="02070309020205020404" pitchFamily="49" charset="0"/>
+              </a:rPr>
+              <a:t>std</a:t>
+            </a:r>
+            <a:r>
+              <a:rPr lang="en-US" dirty="0" smtClean="0">
+                <a:solidFill>
+                  <a:srgbClr val="7F0055"/>
+                </a:solidFill>
+                <a:latin typeface="Courier New" panose="02070309020205020404" pitchFamily="49" charset="0"/>
+                <a:cs typeface="Courier New" panose="02070309020205020404" pitchFamily="49" charset="0"/>
+              </a:rPr>
+              <a:t>::string</a:t>
+            </a:r>
+            <a:r>
+              <a:rPr lang="en-US" dirty="0" smtClean="0">
+                <a:latin typeface="Courier New" panose="02070309020205020404" pitchFamily="49" charset="0"/>
+                <a:cs typeface="Courier New" panose="02070309020205020404" pitchFamily="49" charset="0"/>
+              </a:rPr>
+              <a:t> </a:t>
+            </a:r>
+            <a:r>
+              <a:rPr lang="en-US" dirty="0">
+                <a:latin typeface="Courier New" panose="02070309020205020404" pitchFamily="49" charset="0"/>
+                <a:cs typeface="Courier New" panose="02070309020205020404" pitchFamily="49" charset="0"/>
+              </a:rPr>
+              <a:t>s</a:t>
+            </a:r>
+            <a:r>
+              <a:rPr lang="en-US" dirty="0" smtClean="0">
+                <a:latin typeface="Courier New" panose="02070309020205020404" pitchFamily="49" charset="0"/>
+                <a:cs typeface="Courier New" panose="02070309020205020404" pitchFamily="49" charset="0"/>
+              </a:rPr>
+              <a:t>);</a:t>
+            </a:r>
+          </a:p>
+          <a:p>
+            <a:r>
+              <a:rPr lang="en-US" dirty="0" smtClean="0">
+                <a:cs typeface="Courier New" panose="02070309020205020404" pitchFamily="49" charset="0"/>
+              </a:rPr>
+              <a:t>Is there still a problem?</a:t>
+            </a:r>
+          </a:p>
+          <a:p>
+            <a:r>
+              <a:rPr lang="en-US" dirty="0">
+                <a:solidFill>
+                  <a:srgbClr val="7F0055"/>
+                </a:solidFill>
+                <a:latin typeface="Courier New" panose="02070309020205020404" pitchFamily="49" charset="0"/>
+                <a:cs typeface="Courier New" panose="02070309020205020404" pitchFamily="49" charset="0"/>
+              </a:rPr>
+              <a:t>void</a:t>
+            </a:r>
+            <a:r>
+              <a:rPr lang="en-US" dirty="0">
+                <a:latin typeface="Courier New" panose="02070309020205020404" pitchFamily="49" charset="0"/>
+                <a:cs typeface="Courier New" panose="02070309020205020404" pitchFamily="49" charset="0"/>
+              </a:rPr>
+              <a:t> oops(</a:t>
+            </a:r>
+            <a:r>
+              <a:rPr lang="en-US" dirty="0" err="1">
+                <a:solidFill>
+                  <a:srgbClr val="7F0055"/>
+                </a:solidFill>
+                <a:latin typeface="Courier New" panose="02070309020205020404" pitchFamily="49" charset="0"/>
+                <a:cs typeface="Courier New" panose="02070309020205020404" pitchFamily="49" charset="0"/>
+              </a:rPr>
+              <a:t>int</a:t>
+            </a:r>
+            <a:r>
+              <a:rPr lang="en-US" dirty="0">
+                <a:latin typeface="Courier New" panose="02070309020205020404" pitchFamily="49" charset="0"/>
+                <a:cs typeface="Courier New" panose="02070309020205020404" pitchFamily="49" charset="0"/>
+              </a:rPr>
+              <a:t> j) {</a:t>
+            </a:r>
+          </a:p>
+          <a:p>
+            <a:r>
+              <a:rPr lang="en-US" dirty="0">
+                <a:solidFill>
+                  <a:srgbClr val="7F0055"/>
+                </a:solidFill>
+                <a:latin typeface="Courier New" panose="02070309020205020404" pitchFamily="49" charset="0"/>
+                <a:cs typeface="Courier New" panose="02070309020205020404" pitchFamily="49" charset="0"/>
+              </a:rPr>
+              <a:t>  char</a:t>
+            </a:r>
+            <a:r>
+              <a:rPr lang="en-US" dirty="0">
+                <a:latin typeface="Courier New" panose="02070309020205020404" pitchFamily="49" charset="0"/>
+                <a:cs typeface="Courier New" panose="02070309020205020404" pitchFamily="49" charset="0"/>
+              </a:rPr>
+              <a:t> buffer[1024];</a:t>
+            </a:r>
+          </a:p>
+          <a:p>
+            <a:r>
+              <a:rPr lang="en-US" dirty="0">
+                <a:solidFill>
+                  <a:srgbClr val="7F0055"/>
+                </a:solidFill>
+                <a:latin typeface="Courier New" panose="02070309020205020404" pitchFamily="49" charset="0"/>
+                <a:cs typeface="Courier New" panose="02070309020205020404" pitchFamily="49" charset="0"/>
+              </a:rPr>
+              <a:t>  </a:t>
+            </a:r>
+            <a:r>
+              <a:rPr lang="en-US" dirty="0" err="1">
+                <a:solidFill>
+                  <a:srgbClr val="7F0055"/>
+                </a:solidFill>
+                <a:latin typeface="Courier New" panose="02070309020205020404" pitchFamily="49" charset="0"/>
+                <a:cs typeface="Courier New" panose="02070309020205020404" pitchFamily="49" charset="0"/>
+              </a:rPr>
+              <a:t>sprintf</a:t>
+            </a:r>
+            <a:r>
+              <a:rPr lang="en-US" dirty="0">
+                <a:latin typeface="Courier New" panose="02070309020205020404" pitchFamily="49" charset="0"/>
+                <a:cs typeface="Courier New" panose="02070309020205020404" pitchFamily="49" charset="0"/>
+              </a:rPr>
+              <a:t>(buffer, </a:t>
+            </a:r>
+            <a:r>
+              <a:rPr lang="en-US" dirty="0">
+                <a:solidFill>
+                  <a:srgbClr val="2A00FF"/>
+                </a:solidFill>
+                <a:latin typeface="Courier New" panose="02070309020205020404" pitchFamily="49" charset="0"/>
+                <a:cs typeface="Courier New" panose="02070309020205020404" pitchFamily="49" charset="0"/>
+              </a:rPr>
+              <a:t>"%</a:t>
+            </a:r>
+            <a:r>
+              <a:rPr lang="en-US" dirty="0" err="1">
+                <a:solidFill>
+                  <a:srgbClr val="2A00FF"/>
+                </a:solidFill>
+                <a:latin typeface="Courier New" panose="02070309020205020404" pitchFamily="49" charset="0"/>
+                <a:cs typeface="Courier New" panose="02070309020205020404" pitchFamily="49" charset="0"/>
+              </a:rPr>
+              <a:t>i</a:t>
+            </a:r>
+            <a:r>
+              <a:rPr lang="en-US" dirty="0">
+                <a:solidFill>
+                  <a:srgbClr val="2A00FF"/>
+                </a:solidFill>
+                <a:latin typeface="Courier New" panose="02070309020205020404" pitchFamily="49" charset="0"/>
+                <a:cs typeface="Courier New" panose="02070309020205020404" pitchFamily="49" charset="0"/>
+              </a:rPr>
+              <a:t>"</a:t>
+            </a:r>
+            <a:r>
+              <a:rPr lang="en-US" dirty="0">
+                <a:latin typeface="Courier New" panose="02070309020205020404" pitchFamily="49" charset="0"/>
+                <a:cs typeface="Courier New" panose="02070309020205020404" pitchFamily="49" charset="0"/>
+              </a:rPr>
+              <a:t>, j);</a:t>
+            </a:r>
+          </a:p>
+          <a:p>
+            <a:r>
+              <a:rPr lang="en-US" dirty="0">
+                <a:latin typeface="Courier New" panose="02070309020205020404" pitchFamily="49" charset="0"/>
+                <a:cs typeface="Courier New" panose="02070309020205020404" pitchFamily="49" charset="0"/>
+              </a:rPr>
+              <a:t>  </a:t>
+            </a:r>
+            <a:r>
+              <a:rPr lang="en-US" dirty="0" err="1">
+                <a:latin typeface="Courier New" panose="02070309020205020404" pitchFamily="49" charset="0"/>
+                <a:cs typeface="Courier New" panose="02070309020205020404" pitchFamily="49" charset="0"/>
+              </a:rPr>
+              <a:t>std</a:t>
+            </a:r>
+            <a:r>
+              <a:rPr lang="en-US" dirty="0">
+                <a:latin typeface="Courier New" panose="02070309020205020404" pitchFamily="49" charset="0"/>
+                <a:cs typeface="Courier New" panose="02070309020205020404" pitchFamily="49" charset="0"/>
+              </a:rPr>
+              <a:t>::thread t(f, 3, buffer);</a:t>
+            </a:r>
+          </a:p>
+          <a:p>
+            <a:r>
+              <a:rPr lang="en-US" dirty="0">
+                <a:latin typeface="Courier New" panose="02070309020205020404" pitchFamily="49" charset="0"/>
+                <a:cs typeface="Courier New" panose="02070309020205020404" pitchFamily="49" charset="0"/>
+              </a:rPr>
+              <a:t>  </a:t>
+            </a:r>
+            <a:r>
+              <a:rPr lang="en-US" dirty="0" err="1">
+                <a:latin typeface="Courier New" panose="02070309020205020404" pitchFamily="49" charset="0"/>
+                <a:cs typeface="Courier New" panose="02070309020205020404" pitchFamily="49" charset="0"/>
+              </a:rPr>
+              <a:t>t.detach</a:t>
+            </a:r>
+            <a:r>
+              <a:rPr lang="en-US" dirty="0">
+                <a:latin typeface="Courier New" panose="02070309020205020404" pitchFamily="49" charset="0"/>
+                <a:cs typeface="Courier New" panose="02070309020205020404" pitchFamily="49" charset="0"/>
+              </a:rPr>
+              <a:t>();</a:t>
+            </a:r>
+          </a:p>
+          <a:p>
+            <a:r>
+              <a:rPr lang="en-US" dirty="0">
+                <a:latin typeface="Courier New" panose="02070309020205020404" pitchFamily="49" charset="0"/>
+                <a:cs typeface="Courier New" panose="02070309020205020404" pitchFamily="49" charset="0"/>
+              </a:rPr>
+              <a:t>}</a:t>
+            </a:r>
+          </a:p>
+          <a:p>
+            <a:endParaRPr lang="en-US" dirty="0">
+              <a:cs typeface="Courier New" panose="02070309020205020404" pitchFamily="49" charset="0"/>
+            </a:endParaRPr>
+          </a:p>
+          <a:p>
+            <a:endParaRPr lang="en-US" dirty="0"/>
+          </a:p>
+        </p:txBody>
+      </p:sp>
+      <p:sp>
+        <p:nvSpPr>
+          <p:cNvPr id="4" name="Slide Number Placeholder 3"/>
+          <p:cNvSpPr>
+            <a:spLocks noGrp="1"/>
+          </p:cNvSpPr>
+          <p:nvPr>
+            <p:ph type="sldNum" sz="quarter" idx="12"/>
+          </p:nvPr>
+        </p:nvSpPr>
+        <p:spPr/>
+        <p:txBody>
+          <a:bodyPr/>
+          <a:lstStyle/>
+          <a:p>
+            <a:fld id="{6DA12B36-9664-4CB0-8B2E-F4A2F44AE97E}" type="slidenum">
+              <a:rPr lang="en-US" smtClean="0"/>
+              <a:t>16</a:t>
+            </a:fld>
+            <a:endParaRPr lang="en-US"/>
+          </a:p>
+        </p:txBody>
+      </p:sp>
+      <p:sp>
+        <p:nvSpPr>
+          <p:cNvPr id="5" name="Footer Placeholder 4"/>
+          <p:cNvSpPr>
+            <a:spLocks noGrp="1"/>
+          </p:cNvSpPr>
+          <p:nvPr>
+            <p:ph type="ftr" sz="quarter" idx="11"/>
+          </p:nvPr>
+        </p:nvSpPr>
+        <p:spPr/>
+        <p:txBody>
+          <a:bodyPr/>
+          <a:lstStyle/>
+          <a:p>
+            <a:r>
+              <a:rPr lang="en-US" smtClean="0"/>
+              <a:t>Source: Williams, Chapter 2</a:t>
+            </a:r>
+            <a:endParaRPr lang="en-US"/>
+          </a:p>
+        </p:txBody>
+      </p:sp>
+    </p:spTree>
+    <p:extLst>
+      <p:ext uri="{BB962C8B-B14F-4D97-AF65-F5344CB8AC3E}">
+        <p14:creationId xmlns:p14="http://schemas.microsoft.com/office/powerpoint/2010/main" val="2448860951"/>
+      </p:ext>
+    </p:extLst>
+  </p:cSld>
+  <p:clrMapOvr>
+    <a:masterClrMapping/>
+  </p:clrMapOvr>
+  <p:timing>
+    <p:tnLst>
+      <p:par>
+        <p:cTn id="1" dur="indefinite" restart="never" nodeType="tmRoot"/>
+      </p:par>
+    </p:tnLst>
+  </p:timing>
+</p:sld>
+</file>
+
+<file path=ppt/slides/slide17.xml><?xml version="1.0" encoding="utf-8"?>
+<p:sld xmlns:a="http://schemas.openxmlformats.org/drawingml/2006/main" xmlns:r="http://schemas.openxmlformats.org/officeDocument/2006/relationships" xmlns:p="http://schemas.openxmlformats.org/presentationml/2006/main">
+  <p:cSld>
+    <p:spTree>
+      <p:nvGrpSpPr>
+        <p:cNvPr id="1" name=""/>
+        <p:cNvGrpSpPr/>
+        <p:nvPr/>
+      </p:nvGrpSpPr>
+      <p:grpSpPr>
+        <a:xfrm>
+          <a:off x="0" y="0"/>
+          <a:ext cx="0" cy="0"/>
+          <a:chOff x="0" y="0"/>
+          <a:chExt cx="0" cy="0"/>
+        </a:xfrm>
+      </p:grpSpPr>
+      <p:sp>
+        <p:nvSpPr>
+          <p:cNvPr id="2" name="Title 1"/>
+          <p:cNvSpPr>
+            <a:spLocks noGrp="1"/>
+          </p:cNvSpPr>
+          <p:nvPr>
+            <p:ph type="title"/>
+          </p:nvPr>
+        </p:nvSpPr>
+        <p:spPr/>
+        <p:txBody>
+          <a:bodyPr/>
+          <a:lstStyle/>
+          <a:p>
+            <a:r>
+              <a:rPr lang="en-US" dirty="0" smtClean="0"/>
+              <a:t>Use an explicit conversion</a:t>
+            </a:r>
+            <a:endParaRPr lang="en-US" dirty="0"/>
+          </a:p>
+        </p:txBody>
+      </p:sp>
+      <p:sp>
+        <p:nvSpPr>
+          <p:cNvPr id="3" name="Content Placeholder 2"/>
+          <p:cNvSpPr>
+            <a:spLocks noGrp="1"/>
+          </p:cNvSpPr>
+          <p:nvPr>
+            <p:ph idx="1"/>
+          </p:nvPr>
+        </p:nvSpPr>
+        <p:spPr/>
+        <p:txBody>
+          <a:bodyPr/>
+          <a:lstStyle/>
+          <a:p>
+            <a:r>
+              <a:rPr lang="en-US" dirty="0" smtClean="0"/>
+              <a:t>Correct the problem by explicitly converting the argument</a:t>
+            </a:r>
+          </a:p>
+          <a:p>
+            <a:r>
+              <a:rPr lang="en-US" dirty="0">
+                <a:solidFill>
+                  <a:srgbClr val="7F0055"/>
+                </a:solidFill>
+                <a:latin typeface="Courier New" panose="02070309020205020404" pitchFamily="49" charset="0"/>
+                <a:cs typeface="Courier New" panose="02070309020205020404" pitchFamily="49" charset="0"/>
+              </a:rPr>
+              <a:t>void</a:t>
+            </a:r>
+            <a:r>
+              <a:rPr lang="en-US" dirty="0">
+                <a:latin typeface="Courier New" panose="02070309020205020404" pitchFamily="49" charset="0"/>
+                <a:cs typeface="Courier New" panose="02070309020205020404" pitchFamily="49" charset="0"/>
+              </a:rPr>
+              <a:t> oops(</a:t>
+            </a:r>
+            <a:r>
+              <a:rPr lang="en-US" dirty="0" err="1">
+                <a:solidFill>
+                  <a:srgbClr val="7F0055"/>
+                </a:solidFill>
+                <a:latin typeface="Courier New" panose="02070309020205020404" pitchFamily="49" charset="0"/>
+                <a:cs typeface="Courier New" panose="02070309020205020404" pitchFamily="49" charset="0"/>
+              </a:rPr>
+              <a:t>int</a:t>
+            </a:r>
+            <a:r>
+              <a:rPr lang="en-US" dirty="0">
+                <a:latin typeface="Courier New" panose="02070309020205020404" pitchFamily="49" charset="0"/>
+                <a:cs typeface="Courier New" panose="02070309020205020404" pitchFamily="49" charset="0"/>
+              </a:rPr>
+              <a:t> j) {</a:t>
+            </a:r>
+          </a:p>
+          <a:p>
+            <a:r>
+              <a:rPr lang="en-US" dirty="0">
+                <a:solidFill>
+                  <a:srgbClr val="7F0055"/>
+                </a:solidFill>
+                <a:latin typeface="Courier New" panose="02070309020205020404" pitchFamily="49" charset="0"/>
+                <a:cs typeface="Courier New" panose="02070309020205020404" pitchFamily="49" charset="0"/>
+              </a:rPr>
+              <a:t>  char</a:t>
+            </a:r>
+            <a:r>
+              <a:rPr lang="en-US" dirty="0">
+                <a:latin typeface="Courier New" panose="02070309020205020404" pitchFamily="49" charset="0"/>
+                <a:cs typeface="Courier New" panose="02070309020205020404" pitchFamily="49" charset="0"/>
+              </a:rPr>
+              <a:t> buffer[1024];</a:t>
+            </a:r>
+          </a:p>
+          <a:p>
+            <a:r>
+              <a:rPr lang="en-US" dirty="0">
+                <a:solidFill>
+                  <a:srgbClr val="7F0055"/>
+                </a:solidFill>
+                <a:latin typeface="Courier New" panose="02070309020205020404" pitchFamily="49" charset="0"/>
+                <a:cs typeface="Courier New" panose="02070309020205020404" pitchFamily="49" charset="0"/>
+              </a:rPr>
+              <a:t>  </a:t>
+            </a:r>
+            <a:r>
+              <a:rPr lang="en-US" dirty="0" err="1">
+                <a:solidFill>
+                  <a:srgbClr val="7F0055"/>
+                </a:solidFill>
+                <a:latin typeface="Courier New" panose="02070309020205020404" pitchFamily="49" charset="0"/>
+                <a:cs typeface="Courier New" panose="02070309020205020404" pitchFamily="49" charset="0"/>
+              </a:rPr>
+              <a:t>sprintf</a:t>
+            </a:r>
+            <a:r>
+              <a:rPr lang="en-US" dirty="0">
+                <a:latin typeface="Courier New" panose="02070309020205020404" pitchFamily="49" charset="0"/>
+                <a:cs typeface="Courier New" panose="02070309020205020404" pitchFamily="49" charset="0"/>
+              </a:rPr>
+              <a:t>(buffer, </a:t>
+            </a:r>
+            <a:r>
+              <a:rPr lang="en-US" dirty="0">
+                <a:solidFill>
+                  <a:srgbClr val="2A00FF"/>
+                </a:solidFill>
+                <a:latin typeface="Courier New" panose="02070309020205020404" pitchFamily="49" charset="0"/>
+                <a:cs typeface="Courier New" panose="02070309020205020404" pitchFamily="49" charset="0"/>
+              </a:rPr>
+              <a:t>"%</a:t>
+            </a:r>
+            <a:r>
+              <a:rPr lang="en-US" dirty="0" err="1">
+                <a:solidFill>
+                  <a:srgbClr val="2A00FF"/>
+                </a:solidFill>
+                <a:latin typeface="Courier New" panose="02070309020205020404" pitchFamily="49" charset="0"/>
+                <a:cs typeface="Courier New" panose="02070309020205020404" pitchFamily="49" charset="0"/>
+              </a:rPr>
+              <a:t>i</a:t>
+            </a:r>
+            <a:r>
+              <a:rPr lang="en-US" dirty="0">
+                <a:solidFill>
+                  <a:srgbClr val="2A00FF"/>
+                </a:solidFill>
+                <a:latin typeface="Courier New" panose="02070309020205020404" pitchFamily="49" charset="0"/>
+                <a:cs typeface="Courier New" panose="02070309020205020404" pitchFamily="49" charset="0"/>
+              </a:rPr>
+              <a:t>"</a:t>
+            </a:r>
+            <a:r>
+              <a:rPr lang="en-US" dirty="0">
+                <a:latin typeface="Courier New" panose="02070309020205020404" pitchFamily="49" charset="0"/>
+                <a:cs typeface="Courier New" panose="02070309020205020404" pitchFamily="49" charset="0"/>
+              </a:rPr>
+              <a:t>, j);</a:t>
+            </a:r>
+          </a:p>
+          <a:p>
+            <a:r>
+              <a:rPr lang="en-US" dirty="0">
+                <a:latin typeface="Courier New" panose="02070309020205020404" pitchFamily="49" charset="0"/>
+                <a:cs typeface="Courier New" panose="02070309020205020404" pitchFamily="49" charset="0"/>
+              </a:rPr>
+              <a:t>  </a:t>
+            </a:r>
+            <a:r>
+              <a:rPr lang="en-US" dirty="0" err="1">
+                <a:latin typeface="Courier New" panose="02070309020205020404" pitchFamily="49" charset="0"/>
+                <a:cs typeface="Courier New" panose="02070309020205020404" pitchFamily="49" charset="0"/>
+              </a:rPr>
+              <a:t>std</a:t>
+            </a:r>
+            <a:r>
+              <a:rPr lang="en-US" dirty="0">
+                <a:latin typeface="Courier New" panose="02070309020205020404" pitchFamily="49" charset="0"/>
+                <a:cs typeface="Courier New" panose="02070309020205020404" pitchFamily="49" charset="0"/>
+              </a:rPr>
+              <a:t>::thread t(f, 3, </a:t>
+            </a:r>
+            <a:r>
+              <a:rPr lang="en-US" dirty="0" err="1" smtClean="0">
+                <a:solidFill>
+                  <a:schemeClr val="tx2"/>
+                </a:solidFill>
+                <a:latin typeface="Courier New" panose="02070309020205020404" pitchFamily="49" charset="0"/>
+                <a:cs typeface="Courier New" panose="02070309020205020404" pitchFamily="49" charset="0"/>
+              </a:rPr>
+              <a:t>std</a:t>
+            </a:r>
+            <a:r>
+              <a:rPr lang="en-US" dirty="0" smtClean="0">
+                <a:solidFill>
+                  <a:schemeClr val="tx2"/>
+                </a:solidFill>
+                <a:latin typeface="Courier New" panose="02070309020205020404" pitchFamily="49" charset="0"/>
+                <a:cs typeface="Courier New" panose="02070309020205020404" pitchFamily="49" charset="0"/>
+              </a:rPr>
+              <a:t>::string(buffer)</a:t>
+            </a:r>
+            <a:r>
+              <a:rPr lang="en-US" dirty="0" smtClean="0">
+                <a:latin typeface="Courier New" panose="02070309020205020404" pitchFamily="49" charset="0"/>
+                <a:cs typeface="Courier New" panose="02070309020205020404" pitchFamily="49" charset="0"/>
+              </a:rPr>
+              <a:t>);</a:t>
+            </a:r>
+            <a:endParaRPr lang="en-US" dirty="0">
+              <a:latin typeface="Courier New" panose="02070309020205020404" pitchFamily="49" charset="0"/>
+              <a:cs typeface="Courier New" panose="02070309020205020404" pitchFamily="49" charset="0"/>
+            </a:endParaRPr>
+          </a:p>
+          <a:p>
+            <a:r>
+              <a:rPr lang="en-US" dirty="0">
+                <a:latin typeface="Courier New" panose="02070309020205020404" pitchFamily="49" charset="0"/>
+                <a:cs typeface="Courier New" panose="02070309020205020404" pitchFamily="49" charset="0"/>
+              </a:rPr>
+              <a:t>  </a:t>
+            </a:r>
+            <a:r>
+              <a:rPr lang="en-US" dirty="0" err="1">
+                <a:latin typeface="Courier New" panose="02070309020205020404" pitchFamily="49" charset="0"/>
+                <a:cs typeface="Courier New" panose="02070309020205020404" pitchFamily="49" charset="0"/>
+              </a:rPr>
+              <a:t>t.detach</a:t>
+            </a:r>
+            <a:r>
+              <a:rPr lang="en-US" dirty="0">
+                <a:latin typeface="Courier New" panose="02070309020205020404" pitchFamily="49" charset="0"/>
+                <a:cs typeface="Courier New" panose="02070309020205020404" pitchFamily="49" charset="0"/>
+              </a:rPr>
+              <a:t>();</a:t>
+            </a:r>
+          </a:p>
+          <a:p>
+            <a:r>
+              <a:rPr lang="en-US" dirty="0">
+                <a:latin typeface="Courier New" panose="02070309020205020404" pitchFamily="49" charset="0"/>
+                <a:cs typeface="Courier New" panose="02070309020205020404" pitchFamily="49" charset="0"/>
+              </a:rPr>
+              <a:t>}</a:t>
+            </a:r>
+          </a:p>
+          <a:p>
+            <a:endParaRPr lang="en-US" dirty="0"/>
+          </a:p>
+        </p:txBody>
+      </p:sp>
+      <p:sp>
+        <p:nvSpPr>
+          <p:cNvPr id="4" name="Slide Number Placeholder 3"/>
+          <p:cNvSpPr>
+            <a:spLocks noGrp="1"/>
+          </p:cNvSpPr>
+          <p:nvPr>
+            <p:ph type="sldNum" sz="quarter" idx="12"/>
+          </p:nvPr>
+        </p:nvSpPr>
+        <p:spPr/>
+        <p:txBody>
+          <a:bodyPr/>
+          <a:lstStyle/>
+          <a:p>
+            <a:fld id="{6DA12B36-9664-4CB0-8B2E-F4A2F44AE97E}" type="slidenum">
+              <a:rPr lang="en-US" smtClean="0"/>
+              <a:t>17</a:t>
+            </a:fld>
+            <a:endParaRPr lang="en-US"/>
+          </a:p>
+        </p:txBody>
+      </p:sp>
+      <p:sp>
+        <p:nvSpPr>
+          <p:cNvPr id="5" name="Footer Placeholder 4"/>
+          <p:cNvSpPr>
+            <a:spLocks noGrp="1"/>
+          </p:cNvSpPr>
+          <p:nvPr>
+            <p:ph type="ftr" sz="quarter" idx="11"/>
+          </p:nvPr>
+        </p:nvSpPr>
+        <p:spPr/>
+        <p:txBody>
+          <a:bodyPr/>
+          <a:lstStyle/>
+          <a:p>
+            <a:r>
+              <a:rPr lang="en-US" smtClean="0"/>
+              <a:t>Source: Williams, Chapter 2</a:t>
+            </a:r>
+            <a:endParaRPr lang="en-US"/>
+          </a:p>
+        </p:txBody>
+      </p:sp>
+    </p:spTree>
+    <p:extLst>
+      <p:ext uri="{BB962C8B-B14F-4D97-AF65-F5344CB8AC3E}">
+        <p14:creationId xmlns:p14="http://schemas.microsoft.com/office/powerpoint/2010/main" val="2683838904"/>
+      </p:ext>
+    </p:extLst>
+  </p:cSld>
+  <p:clrMapOvr>
+    <a:masterClrMapping/>
+  </p:clrMapOvr>
+  <p:timing>
+    <p:tnLst>
+      <p:par>
+        <p:cTn id="1" dur="indefinite" restart="never" nodeType="tmRoot"/>
+      </p:par>
+    </p:tnLst>
+  </p:timing>
+</p:sld>
+</file>
+
+<file path=ppt/slides/slide18.xml><?xml version="1.0" encoding="utf-8"?>
+<p:sld xmlns:a="http://schemas.openxmlformats.org/drawingml/2006/main" xmlns:r="http://schemas.openxmlformats.org/officeDocument/2006/relationships" xmlns:p="http://schemas.openxmlformats.org/presentationml/2006/main">
+  <p:cSld>
+    <p:spTree>
+      <p:nvGrpSpPr>
+        <p:cNvPr id="1" name=""/>
+        <p:cNvGrpSpPr/>
+        <p:nvPr/>
+      </p:nvGrpSpPr>
+      <p:grpSpPr>
+        <a:xfrm>
+          <a:off x="0" y="0"/>
+          <a:ext cx="0" cy="0"/>
+          <a:chOff x="0" y="0"/>
+          <a:chExt cx="0" cy="0"/>
+        </a:xfrm>
+      </p:grpSpPr>
+      <p:sp>
+        <p:nvSpPr>
+          <p:cNvPr id="2" name="Title 1"/>
+          <p:cNvSpPr>
+            <a:spLocks noGrp="1"/>
+          </p:cNvSpPr>
+          <p:nvPr>
+            <p:ph type="title"/>
+          </p:nvPr>
+        </p:nvSpPr>
+        <p:spPr/>
+        <p:txBody>
+          <a:bodyPr>
+            <a:normAutofit fontScale="90000"/>
+          </a:bodyPr>
+          <a:lstStyle/>
+          <a:p>
+            <a:r>
+              <a:rPr lang="en-US" dirty="0" smtClean="0"/>
+              <a:t>Passing an argument by reference</a:t>
+            </a:r>
+            <a:endParaRPr lang="en-US" dirty="0"/>
+          </a:p>
+        </p:txBody>
+      </p:sp>
+      <p:sp>
+        <p:nvSpPr>
+          <p:cNvPr id="3" name="Content Placeholder 2"/>
+          <p:cNvSpPr>
+            <a:spLocks noGrp="1"/>
+          </p:cNvSpPr>
+          <p:nvPr>
+            <p:ph idx="1"/>
+          </p:nvPr>
+        </p:nvSpPr>
+        <p:spPr/>
+        <p:txBody>
+          <a:bodyPr/>
+          <a:lstStyle/>
+          <a:p>
+            <a:r>
+              <a:rPr lang="en-US" dirty="0" smtClean="0"/>
+              <a:t>If the argument is always copied, how do we pass it by reference?</a:t>
+            </a:r>
+          </a:p>
+          <a:p>
+            <a:pPr marL="342900" lvl="0" indent="-342900"/>
+            <a:r>
+              <a:rPr lang="en-US" dirty="0">
+                <a:solidFill>
+                  <a:srgbClr val="7F0055"/>
+                </a:solidFill>
+                <a:latin typeface="Courier New" panose="02070309020205020404" pitchFamily="49" charset="0"/>
+                <a:cs typeface="Courier New" panose="02070309020205020404" pitchFamily="49" charset="0"/>
+              </a:rPr>
+              <a:t>void</a:t>
+            </a:r>
+            <a:r>
+              <a:rPr lang="en-US" dirty="0">
+                <a:solidFill>
+                  <a:srgbClr val="000000"/>
+                </a:solidFill>
+                <a:latin typeface="Courier New" panose="02070309020205020404" pitchFamily="49" charset="0"/>
+                <a:cs typeface="Courier New" panose="02070309020205020404" pitchFamily="49" charset="0"/>
+              </a:rPr>
+              <a:t> </a:t>
+            </a:r>
+            <a:r>
+              <a:rPr lang="en-US" dirty="0" err="1">
+                <a:solidFill>
+                  <a:srgbClr val="000000"/>
+                </a:solidFill>
+                <a:latin typeface="Courier New" panose="02070309020205020404" pitchFamily="49" charset="0"/>
+                <a:cs typeface="Courier New" panose="02070309020205020404" pitchFamily="49" charset="0"/>
+              </a:rPr>
+              <a:t>free_function</a:t>
+            </a:r>
+            <a:r>
+              <a:rPr lang="en-US" dirty="0">
+                <a:solidFill>
+                  <a:srgbClr val="000000"/>
+                </a:solidFill>
+                <a:latin typeface="Courier New" panose="02070309020205020404" pitchFamily="49" charset="0"/>
+                <a:cs typeface="Courier New" panose="02070309020205020404" pitchFamily="49" charset="0"/>
+              </a:rPr>
+              <a:t>(</a:t>
+            </a:r>
+            <a:r>
+              <a:rPr lang="en-US" dirty="0" err="1">
+                <a:solidFill>
+                  <a:srgbClr val="000000"/>
+                </a:solidFill>
+                <a:latin typeface="Courier New" panose="02070309020205020404" pitchFamily="49" charset="0"/>
+                <a:cs typeface="Courier New" panose="02070309020205020404" pitchFamily="49" charset="0"/>
+              </a:rPr>
+              <a:t>std</a:t>
+            </a:r>
+            <a:r>
+              <a:rPr lang="en-US" dirty="0">
+                <a:solidFill>
+                  <a:srgbClr val="000000"/>
+                </a:solidFill>
+                <a:latin typeface="Courier New" panose="02070309020205020404" pitchFamily="49" charset="0"/>
+                <a:cs typeface="Courier New" panose="02070309020205020404" pitchFamily="49" charset="0"/>
+              </a:rPr>
+              <a:t>::</a:t>
+            </a:r>
+            <a:r>
+              <a:rPr lang="en-US" dirty="0" err="1">
+                <a:solidFill>
+                  <a:srgbClr val="7F0055"/>
+                </a:solidFill>
+                <a:latin typeface="Courier New" panose="02070309020205020404" pitchFamily="49" charset="0"/>
+                <a:cs typeface="Courier New" panose="02070309020205020404" pitchFamily="49" charset="0"/>
+              </a:rPr>
+              <a:t>ostream</a:t>
+            </a:r>
+            <a:r>
+              <a:rPr lang="en-US" dirty="0">
+                <a:solidFill>
+                  <a:srgbClr val="000000"/>
+                </a:solidFill>
+                <a:latin typeface="Courier New" panose="02070309020205020404" pitchFamily="49" charset="0"/>
+                <a:cs typeface="Courier New" panose="02070309020205020404" pitchFamily="49" charset="0"/>
+              </a:rPr>
+              <a:t>&amp; out) {</a:t>
+            </a:r>
+          </a:p>
+          <a:p>
+            <a:pPr marL="342900" lvl="0" indent="-342900"/>
+            <a:r>
+              <a:rPr lang="en-US" dirty="0">
+                <a:solidFill>
+                  <a:srgbClr val="000000"/>
+                </a:solidFill>
+                <a:latin typeface="Courier New" panose="02070309020205020404" pitchFamily="49" charset="0"/>
+                <a:cs typeface="Courier New" panose="02070309020205020404" pitchFamily="49" charset="0"/>
+              </a:rPr>
+              <a:t>  out &lt;&lt; </a:t>
+            </a:r>
+            <a:r>
+              <a:rPr lang="en-US" dirty="0">
+                <a:solidFill>
+                  <a:srgbClr val="2A00FF"/>
+                </a:solidFill>
+                <a:latin typeface="Courier New" panose="02070309020205020404" pitchFamily="49" charset="0"/>
+                <a:cs typeface="Courier New" panose="02070309020205020404" pitchFamily="49" charset="0"/>
+              </a:rPr>
+              <a:t>"Free function\n"</a:t>
+            </a:r>
+            <a:r>
+              <a:rPr lang="en-US" dirty="0">
+                <a:solidFill>
+                  <a:srgbClr val="000000"/>
+                </a:solidFill>
+                <a:latin typeface="Courier New" panose="02070309020205020404" pitchFamily="49" charset="0"/>
+                <a:cs typeface="Courier New" panose="02070309020205020404" pitchFamily="49" charset="0"/>
+              </a:rPr>
+              <a:t>;</a:t>
+            </a:r>
+          </a:p>
+          <a:p>
+            <a:pPr marL="342900" lvl="0" indent="-342900"/>
+            <a:r>
+              <a:rPr lang="en-US" dirty="0">
+                <a:solidFill>
+                  <a:srgbClr val="000000"/>
+                </a:solidFill>
+                <a:latin typeface="Courier New" panose="02070309020205020404" pitchFamily="49" charset="0"/>
+                <a:cs typeface="Courier New" panose="02070309020205020404" pitchFamily="49" charset="0"/>
+              </a:rPr>
+              <a:t>}</a:t>
+            </a:r>
+          </a:p>
+          <a:p>
+            <a:r>
+              <a:rPr lang="en-US" dirty="0" smtClean="0"/>
+              <a:t>Will this work?</a:t>
+            </a:r>
+          </a:p>
+          <a:p>
+            <a:r>
+              <a:rPr lang="en-US" dirty="0" err="1">
+                <a:latin typeface="Courier New" panose="02070309020205020404" pitchFamily="49" charset="0"/>
+                <a:cs typeface="Courier New" panose="02070309020205020404" pitchFamily="49" charset="0"/>
+              </a:rPr>
+              <a:t>std</a:t>
+            </a:r>
+            <a:r>
+              <a:rPr lang="en-US" dirty="0">
+                <a:latin typeface="Courier New" panose="02070309020205020404" pitchFamily="49" charset="0"/>
+                <a:cs typeface="Courier New" panose="02070309020205020404" pitchFamily="49" charset="0"/>
+              </a:rPr>
+              <a:t>::thread t(</a:t>
+            </a:r>
+            <a:r>
+              <a:rPr lang="en-US" dirty="0" err="1">
+                <a:latin typeface="Courier New" panose="02070309020205020404" pitchFamily="49" charset="0"/>
+                <a:cs typeface="Courier New" panose="02070309020205020404" pitchFamily="49" charset="0"/>
+              </a:rPr>
+              <a:t>free_function</a:t>
+            </a:r>
+            <a:r>
+              <a:rPr lang="en-US" dirty="0">
+                <a:latin typeface="Courier New" panose="02070309020205020404" pitchFamily="49" charset="0"/>
+                <a:cs typeface="Courier New" panose="02070309020205020404" pitchFamily="49" charset="0"/>
+              </a:rPr>
+              <a:t>, </a:t>
+            </a:r>
+            <a:r>
+              <a:rPr lang="en-US" dirty="0" err="1">
+                <a:latin typeface="Courier New" panose="02070309020205020404" pitchFamily="49" charset="0"/>
+                <a:cs typeface="Courier New" panose="02070309020205020404" pitchFamily="49" charset="0"/>
+              </a:rPr>
+              <a:t>std</a:t>
+            </a:r>
+            <a:r>
+              <a:rPr lang="en-US" dirty="0">
+                <a:latin typeface="Courier New" panose="02070309020205020404" pitchFamily="49" charset="0"/>
+                <a:cs typeface="Courier New" panose="02070309020205020404" pitchFamily="49" charset="0"/>
+              </a:rPr>
+              <a:t>::</a:t>
+            </a:r>
+            <a:r>
+              <a:rPr lang="en-US" dirty="0" err="1">
+                <a:solidFill>
+                  <a:srgbClr val="7F0055"/>
+                </a:solidFill>
+                <a:latin typeface="Courier New" panose="02070309020205020404" pitchFamily="49" charset="0"/>
+                <a:cs typeface="Courier New" panose="02070309020205020404" pitchFamily="49" charset="0"/>
+              </a:rPr>
+              <a:t>cout</a:t>
+            </a:r>
+            <a:r>
+              <a:rPr lang="en-US" dirty="0" smtClean="0">
+                <a:latin typeface="Courier New" panose="02070309020205020404" pitchFamily="49" charset="0"/>
+                <a:cs typeface="Courier New" panose="02070309020205020404" pitchFamily="49" charset="0"/>
+              </a:rPr>
+              <a:t>);</a:t>
+            </a:r>
+          </a:p>
+          <a:p>
+            <a:r>
+              <a:rPr lang="en-US" dirty="0" smtClean="0">
+                <a:cs typeface="Courier New" panose="02070309020205020404" pitchFamily="49" charset="0"/>
+              </a:rPr>
+              <a:t>Instead we need a reference to </a:t>
+            </a:r>
+            <a:r>
+              <a:rPr lang="en-US" dirty="0" err="1" smtClean="0">
+                <a:latin typeface="Courier New" panose="02070309020205020404" pitchFamily="49" charset="0"/>
+                <a:cs typeface="Courier New" panose="02070309020205020404" pitchFamily="49" charset="0"/>
+              </a:rPr>
+              <a:t>std</a:t>
+            </a:r>
+            <a:r>
+              <a:rPr lang="en-US" dirty="0" smtClean="0">
+                <a:latin typeface="Courier New" panose="02070309020205020404" pitchFamily="49" charset="0"/>
+                <a:cs typeface="Courier New" panose="02070309020205020404" pitchFamily="49" charset="0"/>
+              </a:rPr>
+              <a:t>::</a:t>
+            </a:r>
+            <a:r>
+              <a:rPr lang="en-US" dirty="0" err="1" smtClean="0">
+                <a:latin typeface="Courier New" panose="02070309020205020404" pitchFamily="49" charset="0"/>
+                <a:cs typeface="Courier New" panose="02070309020205020404" pitchFamily="49" charset="0"/>
+              </a:rPr>
+              <a:t>cout</a:t>
+            </a:r>
+            <a:r>
+              <a:rPr lang="en-US" dirty="0" smtClean="0">
+                <a:cs typeface="Courier New" panose="02070309020205020404" pitchFamily="49" charset="0"/>
+              </a:rPr>
+              <a:t>:</a:t>
+            </a:r>
+          </a:p>
+          <a:p>
+            <a:r>
+              <a:rPr lang="en-US" dirty="0" err="1">
+                <a:latin typeface="Courier New" panose="02070309020205020404" pitchFamily="49" charset="0"/>
+                <a:cs typeface="Courier New" panose="02070309020205020404" pitchFamily="49" charset="0"/>
+              </a:rPr>
+              <a:t>std</a:t>
+            </a:r>
+            <a:r>
+              <a:rPr lang="en-US" dirty="0">
+                <a:latin typeface="Courier New" panose="02070309020205020404" pitchFamily="49" charset="0"/>
+                <a:cs typeface="Courier New" panose="02070309020205020404" pitchFamily="49" charset="0"/>
+              </a:rPr>
+              <a:t>::thread </a:t>
+            </a:r>
+            <a:r>
+              <a:rPr lang="en-US" dirty="0" smtClean="0">
+                <a:latin typeface="Courier New" panose="02070309020205020404" pitchFamily="49" charset="0"/>
+                <a:cs typeface="Courier New" panose="02070309020205020404" pitchFamily="49" charset="0"/>
+              </a:rPr>
+              <a:t>t(</a:t>
+            </a:r>
+            <a:r>
+              <a:rPr lang="en-US" dirty="0" err="1" smtClean="0">
+                <a:latin typeface="Courier New" panose="02070309020205020404" pitchFamily="49" charset="0"/>
+                <a:cs typeface="Courier New" panose="02070309020205020404" pitchFamily="49" charset="0"/>
+              </a:rPr>
+              <a:t>free_function</a:t>
+            </a:r>
+            <a:r>
+              <a:rPr lang="en-US" dirty="0" smtClean="0">
+                <a:latin typeface="Courier New" panose="02070309020205020404" pitchFamily="49" charset="0"/>
+                <a:cs typeface="Courier New" panose="02070309020205020404" pitchFamily="49" charset="0"/>
+              </a:rPr>
+              <a:t>,</a:t>
+            </a:r>
+          </a:p>
+          <a:p>
+            <a:r>
+              <a:rPr lang="en-US" dirty="0">
+                <a:latin typeface="Courier New" panose="02070309020205020404" pitchFamily="49" charset="0"/>
+                <a:cs typeface="Courier New" panose="02070309020205020404" pitchFamily="49" charset="0"/>
+              </a:rPr>
+              <a:t> </a:t>
+            </a:r>
+            <a:r>
+              <a:rPr lang="en-US" dirty="0" smtClean="0">
+                <a:latin typeface="Courier New" panose="02070309020205020404" pitchFamily="49" charset="0"/>
+                <a:cs typeface="Courier New" panose="02070309020205020404" pitchFamily="49" charset="0"/>
+              </a:rPr>
+              <a:t>             </a:t>
+            </a:r>
+            <a:r>
+              <a:rPr lang="en-US" dirty="0" err="1" smtClean="0">
+                <a:latin typeface="Courier New" panose="02070309020205020404" pitchFamily="49" charset="0"/>
+                <a:cs typeface="Courier New" panose="02070309020205020404" pitchFamily="49" charset="0"/>
+              </a:rPr>
+              <a:t>std</a:t>
+            </a:r>
+            <a:r>
+              <a:rPr lang="en-US" dirty="0" smtClean="0">
+                <a:latin typeface="Courier New" panose="02070309020205020404" pitchFamily="49" charset="0"/>
+                <a:cs typeface="Courier New" panose="02070309020205020404" pitchFamily="49" charset="0"/>
+              </a:rPr>
+              <a:t>::ref(</a:t>
+            </a:r>
+            <a:r>
+              <a:rPr lang="en-US" dirty="0" err="1" smtClean="0">
+                <a:latin typeface="Courier New" panose="02070309020205020404" pitchFamily="49" charset="0"/>
+                <a:cs typeface="Courier New" panose="02070309020205020404" pitchFamily="49" charset="0"/>
+              </a:rPr>
+              <a:t>std</a:t>
+            </a:r>
+            <a:r>
+              <a:rPr lang="en-US" dirty="0">
+                <a:latin typeface="Courier New" panose="02070309020205020404" pitchFamily="49" charset="0"/>
+                <a:cs typeface="Courier New" panose="02070309020205020404" pitchFamily="49" charset="0"/>
+              </a:rPr>
+              <a:t>::</a:t>
+            </a:r>
+            <a:r>
+              <a:rPr lang="en-US" dirty="0" err="1" smtClean="0">
+                <a:solidFill>
+                  <a:srgbClr val="7F0055"/>
+                </a:solidFill>
+                <a:latin typeface="Courier New" panose="02070309020205020404" pitchFamily="49" charset="0"/>
+                <a:cs typeface="Courier New" panose="02070309020205020404" pitchFamily="49" charset="0"/>
+              </a:rPr>
+              <a:t>cout</a:t>
+            </a:r>
+            <a:r>
+              <a:rPr lang="en-US" dirty="0" smtClean="0">
+                <a:solidFill>
+                  <a:srgbClr val="7F0055"/>
+                </a:solidFill>
+                <a:latin typeface="Courier New" panose="02070309020205020404" pitchFamily="49" charset="0"/>
+                <a:cs typeface="Courier New" panose="02070309020205020404" pitchFamily="49" charset="0"/>
+              </a:rPr>
+              <a:t>)</a:t>
+            </a:r>
+            <a:r>
+              <a:rPr lang="en-US" dirty="0" smtClean="0">
+                <a:latin typeface="Courier New" panose="02070309020205020404" pitchFamily="49" charset="0"/>
+                <a:cs typeface="Courier New" panose="02070309020205020404" pitchFamily="49" charset="0"/>
+              </a:rPr>
+              <a:t>);</a:t>
+            </a:r>
+            <a:endParaRPr lang="en-US" dirty="0">
+              <a:latin typeface="Courier New" panose="02070309020205020404" pitchFamily="49" charset="0"/>
+              <a:cs typeface="Courier New" panose="02070309020205020404" pitchFamily="49" charset="0"/>
+            </a:endParaRPr>
+          </a:p>
+          <a:p>
+            <a:endParaRPr lang="en-US" dirty="0">
+              <a:cs typeface="Courier New" panose="02070309020205020404" pitchFamily="49" charset="0"/>
+            </a:endParaRPr>
+          </a:p>
+        </p:txBody>
+      </p:sp>
+      <p:sp>
+        <p:nvSpPr>
+          <p:cNvPr id="4" name="Slide Number Placeholder 3"/>
+          <p:cNvSpPr>
+            <a:spLocks noGrp="1"/>
+          </p:cNvSpPr>
+          <p:nvPr>
+            <p:ph type="sldNum" sz="quarter" idx="12"/>
+          </p:nvPr>
+        </p:nvSpPr>
+        <p:spPr/>
+        <p:txBody>
+          <a:bodyPr/>
+          <a:lstStyle/>
+          <a:p>
+            <a:fld id="{6DA12B36-9664-4CB0-8B2E-F4A2F44AE97E}" type="slidenum">
+              <a:rPr lang="en-US" smtClean="0"/>
+              <a:t>18</a:t>
+            </a:fld>
+            <a:endParaRPr lang="en-US"/>
+          </a:p>
+        </p:txBody>
+      </p:sp>
+      <p:sp>
+        <p:nvSpPr>
+          <p:cNvPr id="5" name="Rectangle 4"/>
+          <p:cNvSpPr/>
+          <p:nvPr/>
+        </p:nvSpPr>
+        <p:spPr>
+          <a:xfrm>
+            <a:off x="6324600" y="4800600"/>
+            <a:ext cx="2438400" cy="1295400"/>
+          </a:xfrm>
+          <a:prstGeom prst="rect">
+            <a:avLst/>
+          </a:prstGeom>
+        </p:spPr>
+        <p:style>
+          <a:lnRef idx="2">
+            <a:schemeClr val="accent1">
+              <a:shade val="50000"/>
+            </a:schemeClr>
+          </a:lnRef>
+          <a:fillRef idx="1">
+            <a:schemeClr val="accent1"/>
+          </a:fillRef>
+          <a:effectRef idx="0">
+            <a:schemeClr val="accent1"/>
+          </a:effectRef>
+          <a:fontRef idx="minor">
+            <a:schemeClr val="lt1"/>
+          </a:fontRef>
+        </p:style>
+        <p:txBody>
+          <a:bodyPr rtlCol="0" anchor="ctr"/>
+          <a:lstStyle/>
+          <a:p>
+            <a:pPr algn="ctr"/>
+            <a:r>
+              <a:rPr lang="en-US" dirty="0" smtClean="0"/>
+              <a:t>Be wary of lifetime of the reference, just as with a pointer.</a:t>
+            </a:r>
+            <a:endParaRPr lang="en-US" dirty="0"/>
+          </a:p>
+        </p:txBody>
+      </p:sp>
+      <p:sp>
+        <p:nvSpPr>
+          <p:cNvPr id="6" name="Footer Placeholder 5"/>
+          <p:cNvSpPr>
+            <a:spLocks noGrp="1"/>
+          </p:cNvSpPr>
+          <p:nvPr>
+            <p:ph type="ftr" sz="quarter" idx="11"/>
+          </p:nvPr>
+        </p:nvSpPr>
+        <p:spPr/>
+        <p:txBody>
+          <a:bodyPr/>
+          <a:lstStyle/>
+          <a:p>
+            <a:r>
+              <a:rPr lang="en-US" dirty="0" smtClean="0"/>
+              <a:t>Source: Williams, Chapter 2</a:t>
+            </a:r>
+            <a:endParaRPr lang="en-US" dirty="0"/>
+          </a:p>
+        </p:txBody>
+      </p:sp>
+    </p:spTree>
+    <p:extLst>
+      <p:ext uri="{BB962C8B-B14F-4D97-AF65-F5344CB8AC3E}">
+        <p14:creationId xmlns:p14="http://schemas.microsoft.com/office/powerpoint/2010/main" val="667390665"/>
+      </p:ext>
+    </p:extLst>
+  </p:cSld>
+  <p:clrMapOvr>
+    <a:masterClrMapping/>
+  </p:clrMapOvr>
+  <p:timing>
+    <p:tnLst>
+      <p:par>
+        <p:cTn id="1" dur="indefinite" restart="never" nodeType="tmRoot">
+          <p:childTnLst>
+            <p:seq concurrent="1" nextAc="seek">
+              <p:cTn id="2" dur="indefinite" nodeType="mainSeq">
+                <p:childTnLst>
+                  <p:par>
+                    <p:cTn id="3" fill="hold">
+                      <p:stCondLst>
+                        <p:cond delay="indefinite"/>
+                      </p:stCondLst>
+                      <p:childTnLst>
+                        <p:par>
+                          <p:cTn id="4" fill="hold">
+                            <p:stCondLst>
+                              <p:cond delay="0"/>
+                            </p:stCondLst>
+                            <p:childTnLst>
+                              <p:par>
+                                <p:cTn id="5" presetID="1" presetClass="entr" presetSubtype="0" fill="hold" nodeType="clickEffect">
+                                  <p:stCondLst>
+                                    <p:cond delay="0"/>
+                                  </p:stCondLst>
+                                  <p:childTnLst>
+                                    <p:set>
+                                      <p:cBhvr>
+                                        <p:cTn id="6" dur="1" fill="hold">
+                                          <p:stCondLst>
+                                            <p:cond delay="0"/>
+                                          </p:stCondLst>
+                                        </p:cTn>
+                                        <p:tgtEl>
+                                          <p:spTgt spid="3">
+                                            <p:txEl>
+                                              <p:pRg st="6" end="6"/>
+                                            </p:txEl>
+                                          </p:spTgt>
+                                        </p:tgtEl>
+                                        <p:attrNameLst>
+                                          <p:attrName>style.visibility</p:attrName>
+                                        </p:attrNameLst>
+                                      </p:cBhvr>
+                                      <p:to>
+                                        <p:strVal val="visible"/>
+                                      </p:to>
+                                    </p:set>
+                                  </p:childTnLst>
+                                </p:cTn>
+                              </p:par>
+                              <p:par>
+                                <p:cTn id="7" presetID="1" presetClass="entr" presetSubtype="0" fill="hold" nodeType="withEffect">
+                                  <p:stCondLst>
+                                    <p:cond delay="0"/>
+                                  </p:stCondLst>
+                                  <p:childTnLst>
+                                    <p:set>
+                                      <p:cBhvr>
+                                        <p:cTn id="8" dur="1" fill="hold">
+                                          <p:stCondLst>
+                                            <p:cond delay="0"/>
+                                          </p:stCondLst>
+                                        </p:cTn>
+                                        <p:tgtEl>
+                                          <p:spTgt spid="3">
+                                            <p:txEl>
+                                              <p:pRg st="7" end="7"/>
+                                            </p:txEl>
+                                          </p:spTgt>
+                                        </p:tgtEl>
+                                        <p:attrNameLst>
+                                          <p:attrName>style.visibility</p:attrName>
+                                        </p:attrNameLst>
+                                      </p:cBhvr>
+                                      <p:to>
+                                        <p:strVal val="visible"/>
+                                      </p:to>
+                                    </p:set>
+                                  </p:childTnLst>
+                                </p:cTn>
+                              </p:par>
+                              <p:par>
+                                <p:cTn id="9" presetID="1" presetClass="entr" presetSubtype="0" fill="hold" nodeType="withEffect">
+                                  <p:stCondLst>
+                                    <p:cond delay="0"/>
+                                  </p:stCondLst>
+                                  <p:childTnLst>
+                                    <p:set>
+                                      <p:cBhvr>
+                                        <p:cTn id="10" dur="1" fill="hold">
+                                          <p:stCondLst>
+                                            <p:cond delay="0"/>
+                                          </p:stCondLst>
+                                        </p:cTn>
+                                        <p:tgtEl>
+                                          <p:spTgt spid="3">
+                                            <p:txEl>
+                                              <p:pRg st="8" end="8"/>
+                                            </p:txEl>
+                                          </p:spTgt>
+                                        </p:tgtEl>
+                                        <p:attrNameLst>
+                                          <p:attrName>style.visibility</p:attrName>
+                                        </p:attrNameLst>
+                                      </p:cBhvr>
+                                      <p:to>
+                                        <p:strVal val="visible"/>
+                                      </p:to>
+                                    </p:set>
+                                  </p:childTnLst>
+                                </p:cTn>
+                              </p:par>
+                            </p:childTnLst>
+                          </p:cTn>
+                        </p:par>
+                      </p:childTnLst>
+                    </p:cTn>
+                  </p:par>
+                  <p:par>
+                    <p:cTn id="11" fill="hold">
+                      <p:stCondLst>
+                        <p:cond delay="indefinite"/>
+                      </p:stCondLst>
+                      <p:childTnLst>
+                        <p:par>
+                          <p:cTn id="12" fill="hold">
+                            <p:stCondLst>
+                              <p:cond delay="0"/>
+                            </p:stCondLst>
+                            <p:childTnLst>
+                              <p:par>
+                                <p:cTn id="13" presetID="1" presetClass="entr" presetSubtype="0" fill="hold" grpId="0" nodeType="clickEffect">
+                                  <p:stCondLst>
+                                    <p:cond delay="0"/>
+                                  </p:stCondLst>
+                                  <p:childTnLst>
+                                    <p:set>
+                                      <p:cBhvr>
+                                        <p:cTn id="14" dur="1" fill="hold">
+                                          <p:stCondLst>
+                                            <p:cond delay="0"/>
+                                          </p:stCondLst>
+                                        </p:cTn>
+                                        <p:tgtEl>
+                                          <p:spTgt spid="5"/>
+                                        </p:tgtEl>
+                                        <p:attrNameLst>
+                                          <p:attrName>style.visibility</p:attrName>
+                                        </p:attrNameLst>
+                                      </p:cBhvr>
+                                      <p:to>
+                                        <p:strVal val="visible"/>
+                                      </p:to>
+                                    </p:set>
+                                  </p:childTnLst>
+                                </p:cTn>
+                              </p:par>
+                            </p:childTnLst>
+                          </p:cTn>
+                        </p:par>
+                      </p:childTnLst>
+                    </p:cTn>
+                  </p:par>
+                </p:childTnLst>
+              </p:cTn>
+              <p:prevCondLst>
+                <p:cond evt="onPrev" delay="0">
+                  <p:tgtEl>
+                    <p:sldTgt/>
+                  </p:tgtEl>
+                </p:cond>
+              </p:prevCondLst>
+              <p:nextCondLst>
+                <p:cond evt="onNext" delay="0">
+                  <p:tgtEl>
+                    <p:sldTgt/>
+                  </p:tgtEl>
+                </p:cond>
+              </p:nextCondLst>
+            </p:seq>
+          </p:childTnLst>
+        </p:cTn>
+      </p:par>
+    </p:tnLst>
+    <p:bldLst>
+      <p:bldP spid="5" grpId="0" animBg="1"/>
+    </p:bldLst>
+  </p:timing>
+</p:sld>
+</file>
+
+<file path=ppt/slides/slide19.xml><?xml version="1.0" encoding="utf-8"?>
+<p:sld xmlns:a="http://schemas.openxmlformats.org/drawingml/2006/main" xmlns:r="http://schemas.openxmlformats.org/officeDocument/2006/relationships" xmlns:p="http://schemas.openxmlformats.org/presentationml/2006/main">
+  <p:cSld>
+    <p:spTree>
+      <p:nvGrpSpPr>
+        <p:cNvPr id="1" name=""/>
+        <p:cNvGrpSpPr/>
+        <p:nvPr/>
+      </p:nvGrpSpPr>
+      <p:grpSpPr>
+        <a:xfrm>
+          <a:off x="0" y="0"/>
+          <a:ext cx="0" cy="0"/>
+          <a:chOff x="0" y="0"/>
+          <a:chExt cx="0" cy="0"/>
+        </a:xfrm>
+      </p:grpSpPr>
+      <p:sp>
+        <p:nvSpPr>
+          <p:cNvPr id="2" name="Title 1"/>
+          <p:cNvSpPr>
+            <a:spLocks noGrp="1"/>
+          </p:cNvSpPr>
+          <p:nvPr>
+            <p:ph type="title"/>
+          </p:nvPr>
+        </p:nvSpPr>
+        <p:spPr/>
+        <p:txBody>
+          <a:bodyPr>
+            <a:normAutofit/>
+          </a:bodyPr>
+          <a:lstStyle/>
+          <a:p>
+            <a:r>
+              <a:rPr lang="en-US" dirty="0" smtClean="0"/>
+              <a:t>a type that is not </a:t>
+            </a:r>
+            <a:r>
+              <a:rPr lang="en-US" dirty="0" err="1" smtClean="0"/>
+              <a:t>copyable</a:t>
+            </a:r>
+            <a:endParaRPr lang="en-US" dirty="0"/>
+          </a:p>
+        </p:txBody>
+      </p:sp>
+      <p:sp>
+        <p:nvSpPr>
+          <p:cNvPr id="3" name="Content Placeholder 2"/>
+          <p:cNvSpPr>
+            <a:spLocks noGrp="1"/>
+          </p:cNvSpPr>
+          <p:nvPr>
+            <p:ph idx="1"/>
+          </p:nvPr>
+        </p:nvSpPr>
+        <p:spPr/>
+        <p:txBody>
+          <a:bodyPr/>
+          <a:lstStyle/>
+          <a:p>
+            <a:r>
+              <a:rPr lang="en-US" dirty="0" smtClean="0"/>
+              <a:t>Some types can be moved, but not copied</a:t>
+            </a:r>
+          </a:p>
+          <a:p>
+            <a:pPr marL="800100" lvl="1" indent="-342900"/>
+            <a:r>
+              <a:rPr lang="en-US" dirty="0" smtClean="0"/>
+              <a:t>The type </a:t>
+            </a:r>
+            <a:r>
+              <a:rPr lang="en-US" dirty="0" err="1" smtClean="0">
+                <a:latin typeface="Courier New" panose="02070309020205020404" pitchFamily="49" charset="0"/>
+                <a:cs typeface="Courier New" panose="02070309020205020404" pitchFamily="49" charset="0"/>
+              </a:rPr>
+              <a:t>std</a:t>
+            </a:r>
+            <a:r>
+              <a:rPr lang="en-US" dirty="0" smtClean="0">
+                <a:latin typeface="Courier New" panose="02070309020205020404" pitchFamily="49" charset="0"/>
+                <a:cs typeface="Courier New" panose="02070309020205020404" pitchFamily="49" charset="0"/>
+              </a:rPr>
+              <a:t>::</a:t>
+            </a:r>
+            <a:r>
+              <a:rPr lang="en-US" dirty="0" err="1" smtClean="0">
+                <a:latin typeface="Courier New" panose="02070309020205020404" pitchFamily="49" charset="0"/>
+                <a:cs typeface="Courier New" panose="02070309020205020404" pitchFamily="49" charset="0"/>
+              </a:rPr>
+              <a:t>unique_ptr</a:t>
+            </a:r>
+            <a:r>
+              <a:rPr lang="en-US" dirty="0" smtClean="0"/>
+              <a:t> allows a single owner of heap-allocated memory</a:t>
+            </a:r>
+          </a:p>
+          <a:p>
+            <a:pPr marL="800100" lvl="1" indent="-342900"/>
+            <a:r>
+              <a:rPr lang="en-US" dirty="0" err="1" smtClean="0">
+                <a:latin typeface="Courier New" panose="02070309020205020404" pitchFamily="49" charset="0"/>
+                <a:cs typeface="Courier New" panose="02070309020205020404" pitchFamily="49" charset="0"/>
+              </a:rPr>
+              <a:t>std</a:t>
+            </a:r>
+            <a:r>
+              <a:rPr lang="en-US" dirty="0" smtClean="0">
+                <a:latin typeface="Courier New" panose="02070309020205020404" pitchFamily="49" charset="0"/>
+                <a:cs typeface="Courier New" panose="02070309020205020404" pitchFamily="49" charset="0"/>
+              </a:rPr>
+              <a:t>::</a:t>
+            </a:r>
+            <a:r>
+              <a:rPr lang="en-US" dirty="0" err="1" smtClean="0">
+                <a:latin typeface="Courier New" panose="02070309020205020404" pitchFamily="49" charset="0"/>
+                <a:cs typeface="Courier New" panose="02070309020205020404" pitchFamily="49" charset="0"/>
+              </a:rPr>
+              <a:t>unique_ptr</a:t>
+            </a:r>
+            <a:r>
+              <a:rPr lang="en-US" dirty="0" smtClean="0"/>
+              <a:t> cannot be copied, but can be moved</a:t>
+            </a:r>
+          </a:p>
+          <a:p>
+            <a:pPr marL="800100" lvl="1" indent="-342900"/>
+            <a:endParaRPr lang="en-US" dirty="0"/>
+          </a:p>
+          <a:p>
+            <a:pPr marL="342900" indent="-342900"/>
+            <a:r>
+              <a:rPr lang="en-US" dirty="0">
+                <a:solidFill>
+                  <a:srgbClr val="7F0055"/>
+                </a:solidFill>
+                <a:latin typeface="Courier New" panose="02070309020205020404" pitchFamily="49" charset="0"/>
+                <a:cs typeface="Courier New" panose="02070309020205020404" pitchFamily="49" charset="0"/>
+              </a:rPr>
+              <a:t>void</a:t>
+            </a:r>
+            <a:r>
+              <a:rPr lang="en-US" dirty="0">
+                <a:latin typeface="Courier New" panose="02070309020205020404" pitchFamily="49" charset="0"/>
+                <a:cs typeface="Courier New" panose="02070309020205020404" pitchFamily="49" charset="0"/>
+              </a:rPr>
+              <a:t> process(</a:t>
+            </a:r>
+            <a:r>
+              <a:rPr lang="en-US" dirty="0" err="1">
+                <a:latin typeface="Courier New" panose="02070309020205020404" pitchFamily="49" charset="0"/>
+                <a:cs typeface="Courier New" panose="02070309020205020404" pitchFamily="49" charset="0"/>
+              </a:rPr>
+              <a:t>std</a:t>
+            </a:r>
+            <a:r>
+              <a:rPr lang="en-US" dirty="0">
+                <a:latin typeface="Courier New" panose="02070309020205020404" pitchFamily="49" charset="0"/>
+                <a:cs typeface="Courier New" panose="02070309020205020404" pitchFamily="49" charset="0"/>
+              </a:rPr>
+              <a:t>::</a:t>
+            </a:r>
+            <a:r>
+              <a:rPr lang="en-US" dirty="0" err="1">
+                <a:latin typeface="Courier New" panose="02070309020205020404" pitchFamily="49" charset="0"/>
+                <a:cs typeface="Courier New" panose="02070309020205020404" pitchFamily="49" charset="0"/>
+              </a:rPr>
+              <a:t>unique_ptr</a:t>
+            </a:r>
+            <a:r>
+              <a:rPr lang="en-US" dirty="0">
+                <a:latin typeface="Courier New" panose="02070309020205020404" pitchFamily="49" charset="0"/>
+                <a:cs typeface="Courier New" panose="02070309020205020404" pitchFamily="49" charset="0"/>
+              </a:rPr>
+              <a:t>&lt;matrix&gt; m</a:t>
+            </a:r>
+            <a:r>
+              <a:rPr lang="en-US" dirty="0" smtClean="0">
+                <a:latin typeface="Courier New" panose="02070309020205020404" pitchFamily="49" charset="0"/>
+                <a:cs typeface="Courier New" panose="02070309020205020404" pitchFamily="49" charset="0"/>
+              </a:rPr>
+              <a:t>);</a:t>
+            </a:r>
+          </a:p>
+          <a:p>
+            <a:pPr marL="342900" indent="-342900"/>
+            <a:endParaRPr lang="en-US" dirty="0" smtClean="0">
+              <a:latin typeface="Courier New" panose="02070309020205020404" pitchFamily="49" charset="0"/>
+              <a:cs typeface="Courier New" panose="02070309020205020404" pitchFamily="49" charset="0"/>
+            </a:endParaRPr>
+          </a:p>
+          <a:p>
+            <a:pPr marL="342900" indent="-342900"/>
+            <a:r>
+              <a:rPr lang="en-US" dirty="0" err="1" smtClean="0">
+                <a:latin typeface="Courier New" panose="02070309020205020404" pitchFamily="49" charset="0"/>
+                <a:cs typeface="Courier New" panose="02070309020205020404" pitchFamily="49" charset="0"/>
+              </a:rPr>
+              <a:t>std</a:t>
+            </a:r>
+            <a:r>
+              <a:rPr lang="en-US" dirty="0">
+                <a:latin typeface="Courier New" panose="02070309020205020404" pitchFamily="49" charset="0"/>
+                <a:cs typeface="Courier New" panose="02070309020205020404" pitchFamily="49" charset="0"/>
+              </a:rPr>
+              <a:t>::</a:t>
+            </a:r>
+            <a:r>
+              <a:rPr lang="en-US" dirty="0" err="1">
+                <a:latin typeface="Courier New" panose="02070309020205020404" pitchFamily="49" charset="0"/>
+                <a:cs typeface="Courier New" panose="02070309020205020404" pitchFamily="49" charset="0"/>
+              </a:rPr>
+              <a:t>unique_ptr</a:t>
+            </a:r>
+            <a:r>
+              <a:rPr lang="en-US" dirty="0">
+                <a:latin typeface="Courier New" panose="02070309020205020404" pitchFamily="49" charset="0"/>
+                <a:cs typeface="Courier New" panose="02070309020205020404" pitchFamily="49" charset="0"/>
+              </a:rPr>
+              <a:t>&lt;matrix&gt; p(</a:t>
+            </a:r>
+            <a:r>
+              <a:rPr lang="en-US" dirty="0">
+                <a:solidFill>
+                  <a:srgbClr val="7F0055"/>
+                </a:solidFill>
+                <a:latin typeface="Courier New" panose="02070309020205020404" pitchFamily="49" charset="0"/>
+                <a:cs typeface="Courier New" panose="02070309020205020404" pitchFamily="49" charset="0"/>
+              </a:rPr>
+              <a:t>new</a:t>
+            </a:r>
+            <a:r>
+              <a:rPr lang="en-US" dirty="0">
+                <a:latin typeface="Courier New" panose="02070309020205020404" pitchFamily="49" charset="0"/>
+                <a:cs typeface="Courier New" panose="02070309020205020404" pitchFamily="49" charset="0"/>
+              </a:rPr>
+              <a:t> matrix</a:t>
+            </a:r>
+            <a:r>
+              <a:rPr lang="en-US" dirty="0" smtClean="0">
+                <a:latin typeface="Courier New" panose="02070309020205020404" pitchFamily="49" charset="0"/>
+                <a:cs typeface="Courier New" panose="02070309020205020404" pitchFamily="49" charset="0"/>
+              </a:rPr>
+              <a:t>);</a:t>
+            </a:r>
+          </a:p>
+          <a:p>
+            <a:pPr marL="342900" indent="-342900"/>
+            <a:r>
+              <a:rPr lang="en-US" dirty="0" err="1" smtClean="0">
+                <a:latin typeface="Courier New" panose="02070309020205020404" pitchFamily="49" charset="0"/>
+                <a:cs typeface="Courier New" panose="02070309020205020404" pitchFamily="49" charset="0"/>
+              </a:rPr>
+              <a:t>std</a:t>
+            </a:r>
+            <a:r>
+              <a:rPr lang="en-US" dirty="0">
+                <a:latin typeface="Courier New" panose="02070309020205020404" pitchFamily="49" charset="0"/>
+                <a:cs typeface="Courier New" panose="02070309020205020404" pitchFamily="49" charset="0"/>
+              </a:rPr>
+              <a:t>::thread t(process, </a:t>
+            </a:r>
+            <a:r>
+              <a:rPr lang="en-US" dirty="0" err="1">
+                <a:solidFill>
+                  <a:schemeClr val="tx2"/>
+                </a:solidFill>
+                <a:latin typeface="Courier New" panose="02070309020205020404" pitchFamily="49" charset="0"/>
+                <a:cs typeface="Courier New" panose="02070309020205020404" pitchFamily="49" charset="0"/>
+              </a:rPr>
+              <a:t>std</a:t>
+            </a:r>
+            <a:r>
+              <a:rPr lang="en-US" dirty="0">
+                <a:solidFill>
+                  <a:schemeClr val="tx2"/>
+                </a:solidFill>
+                <a:latin typeface="Courier New" panose="02070309020205020404" pitchFamily="49" charset="0"/>
+                <a:cs typeface="Courier New" panose="02070309020205020404" pitchFamily="49" charset="0"/>
+              </a:rPr>
+              <a:t>::move(p)</a:t>
+            </a:r>
+            <a:r>
+              <a:rPr lang="en-US" dirty="0">
+                <a:latin typeface="Courier New" panose="02070309020205020404" pitchFamily="49" charset="0"/>
+                <a:cs typeface="Courier New" panose="02070309020205020404" pitchFamily="49" charset="0"/>
+              </a:rPr>
+              <a:t>);</a:t>
+            </a:r>
+          </a:p>
+        </p:txBody>
+      </p:sp>
+      <p:sp>
+        <p:nvSpPr>
+          <p:cNvPr id="4" name="Slide Number Placeholder 3"/>
+          <p:cNvSpPr>
+            <a:spLocks noGrp="1"/>
+          </p:cNvSpPr>
+          <p:nvPr>
+            <p:ph type="sldNum" sz="quarter" idx="12"/>
+          </p:nvPr>
+        </p:nvSpPr>
+        <p:spPr/>
+        <p:txBody>
+          <a:bodyPr/>
+          <a:lstStyle/>
+          <a:p>
+            <a:fld id="{6DA12B36-9664-4CB0-8B2E-F4A2F44AE97E}" type="slidenum">
+              <a:rPr lang="en-US" smtClean="0"/>
+              <a:t>19</a:t>
+            </a:fld>
+            <a:endParaRPr lang="en-US"/>
+          </a:p>
+        </p:txBody>
+      </p:sp>
+      <p:sp>
+        <p:nvSpPr>
+          <p:cNvPr id="5" name="Footer Placeholder 4"/>
+          <p:cNvSpPr>
+            <a:spLocks noGrp="1"/>
+          </p:cNvSpPr>
+          <p:nvPr>
+            <p:ph type="ftr" sz="quarter" idx="11"/>
+          </p:nvPr>
+        </p:nvSpPr>
+        <p:spPr/>
+        <p:txBody>
+          <a:bodyPr/>
+          <a:lstStyle/>
+          <a:p>
+            <a:r>
+              <a:rPr lang="en-US" dirty="0" smtClean="0"/>
+              <a:t>Source: Williams, Chapter 2</a:t>
+            </a:r>
+            <a:endParaRPr lang="en-US" dirty="0"/>
+          </a:p>
+        </p:txBody>
+      </p:sp>
+    </p:spTree>
+    <p:extLst>
+      <p:ext uri="{BB962C8B-B14F-4D97-AF65-F5344CB8AC3E}">
+        <p14:creationId xmlns:p14="http://schemas.microsoft.com/office/powerpoint/2010/main" val="3191540136"/>
+      </p:ext>
+    </p:extLst>
+  </p:cSld>
+  <p:clrMapOvr>
+    <a:masterClrMapping/>
+  </p:clrMapOvr>
+  <p:timing>
+    <p:tnLst>
+      <p:par>
+        <p:cTn id="1" dur="indefinite" restart="never" nodeType="tmRoot"/>
+      </p:par>
+    </p:tnLst>
+  </p:timing>
 </p:sld>
 </file>
 
@@ -4818,6 +7439,1920 @@
     <p:extLst>
       <p:ext uri="{BB962C8B-B14F-4D97-AF65-F5344CB8AC3E}">
         <p14:creationId xmlns:p14="http://schemas.microsoft.com/office/powerpoint/2010/main" val="3237691251"/>
+      </p:ext>
+    </p:extLst>
+  </p:cSld>
+  <p:clrMapOvr>
+    <a:masterClrMapping/>
+  </p:clrMapOvr>
+  <p:timing>
+    <p:tnLst>
+      <p:par>
+        <p:cTn id="1" dur="indefinite" restart="never" nodeType="tmRoot"/>
+      </p:par>
+    </p:tnLst>
+  </p:timing>
+</p:sld>
+</file>
+
+<file path=ppt/slides/slide20.xml><?xml version="1.0" encoding="utf-8"?>
+<p:sld xmlns:a="http://schemas.openxmlformats.org/drawingml/2006/main" xmlns:r="http://schemas.openxmlformats.org/officeDocument/2006/relationships" xmlns:p="http://schemas.openxmlformats.org/presentationml/2006/main">
+  <p:cSld>
+    <p:spTree>
+      <p:nvGrpSpPr>
+        <p:cNvPr id="1" name=""/>
+        <p:cNvGrpSpPr/>
+        <p:nvPr/>
+      </p:nvGrpSpPr>
+      <p:grpSpPr>
+        <a:xfrm>
+          <a:off x="0" y="0"/>
+          <a:ext cx="0" cy="0"/>
+          <a:chOff x="0" y="0"/>
+          <a:chExt cx="0" cy="0"/>
+        </a:xfrm>
+      </p:grpSpPr>
+      <p:sp>
+        <p:nvSpPr>
+          <p:cNvPr id="2" name="Title 1"/>
+          <p:cNvSpPr>
+            <a:spLocks noGrp="1"/>
+          </p:cNvSpPr>
+          <p:nvPr>
+            <p:ph type="title"/>
+          </p:nvPr>
+        </p:nvSpPr>
+        <p:spPr/>
+        <p:txBody>
+          <a:bodyPr>
+            <a:normAutofit/>
+          </a:bodyPr>
+          <a:lstStyle/>
+          <a:p>
+            <a:r>
+              <a:rPr lang="en-US" dirty="0" smtClean="0"/>
+              <a:t>Example of argument passing</a:t>
+            </a:r>
+            <a:endParaRPr lang="en-US" dirty="0"/>
+          </a:p>
+        </p:txBody>
+      </p:sp>
+      <p:sp>
+        <p:nvSpPr>
+          <p:cNvPr id="3" name="Content Placeholder 2"/>
+          <p:cNvSpPr>
+            <a:spLocks noGrp="1"/>
+          </p:cNvSpPr>
+          <p:nvPr>
+            <p:ph idx="1"/>
+          </p:nvPr>
+        </p:nvSpPr>
+        <p:spPr/>
+        <p:txBody>
+          <a:bodyPr/>
+          <a:lstStyle/>
+          <a:p>
+            <a:r>
+              <a:rPr lang="en-US" dirty="0" smtClean="0"/>
+              <a:t>Passing arguments to a callable object allows us to use dependency injection and test the callable objects.</a:t>
+            </a:r>
+            <a:endParaRPr lang="en-US" dirty="0"/>
+          </a:p>
+        </p:txBody>
+      </p:sp>
+      <p:sp>
+        <p:nvSpPr>
+          <p:cNvPr id="4" name="Slide Number Placeholder 3"/>
+          <p:cNvSpPr>
+            <a:spLocks noGrp="1"/>
+          </p:cNvSpPr>
+          <p:nvPr>
+            <p:ph type="sldNum" sz="quarter" idx="12"/>
+          </p:nvPr>
+        </p:nvSpPr>
+        <p:spPr/>
+        <p:txBody>
+          <a:bodyPr/>
+          <a:lstStyle/>
+          <a:p>
+            <a:fld id="{6DA12B36-9664-4CB0-8B2E-F4A2F44AE97E}" type="slidenum">
+              <a:rPr lang="en-US" smtClean="0"/>
+              <a:t>20</a:t>
+            </a:fld>
+            <a:endParaRPr lang="en-US"/>
+          </a:p>
+        </p:txBody>
+      </p:sp>
+    </p:spTree>
+    <p:extLst>
+      <p:ext uri="{BB962C8B-B14F-4D97-AF65-F5344CB8AC3E}">
+        <p14:creationId xmlns:p14="http://schemas.microsoft.com/office/powerpoint/2010/main" val="1332824776"/>
+      </p:ext>
+    </p:extLst>
+  </p:cSld>
+  <p:clrMapOvr>
+    <a:masterClrMapping/>
+  </p:clrMapOvr>
+  <p:timing>
+    <p:tnLst>
+      <p:par>
+        <p:cTn id="1" dur="indefinite" restart="never" nodeType="tmRoot"/>
+      </p:par>
+    </p:tnLst>
+  </p:timing>
+</p:sld>
+</file>
+
+<file path=ppt/slides/slide21.xml><?xml version="1.0" encoding="utf-8"?>
+<p:sld xmlns:a="http://schemas.openxmlformats.org/drawingml/2006/main" xmlns:r="http://schemas.openxmlformats.org/officeDocument/2006/relationships" xmlns:p="http://schemas.openxmlformats.org/presentationml/2006/main">
+  <p:cSld>
+    <p:spTree>
+      <p:nvGrpSpPr>
+        <p:cNvPr id="1" name=""/>
+        <p:cNvGrpSpPr/>
+        <p:nvPr/>
+      </p:nvGrpSpPr>
+      <p:grpSpPr>
+        <a:xfrm>
+          <a:off x="0" y="0"/>
+          <a:ext cx="0" cy="0"/>
+          <a:chOff x="0" y="0"/>
+          <a:chExt cx="0" cy="0"/>
+        </a:xfrm>
+      </p:grpSpPr>
+      <p:sp>
+        <p:nvSpPr>
+          <p:cNvPr id="2" name="Title 1"/>
+          <p:cNvSpPr>
+            <a:spLocks noGrp="1"/>
+          </p:cNvSpPr>
+          <p:nvPr>
+            <p:ph type="title"/>
+          </p:nvPr>
+        </p:nvSpPr>
+        <p:spPr/>
+        <p:txBody>
+          <a:bodyPr/>
+          <a:lstStyle/>
+          <a:p>
+            <a:r>
+              <a:rPr lang="en-US" dirty="0" smtClean="0"/>
+              <a:t>How to stop a thread</a:t>
+            </a:r>
+            <a:endParaRPr lang="en-US" dirty="0"/>
+          </a:p>
+        </p:txBody>
+      </p:sp>
+      <p:sp>
+        <p:nvSpPr>
+          <p:cNvPr id="3" name="Content Placeholder 2"/>
+          <p:cNvSpPr>
+            <a:spLocks noGrp="1"/>
+          </p:cNvSpPr>
+          <p:nvPr>
+            <p:ph idx="1"/>
+          </p:nvPr>
+        </p:nvSpPr>
+        <p:spPr/>
+        <p:txBody>
+          <a:bodyPr>
+            <a:normAutofit lnSpcReduction="10000"/>
+          </a:bodyPr>
+          <a:lstStyle/>
+          <a:p>
+            <a:r>
+              <a:rPr lang="en-US" dirty="0" smtClean="0"/>
+              <a:t>A thread will exit when its callable object returns</a:t>
+            </a:r>
+          </a:p>
+          <a:p>
+            <a:pPr marL="800100" lvl="1" indent="-342900"/>
+            <a:r>
+              <a:rPr lang="en-US" dirty="0" smtClean="0"/>
+              <a:t>The thread which started a thread must not exit before the thread exits</a:t>
+            </a:r>
+          </a:p>
+          <a:p>
+            <a:pPr marL="342900" indent="-342900"/>
+            <a:r>
+              <a:rPr lang="en-US" dirty="0">
+                <a:solidFill>
+                  <a:srgbClr val="7F0055"/>
+                </a:solidFill>
+                <a:latin typeface="Courier New" panose="02070309020205020404" pitchFamily="49" charset="0"/>
+                <a:cs typeface="Courier New" panose="02070309020205020404" pitchFamily="49" charset="0"/>
+              </a:rPr>
+              <a:t>void</a:t>
+            </a:r>
+            <a:r>
+              <a:rPr lang="en-US" dirty="0">
+                <a:latin typeface="Courier New" panose="02070309020205020404" pitchFamily="49" charset="0"/>
+                <a:cs typeface="Courier New" panose="02070309020205020404" pitchFamily="49" charset="0"/>
+              </a:rPr>
+              <a:t> </a:t>
+            </a:r>
+            <a:r>
+              <a:rPr lang="en-US" dirty="0" err="1">
+                <a:latin typeface="Courier New" panose="02070309020205020404" pitchFamily="49" charset="0"/>
+                <a:cs typeface="Courier New" panose="02070309020205020404" pitchFamily="49" charset="0"/>
+              </a:rPr>
+              <a:t>long_running</a:t>
+            </a:r>
+            <a:r>
+              <a:rPr lang="en-US" dirty="0" smtClean="0">
+                <a:latin typeface="Courier New" panose="02070309020205020404" pitchFamily="49" charset="0"/>
+                <a:cs typeface="Courier New" panose="02070309020205020404" pitchFamily="49" charset="0"/>
+              </a:rPr>
+              <a:t>();</a:t>
+            </a:r>
+          </a:p>
+          <a:p>
+            <a:pPr marL="342900" indent="-342900"/>
+            <a:r>
+              <a:rPr lang="en-US" dirty="0" smtClean="0">
+                <a:solidFill>
+                  <a:srgbClr val="7F0055"/>
+                </a:solidFill>
+                <a:latin typeface="Courier New" panose="02070309020205020404" pitchFamily="49" charset="0"/>
+                <a:cs typeface="Courier New" panose="02070309020205020404" pitchFamily="49" charset="0"/>
+              </a:rPr>
+              <a:t>void</a:t>
+            </a:r>
+            <a:r>
+              <a:rPr lang="en-US" dirty="0" smtClean="0">
+                <a:latin typeface="Courier New" panose="02070309020205020404" pitchFamily="49" charset="0"/>
+                <a:cs typeface="Courier New" panose="02070309020205020404" pitchFamily="49" charset="0"/>
+              </a:rPr>
+              <a:t> </a:t>
+            </a:r>
+            <a:r>
+              <a:rPr lang="en-US" dirty="0" err="1">
+                <a:latin typeface="Courier New" panose="02070309020205020404" pitchFamily="49" charset="0"/>
+                <a:cs typeface="Courier New" panose="02070309020205020404" pitchFamily="49" charset="0"/>
+              </a:rPr>
+              <a:t>run_it</a:t>
+            </a:r>
+            <a:r>
+              <a:rPr lang="en-US" dirty="0">
+                <a:latin typeface="Courier New" panose="02070309020205020404" pitchFamily="49" charset="0"/>
+                <a:cs typeface="Courier New" panose="02070309020205020404" pitchFamily="49" charset="0"/>
+              </a:rPr>
+              <a:t>() </a:t>
+            </a:r>
+            <a:r>
+              <a:rPr lang="en-US" dirty="0" smtClean="0">
+                <a:latin typeface="Courier New" panose="02070309020205020404" pitchFamily="49" charset="0"/>
+                <a:cs typeface="Courier New" panose="02070309020205020404" pitchFamily="49" charset="0"/>
+              </a:rPr>
+              <a:t>{</a:t>
+            </a:r>
+          </a:p>
+          <a:p>
+            <a:pPr marL="342900" indent="-342900"/>
+            <a:r>
+              <a:rPr lang="en-US" dirty="0">
+                <a:latin typeface="Courier New" panose="02070309020205020404" pitchFamily="49" charset="0"/>
+                <a:cs typeface="Courier New" panose="02070309020205020404" pitchFamily="49" charset="0"/>
+              </a:rPr>
+              <a:t> </a:t>
+            </a:r>
+            <a:r>
+              <a:rPr lang="en-US" dirty="0" smtClean="0">
+                <a:latin typeface="Courier New" panose="02070309020205020404" pitchFamily="49" charset="0"/>
+                <a:cs typeface="Courier New" panose="02070309020205020404" pitchFamily="49" charset="0"/>
+              </a:rPr>
+              <a:t> </a:t>
+            </a:r>
+            <a:r>
+              <a:rPr lang="en-US" dirty="0" err="1" smtClean="0">
+                <a:latin typeface="Courier New" panose="02070309020205020404" pitchFamily="49" charset="0"/>
+                <a:cs typeface="Courier New" panose="02070309020205020404" pitchFamily="49" charset="0"/>
+              </a:rPr>
+              <a:t>std</a:t>
+            </a:r>
+            <a:r>
+              <a:rPr lang="en-US" dirty="0">
+                <a:latin typeface="Courier New" panose="02070309020205020404" pitchFamily="49" charset="0"/>
+                <a:cs typeface="Courier New" panose="02070309020205020404" pitchFamily="49" charset="0"/>
+              </a:rPr>
+              <a:t>::thread t(</a:t>
+            </a:r>
+            <a:r>
+              <a:rPr lang="en-US" dirty="0" err="1">
+                <a:latin typeface="Courier New" panose="02070309020205020404" pitchFamily="49" charset="0"/>
+                <a:cs typeface="Courier New" panose="02070309020205020404" pitchFamily="49" charset="0"/>
+              </a:rPr>
+              <a:t>long_running</a:t>
+            </a:r>
+            <a:r>
+              <a:rPr lang="en-US" dirty="0" smtClean="0">
+                <a:latin typeface="Courier New" panose="02070309020205020404" pitchFamily="49" charset="0"/>
+                <a:cs typeface="Courier New" panose="02070309020205020404" pitchFamily="49" charset="0"/>
+              </a:rPr>
+              <a:t>);</a:t>
+            </a:r>
+          </a:p>
+          <a:p>
+            <a:pPr marL="342900" indent="-342900"/>
+            <a:r>
+              <a:rPr lang="en-US" dirty="0" smtClean="0">
+                <a:latin typeface="Courier New" panose="02070309020205020404" pitchFamily="49" charset="0"/>
+                <a:cs typeface="Courier New" panose="02070309020205020404" pitchFamily="49" charset="0"/>
+              </a:rPr>
+              <a:t>} </a:t>
+            </a:r>
+            <a:r>
+              <a:rPr lang="en-US" dirty="0">
+                <a:solidFill>
+                  <a:srgbClr val="3F7F59"/>
+                </a:solidFill>
+                <a:latin typeface="Courier New" panose="02070309020205020404" pitchFamily="49" charset="0"/>
+                <a:cs typeface="Courier New" panose="02070309020205020404" pitchFamily="49" charset="0"/>
+              </a:rPr>
+              <a:t>// Oops</a:t>
+            </a:r>
+            <a:r>
+              <a:rPr lang="en-US" dirty="0" smtClean="0">
+                <a:solidFill>
+                  <a:srgbClr val="3F7F59"/>
+                </a:solidFill>
+                <a:latin typeface="Courier New" panose="02070309020205020404" pitchFamily="49" charset="0"/>
+                <a:cs typeface="Courier New" panose="02070309020205020404" pitchFamily="49" charset="0"/>
+              </a:rPr>
+              <a:t>!</a:t>
+            </a:r>
+          </a:p>
+          <a:p>
+            <a:pPr marL="342900" indent="-342900"/>
+            <a:r>
+              <a:rPr lang="en-US" dirty="0">
+                <a:solidFill>
+                  <a:srgbClr val="7F0055"/>
+                </a:solidFill>
+                <a:latin typeface="Courier New" panose="02070309020205020404" pitchFamily="49" charset="0"/>
+                <a:cs typeface="Courier New" panose="02070309020205020404" pitchFamily="49" charset="0"/>
+              </a:rPr>
+              <a:t>void</a:t>
+            </a:r>
+            <a:r>
+              <a:rPr lang="en-US" dirty="0">
+                <a:latin typeface="Courier New" panose="02070309020205020404" pitchFamily="49" charset="0"/>
+                <a:cs typeface="Courier New" panose="02070309020205020404" pitchFamily="49" charset="0"/>
+              </a:rPr>
+              <a:t> </a:t>
+            </a:r>
+            <a:r>
+              <a:rPr lang="en-US" dirty="0" err="1">
+                <a:latin typeface="Courier New" panose="02070309020205020404" pitchFamily="49" charset="0"/>
+                <a:cs typeface="Courier New" panose="02070309020205020404" pitchFamily="49" charset="0"/>
+              </a:rPr>
+              <a:t>run_it</a:t>
+            </a:r>
+            <a:r>
+              <a:rPr lang="en-US" dirty="0">
+                <a:latin typeface="Courier New" panose="02070309020205020404" pitchFamily="49" charset="0"/>
+                <a:cs typeface="Courier New" panose="02070309020205020404" pitchFamily="49" charset="0"/>
+              </a:rPr>
+              <a:t>() {</a:t>
+            </a:r>
+          </a:p>
+          <a:p>
+            <a:pPr marL="342900" indent="-342900"/>
+            <a:r>
+              <a:rPr lang="en-US" dirty="0">
+                <a:latin typeface="Courier New" panose="02070309020205020404" pitchFamily="49" charset="0"/>
+                <a:cs typeface="Courier New" panose="02070309020205020404" pitchFamily="49" charset="0"/>
+              </a:rPr>
+              <a:t>  </a:t>
+            </a:r>
+            <a:r>
+              <a:rPr lang="en-US" dirty="0" err="1">
+                <a:latin typeface="Courier New" panose="02070309020205020404" pitchFamily="49" charset="0"/>
+                <a:cs typeface="Courier New" panose="02070309020205020404" pitchFamily="49" charset="0"/>
+              </a:rPr>
+              <a:t>std</a:t>
+            </a:r>
+            <a:r>
+              <a:rPr lang="en-US" dirty="0">
+                <a:latin typeface="Courier New" panose="02070309020205020404" pitchFamily="49" charset="0"/>
+                <a:cs typeface="Courier New" panose="02070309020205020404" pitchFamily="49" charset="0"/>
+              </a:rPr>
+              <a:t>::thread t(</a:t>
+            </a:r>
+            <a:r>
+              <a:rPr lang="en-US" dirty="0" err="1">
+                <a:latin typeface="Courier New" panose="02070309020205020404" pitchFamily="49" charset="0"/>
+                <a:cs typeface="Courier New" panose="02070309020205020404" pitchFamily="49" charset="0"/>
+              </a:rPr>
+              <a:t>long_running</a:t>
+            </a:r>
+            <a:r>
+              <a:rPr lang="en-US" dirty="0">
+                <a:latin typeface="Courier New" panose="02070309020205020404" pitchFamily="49" charset="0"/>
+                <a:cs typeface="Courier New" panose="02070309020205020404" pitchFamily="49" charset="0"/>
+              </a:rPr>
+              <a:t>);</a:t>
+            </a:r>
+          </a:p>
+          <a:p>
+            <a:pPr marL="342900" indent="-342900"/>
+            <a:r>
+              <a:rPr lang="en-US" dirty="0">
+                <a:latin typeface="Courier New" panose="02070309020205020404" pitchFamily="49" charset="0"/>
+                <a:cs typeface="Courier New" panose="02070309020205020404" pitchFamily="49" charset="0"/>
+              </a:rPr>
+              <a:t>  </a:t>
+            </a:r>
+            <a:r>
+              <a:rPr lang="en-US" dirty="0" err="1">
+                <a:solidFill>
+                  <a:schemeClr val="tx2"/>
+                </a:solidFill>
+                <a:latin typeface="Courier New" panose="02070309020205020404" pitchFamily="49" charset="0"/>
+                <a:cs typeface="Courier New" panose="02070309020205020404" pitchFamily="49" charset="0"/>
+              </a:rPr>
+              <a:t>t.join</a:t>
+            </a:r>
+            <a:r>
+              <a:rPr lang="en-US" dirty="0">
+                <a:solidFill>
+                  <a:schemeClr val="tx2"/>
+                </a:solidFill>
+                <a:latin typeface="Courier New" panose="02070309020205020404" pitchFamily="49" charset="0"/>
+                <a:cs typeface="Courier New" panose="02070309020205020404" pitchFamily="49" charset="0"/>
+              </a:rPr>
+              <a:t>();</a:t>
+            </a:r>
+          </a:p>
+          <a:p>
+            <a:pPr marL="342900" indent="-342900"/>
+            <a:r>
+              <a:rPr lang="en-US" dirty="0">
+                <a:latin typeface="Courier New" panose="02070309020205020404" pitchFamily="49" charset="0"/>
+                <a:cs typeface="Courier New" panose="02070309020205020404" pitchFamily="49" charset="0"/>
+              </a:rPr>
+              <a:t>} </a:t>
+            </a:r>
+            <a:r>
+              <a:rPr lang="en-US" dirty="0">
+                <a:solidFill>
+                  <a:srgbClr val="3F7F59"/>
+                </a:solidFill>
+                <a:latin typeface="Courier New" panose="02070309020205020404" pitchFamily="49" charset="0"/>
+                <a:cs typeface="Courier New" panose="02070309020205020404" pitchFamily="49" charset="0"/>
+              </a:rPr>
+              <a:t>// Oops!</a:t>
+            </a:r>
+            <a:endParaRPr lang="en-US" dirty="0">
+              <a:latin typeface="Courier New" panose="02070309020205020404" pitchFamily="49" charset="0"/>
+              <a:cs typeface="Courier New" panose="02070309020205020404" pitchFamily="49" charset="0"/>
+            </a:endParaRPr>
+          </a:p>
+          <a:p>
+            <a:pPr marL="342900" indent="-342900"/>
+            <a:endParaRPr lang="en-US" dirty="0">
+              <a:latin typeface="Courier New" panose="02070309020205020404" pitchFamily="49" charset="0"/>
+              <a:cs typeface="Courier New" panose="02070309020205020404" pitchFamily="49" charset="0"/>
+            </a:endParaRPr>
+          </a:p>
+        </p:txBody>
+      </p:sp>
+      <p:sp>
+        <p:nvSpPr>
+          <p:cNvPr id="4" name="Slide Number Placeholder 3"/>
+          <p:cNvSpPr>
+            <a:spLocks noGrp="1"/>
+          </p:cNvSpPr>
+          <p:nvPr>
+            <p:ph type="sldNum" sz="quarter" idx="12"/>
+          </p:nvPr>
+        </p:nvSpPr>
+        <p:spPr/>
+        <p:txBody>
+          <a:bodyPr/>
+          <a:lstStyle/>
+          <a:p>
+            <a:fld id="{6DA12B36-9664-4CB0-8B2E-F4A2F44AE97E}" type="slidenum">
+              <a:rPr lang="en-US" smtClean="0"/>
+              <a:t>21</a:t>
+            </a:fld>
+            <a:endParaRPr lang="en-US"/>
+          </a:p>
+        </p:txBody>
+      </p:sp>
+      <p:sp>
+        <p:nvSpPr>
+          <p:cNvPr id="5" name="Rectangle 4"/>
+          <p:cNvSpPr/>
+          <p:nvPr/>
+        </p:nvSpPr>
+        <p:spPr>
+          <a:xfrm>
+            <a:off x="5257800" y="2743200"/>
+            <a:ext cx="2819400" cy="1524000"/>
+          </a:xfrm>
+          <a:prstGeom prst="rect">
+            <a:avLst/>
+          </a:prstGeom>
+        </p:spPr>
+        <p:style>
+          <a:lnRef idx="2">
+            <a:schemeClr val="accent1">
+              <a:shade val="50000"/>
+            </a:schemeClr>
+          </a:lnRef>
+          <a:fillRef idx="1">
+            <a:schemeClr val="accent1"/>
+          </a:fillRef>
+          <a:effectRef idx="0">
+            <a:schemeClr val="accent1"/>
+          </a:effectRef>
+          <a:fontRef idx="minor">
+            <a:schemeClr val="lt1"/>
+          </a:fontRef>
+        </p:style>
+        <p:txBody>
+          <a:bodyPr rtlCol="0" anchor="ctr"/>
+          <a:lstStyle/>
+          <a:p>
+            <a:pPr algn="ctr"/>
+            <a:r>
+              <a:rPr lang="en-US" dirty="0" smtClean="0"/>
+              <a:t>The C++ runtime will call </a:t>
+            </a:r>
+            <a:r>
+              <a:rPr lang="en-US" dirty="0" err="1" smtClean="0"/>
+              <a:t>std</a:t>
+            </a:r>
+            <a:r>
+              <a:rPr lang="en-US" dirty="0" smtClean="0"/>
+              <a:t>::terminate() when the caller exits first!</a:t>
+            </a:r>
+            <a:endParaRPr lang="en-US" dirty="0"/>
+          </a:p>
+        </p:txBody>
+      </p:sp>
+      <p:sp>
+        <p:nvSpPr>
+          <p:cNvPr id="6" name="Footer Placeholder 5"/>
+          <p:cNvSpPr>
+            <a:spLocks noGrp="1"/>
+          </p:cNvSpPr>
+          <p:nvPr>
+            <p:ph type="ftr" sz="quarter" idx="11"/>
+          </p:nvPr>
+        </p:nvSpPr>
+        <p:spPr/>
+        <p:txBody>
+          <a:bodyPr/>
+          <a:lstStyle/>
+          <a:p>
+            <a:r>
+              <a:rPr lang="en-US" smtClean="0"/>
+              <a:t>Source: Williams, Chapter 2</a:t>
+            </a:r>
+            <a:endParaRPr lang="en-US"/>
+          </a:p>
+        </p:txBody>
+      </p:sp>
+    </p:spTree>
+    <p:extLst>
+      <p:ext uri="{BB962C8B-B14F-4D97-AF65-F5344CB8AC3E}">
+        <p14:creationId xmlns:p14="http://schemas.microsoft.com/office/powerpoint/2010/main" val="2681353184"/>
+      </p:ext>
+    </p:extLst>
+  </p:cSld>
+  <p:clrMapOvr>
+    <a:masterClrMapping/>
+  </p:clrMapOvr>
+  <p:timing>
+    <p:tnLst>
+      <p:par>
+        <p:cTn id="1" dur="indefinite" restart="never" nodeType="tmRoot">
+          <p:childTnLst>
+            <p:seq concurrent="1" nextAc="seek">
+              <p:cTn id="2" dur="indefinite" nodeType="mainSeq">
+                <p:childTnLst>
+                  <p:par>
+                    <p:cTn id="3" fill="hold">
+                      <p:stCondLst>
+                        <p:cond delay="indefinite"/>
+                      </p:stCondLst>
+                      <p:childTnLst>
+                        <p:par>
+                          <p:cTn id="4" fill="hold">
+                            <p:stCondLst>
+                              <p:cond delay="0"/>
+                            </p:stCondLst>
+                            <p:childTnLst>
+                              <p:par>
+                                <p:cTn id="5" presetID="1" presetClass="entr" presetSubtype="0" fill="hold" nodeType="clickEffect">
+                                  <p:stCondLst>
+                                    <p:cond delay="0"/>
+                                  </p:stCondLst>
+                                  <p:childTnLst>
+                                    <p:set>
+                                      <p:cBhvr>
+                                        <p:cTn id="6" dur="1" fill="hold">
+                                          <p:stCondLst>
+                                            <p:cond delay="0"/>
+                                          </p:stCondLst>
+                                        </p:cTn>
+                                        <p:tgtEl>
+                                          <p:spTgt spid="3">
+                                            <p:txEl>
+                                              <p:pRg st="6" end="6"/>
+                                            </p:txEl>
+                                          </p:spTgt>
+                                        </p:tgtEl>
+                                        <p:attrNameLst>
+                                          <p:attrName>style.visibility</p:attrName>
+                                        </p:attrNameLst>
+                                      </p:cBhvr>
+                                      <p:to>
+                                        <p:strVal val="visible"/>
+                                      </p:to>
+                                    </p:set>
+                                  </p:childTnLst>
+                                </p:cTn>
+                              </p:par>
+                              <p:par>
+                                <p:cTn id="7" presetID="1" presetClass="entr" presetSubtype="0" fill="hold" nodeType="withEffect">
+                                  <p:stCondLst>
+                                    <p:cond delay="0"/>
+                                  </p:stCondLst>
+                                  <p:childTnLst>
+                                    <p:set>
+                                      <p:cBhvr>
+                                        <p:cTn id="8" dur="1" fill="hold">
+                                          <p:stCondLst>
+                                            <p:cond delay="0"/>
+                                          </p:stCondLst>
+                                        </p:cTn>
+                                        <p:tgtEl>
+                                          <p:spTgt spid="3">
+                                            <p:txEl>
+                                              <p:pRg st="7" end="7"/>
+                                            </p:txEl>
+                                          </p:spTgt>
+                                        </p:tgtEl>
+                                        <p:attrNameLst>
+                                          <p:attrName>style.visibility</p:attrName>
+                                        </p:attrNameLst>
+                                      </p:cBhvr>
+                                      <p:to>
+                                        <p:strVal val="visible"/>
+                                      </p:to>
+                                    </p:set>
+                                  </p:childTnLst>
+                                </p:cTn>
+                              </p:par>
+                              <p:par>
+                                <p:cTn id="9" presetID="1" presetClass="entr" presetSubtype="0" fill="hold" nodeType="withEffect">
+                                  <p:stCondLst>
+                                    <p:cond delay="0"/>
+                                  </p:stCondLst>
+                                  <p:childTnLst>
+                                    <p:set>
+                                      <p:cBhvr>
+                                        <p:cTn id="10" dur="1" fill="hold">
+                                          <p:stCondLst>
+                                            <p:cond delay="0"/>
+                                          </p:stCondLst>
+                                        </p:cTn>
+                                        <p:tgtEl>
+                                          <p:spTgt spid="3">
+                                            <p:txEl>
+                                              <p:pRg st="8" end="8"/>
+                                            </p:txEl>
+                                          </p:spTgt>
+                                        </p:tgtEl>
+                                        <p:attrNameLst>
+                                          <p:attrName>style.visibility</p:attrName>
+                                        </p:attrNameLst>
+                                      </p:cBhvr>
+                                      <p:to>
+                                        <p:strVal val="visible"/>
+                                      </p:to>
+                                    </p:set>
+                                  </p:childTnLst>
+                                </p:cTn>
+                              </p:par>
+                              <p:par>
+                                <p:cTn id="11" presetID="1" presetClass="entr" presetSubtype="0" fill="hold" nodeType="withEffect">
+                                  <p:stCondLst>
+                                    <p:cond delay="0"/>
+                                  </p:stCondLst>
+                                  <p:childTnLst>
+                                    <p:set>
+                                      <p:cBhvr>
+                                        <p:cTn id="12" dur="1" fill="hold">
+                                          <p:stCondLst>
+                                            <p:cond delay="0"/>
+                                          </p:stCondLst>
+                                        </p:cTn>
+                                        <p:tgtEl>
+                                          <p:spTgt spid="3">
+                                            <p:txEl>
+                                              <p:pRg st="9" end="9"/>
+                                            </p:txEl>
+                                          </p:spTgt>
+                                        </p:tgtEl>
+                                        <p:attrNameLst>
+                                          <p:attrName>style.visibility</p:attrName>
+                                        </p:attrNameLst>
+                                      </p:cBhvr>
+                                      <p:to>
+                                        <p:strVal val="visible"/>
+                                      </p:to>
+                                    </p:set>
+                                  </p:childTnLst>
+                                </p:cTn>
+                              </p:par>
+                            </p:childTnLst>
+                          </p:cTn>
+                        </p:par>
+                      </p:childTnLst>
+                    </p:cTn>
+                  </p:par>
+                </p:childTnLst>
+              </p:cTn>
+              <p:prevCondLst>
+                <p:cond evt="onPrev" delay="0">
+                  <p:tgtEl>
+                    <p:sldTgt/>
+                  </p:tgtEl>
+                </p:cond>
+              </p:prevCondLst>
+              <p:nextCondLst>
+                <p:cond evt="onNext" delay="0">
+                  <p:tgtEl>
+                    <p:sldTgt/>
+                  </p:tgtEl>
+                </p:cond>
+              </p:nextCondLst>
+            </p:seq>
+          </p:childTnLst>
+        </p:cTn>
+      </p:par>
+    </p:tnLst>
+  </p:timing>
+</p:sld>
+</file>
+
+<file path=ppt/slides/slide22.xml><?xml version="1.0" encoding="utf-8"?>
+<p:sld xmlns:a="http://schemas.openxmlformats.org/drawingml/2006/main" xmlns:r="http://schemas.openxmlformats.org/officeDocument/2006/relationships" xmlns:p="http://schemas.openxmlformats.org/presentationml/2006/main">
+  <p:cSld>
+    <p:spTree>
+      <p:nvGrpSpPr>
+        <p:cNvPr id="1" name=""/>
+        <p:cNvGrpSpPr/>
+        <p:nvPr/>
+      </p:nvGrpSpPr>
+      <p:grpSpPr>
+        <a:xfrm>
+          <a:off x="0" y="0"/>
+          <a:ext cx="0" cy="0"/>
+          <a:chOff x="0" y="0"/>
+          <a:chExt cx="0" cy="0"/>
+        </a:xfrm>
+      </p:grpSpPr>
+      <p:sp>
+        <p:nvSpPr>
+          <p:cNvPr id="2" name="Title 1"/>
+          <p:cNvSpPr>
+            <a:spLocks noGrp="1"/>
+          </p:cNvSpPr>
+          <p:nvPr>
+            <p:ph type="title"/>
+          </p:nvPr>
+        </p:nvSpPr>
+        <p:spPr/>
+        <p:txBody>
+          <a:bodyPr/>
+          <a:lstStyle/>
+          <a:p>
+            <a:r>
+              <a:rPr lang="en-US" dirty="0" smtClean="0"/>
+              <a:t>Wait or don’t wait</a:t>
+            </a:r>
+            <a:endParaRPr lang="en-US" dirty="0"/>
+          </a:p>
+        </p:txBody>
+      </p:sp>
+      <p:sp>
+        <p:nvSpPr>
+          <p:cNvPr id="3" name="Content Placeholder 2"/>
+          <p:cNvSpPr>
+            <a:spLocks noGrp="1"/>
+          </p:cNvSpPr>
+          <p:nvPr>
+            <p:ph idx="1"/>
+          </p:nvPr>
+        </p:nvSpPr>
+        <p:spPr/>
+        <p:txBody>
+          <a:bodyPr/>
+          <a:lstStyle/>
+          <a:p>
+            <a:r>
+              <a:rPr lang="en-US" dirty="0" smtClean="0"/>
+              <a:t>We have two ways to deal with a long-running thread</a:t>
+            </a:r>
+          </a:p>
+          <a:p>
+            <a:pPr marL="800100" lvl="1" indent="-342900"/>
+            <a:r>
+              <a:rPr lang="en-US" dirty="0" smtClean="0"/>
+              <a:t>Call </a:t>
+            </a:r>
+            <a:r>
+              <a:rPr lang="en-US" dirty="0" smtClean="0">
+                <a:latin typeface="Courier New" panose="02070309020205020404" pitchFamily="49" charset="0"/>
+                <a:cs typeface="Courier New" panose="02070309020205020404" pitchFamily="49" charset="0"/>
+              </a:rPr>
+              <a:t>join()</a:t>
+            </a:r>
+            <a:r>
+              <a:rPr lang="en-US" dirty="0"/>
+              <a:t> </a:t>
+            </a:r>
+            <a:r>
+              <a:rPr lang="en-US" dirty="0" smtClean="0"/>
+              <a:t>on the thread to wait for it to complete.</a:t>
+            </a:r>
+          </a:p>
+          <a:p>
+            <a:pPr marL="1485900" lvl="2" indent="-342900"/>
+            <a:r>
+              <a:rPr lang="en-US" dirty="0" smtClean="0"/>
+              <a:t>Blocks the caller until the thread exits</a:t>
+            </a:r>
+          </a:p>
+          <a:p>
+            <a:pPr marL="1485900" lvl="2" indent="-342900"/>
+            <a:r>
+              <a:rPr lang="en-US" dirty="0" smtClean="0"/>
+              <a:t>Can be called only once on a </a:t>
+            </a:r>
+            <a:r>
+              <a:rPr lang="en-US" dirty="0" err="1" smtClean="0">
+                <a:latin typeface="Courier New" panose="02070309020205020404" pitchFamily="49" charset="0"/>
+                <a:cs typeface="Courier New" panose="02070309020205020404" pitchFamily="49" charset="0"/>
+              </a:rPr>
+              <a:t>std</a:t>
+            </a:r>
+            <a:r>
+              <a:rPr lang="en-US" dirty="0" smtClean="0">
+                <a:latin typeface="Courier New" panose="02070309020205020404" pitchFamily="49" charset="0"/>
+                <a:cs typeface="Courier New" panose="02070309020205020404" pitchFamily="49" charset="0"/>
+              </a:rPr>
+              <a:t>::thread</a:t>
+            </a:r>
+            <a:r>
+              <a:rPr lang="en-US" dirty="0" smtClean="0"/>
+              <a:t> object</a:t>
+            </a:r>
+          </a:p>
+          <a:p>
+            <a:pPr marL="1485900" lvl="2" indent="-342900"/>
+            <a:r>
+              <a:rPr lang="en-US" dirty="0" smtClean="0"/>
+              <a:t>Call </a:t>
+            </a:r>
+            <a:r>
+              <a:rPr lang="en-US" dirty="0" smtClean="0">
+                <a:latin typeface="Courier New" panose="02070309020205020404" pitchFamily="49" charset="0"/>
+                <a:cs typeface="Courier New" panose="02070309020205020404" pitchFamily="49" charset="0"/>
+              </a:rPr>
+              <a:t>joinable()</a:t>
+            </a:r>
+            <a:r>
+              <a:rPr lang="en-US" dirty="0" smtClean="0"/>
+              <a:t> to know if a thread can be joined</a:t>
+            </a:r>
+          </a:p>
+          <a:p>
+            <a:pPr marL="800100" lvl="1" indent="-342900"/>
+            <a:r>
+              <a:rPr lang="en-US" dirty="0" smtClean="0"/>
+              <a:t>Call </a:t>
+            </a:r>
+            <a:r>
+              <a:rPr lang="en-US" dirty="0" smtClean="0">
+                <a:latin typeface="Courier New" panose="02070309020205020404" pitchFamily="49" charset="0"/>
+                <a:cs typeface="Courier New" panose="02070309020205020404" pitchFamily="49" charset="0"/>
+              </a:rPr>
+              <a:t>detach()</a:t>
+            </a:r>
+            <a:r>
+              <a:rPr lang="en-US" dirty="0" smtClean="0"/>
+              <a:t> on the thread to </a:t>
+            </a:r>
+            <a:r>
+              <a:rPr lang="en-US" dirty="0" smtClean="0">
+                <a:solidFill>
+                  <a:schemeClr val="tx2"/>
+                </a:solidFill>
+              </a:rPr>
+              <a:t>not</a:t>
+            </a:r>
+            <a:r>
+              <a:rPr lang="en-US" dirty="0" smtClean="0"/>
+              <a:t> wait for it to complete</a:t>
+            </a:r>
+          </a:p>
+          <a:p>
+            <a:pPr marL="1485900" lvl="2" indent="-342900"/>
+            <a:r>
+              <a:rPr lang="en-US" dirty="0" smtClean="0"/>
+              <a:t>Transfers ownership to the C++ runtime library</a:t>
+            </a:r>
+          </a:p>
+          <a:p>
+            <a:pPr marL="1485900" lvl="2" indent="-342900"/>
+            <a:r>
+              <a:rPr lang="en-US" dirty="0" smtClean="0"/>
+              <a:t>Detached threads are not joinable</a:t>
+            </a:r>
+          </a:p>
+          <a:p>
+            <a:pPr marL="1485900" lvl="2" indent="-342900"/>
+            <a:r>
+              <a:rPr lang="en-US" dirty="0" smtClean="0"/>
+              <a:t>Usually, you want to detach immediately creation</a:t>
+            </a:r>
+            <a:endParaRPr lang="en-US" dirty="0"/>
+          </a:p>
+        </p:txBody>
+      </p:sp>
+      <p:sp>
+        <p:nvSpPr>
+          <p:cNvPr id="4" name="Slide Number Placeholder 3"/>
+          <p:cNvSpPr>
+            <a:spLocks noGrp="1"/>
+          </p:cNvSpPr>
+          <p:nvPr>
+            <p:ph type="sldNum" sz="quarter" idx="12"/>
+          </p:nvPr>
+        </p:nvSpPr>
+        <p:spPr/>
+        <p:txBody>
+          <a:bodyPr/>
+          <a:lstStyle/>
+          <a:p>
+            <a:fld id="{6DA12B36-9664-4CB0-8B2E-F4A2F44AE97E}" type="slidenum">
+              <a:rPr lang="en-US" smtClean="0"/>
+              <a:t>22</a:t>
+            </a:fld>
+            <a:endParaRPr lang="en-US"/>
+          </a:p>
+        </p:txBody>
+      </p:sp>
+      <p:sp>
+        <p:nvSpPr>
+          <p:cNvPr id="5" name="Footer Placeholder 4"/>
+          <p:cNvSpPr>
+            <a:spLocks noGrp="1"/>
+          </p:cNvSpPr>
+          <p:nvPr>
+            <p:ph type="ftr" sz="quarter" idx="11"/>
+          </p:nvPr>
+        </p:nvSpPr>
+        <p:spPr/>
+        <p:txBody>
+          <a:bodyPr/>
+          <a:lstStyle/>
+          <a:p>
+            <a:r>
+              <a:rPr lang="en-US" smtClean="0"/>
+              <a:t>Source: Williams, Chapter 2</a:t>
+            </a:r>
+            <a:endParaRPr lang="en-US"/>
+          </a:p>
+        </p:txBody>
+      </p:sp>
+    </p:spTree>
+    <p:extLst>
+      <p:ext uri="{BB962C8B-B14F-4D97-AF65-F5344CB8AC3E}">
+        <p14:creationId xmlns:p14="http://schemas.microsoft.com/office/powerpoint/2010/main" val="1301575756"/>
+      </p:ext>
+    </p:extLst>
+  </p:cSld>
+  <p:clrMapOvr>
+    <a:masterClrMapping/>
+  </p:clrMapOvr>
+  <p:timing>
+    <p:tnLst>
+      <p:par>
+        <p:cTn id="1" dur="indefinite" restart="never" nodeType="tmRoot"/>
+      </p:par>
+    </p:tnLst>
+  </p:timing>
+</p:sld>
+</file>
+
+<file path=ppt/slides/slide23.xml><?xml version="1.0" encoding="utf-8"?>
+<p:sld xmlns:a="http://schemas.openxmlformats.org/drawingml/2006/main" xmlns:r="http://schemas.openxmlformats.org/officeDocument/2006/relationships" xmlns:p="http://schemas.openxmlformats.org/presentationml/2006/main">
+  <p:cSld>
+    <p:spTree>
+      <p:nvGrpSpPr>
+        <p:cNvPr id="1" name=""/>
+        <p:cNvGrpSpPr/>
+        <p:nvPr/>
+      </p:nvGrpSpPr>
+      <p:grpSpPr>
+        <a:xfrm>
+          <a:off x="0" y="0"/>
+          <a:ext cx="0" cy="0"/>
+          <a:chOff x="0" y="0"/>
+          <a:chExt cx="0" cy="0"/>
+        </a:xfrm>
+      </p:grpSpPr>
+      <p:sp>
+        <p:nvSpPr>
+          <p:cNvPr id="2" name="Title 1"/>
+          <p:cNvSpPr>
+            <a:spLocks noGrp="1"/>
+          </p:cNvSpPr>
+          <p:nvPr>
+            <p:ph type="title"/>
+          </p:nvPr>
+        </p:nvSpPr>
+        <p:spPr/>
+        <p:txBody>
+          <a:bodyPr/>
+          <a:lstStyle/>
+          <a:p>
+            <a:r>
+              <a:rPr lang="en-US" dirty="0" smtClean="0"/>
+              <a:t>Detaching has an impact on lifetime</a:t>
+            </a:r>
+            <a:endParaRPr lang="en-US" dirty="0"/>
+          </a:p>
+        </p:txBody>
+      </p:sp>
+      <p:sp>
+        <p:nvSpPr>
+          <p:cNvPr id="3" name="Content Placeholder 2"/>
+          <p:cNvSpPr>
+            <a:spLocks noGrp="1"/>
+          </p:cNvSpPr>
+          <p:nvPr>
+            <p:ph idx="1"/>
+          </p:nvPr>
+        </p:nvSpPr>
+        <p:spPr/>
+        <p:txBody>
+          <a:bodyPr/>
+          <a:lstStyle/>
+          <a:p>
+            <a:r>
+              <a:rPr lang="en-US" dirty="0">
+                <a:solidFill>
+                  <a:srgbClr val="7F0055"/>
+                </a:solidFill>
+                <a:latin typeface="Courier New" panose="02070309020205020404" pitchFamily="49" charset="0"/>
+                <a:cs typeface="Courier New" panose="02070309020205020404" pitchFamily="49" charset="0"/>
+              </a:rPr>
+              <a:t>void</a:t>
+            </a:r>
+            <a:r>
+              <a:rPr lang="en-US" dirty="0">
+                <a:latin typeface="Courier New" panose="02070309020205020404" pitchFamily="49" charset="0"/>
+                <a:cs typeface="Courier New" panose="02070309020205020404" pitchFamily="49" charset="0"/>
+              </a:rPr>
+              <a:t> f(</a:t>
+            </a:r>
+            <a:r>
+              <a:rPr lang="en-US" dirty="0" err="1">
+                <a:solidFill>
+                  <a:srgbClr val="7F0055"/>
+                </a:solidFill>
+                <a:latin typeface="Courier New" panose="02070309020205020404" pitchFamily="49" charset="0"/>
+                <a:cs typeface="Courier New" panose="02070309020205020404" pitchFamily="49" charset="0"/>
+              </a:rPr>
+              <a:t>int</a:t>
+            </a:r>
+            <a:r>
+              <a:rPr lang="en-US" dirty="0">
+                <a:latin typeface="Courier New" panose="02070309020205020404" pitchFamily="49" charset="0"/>
+                <a:cs typeface="Courier New" panose="02070309020205020404" pitchFamily="49" charset="0"/>
+              </a:rPr>
+              <a:t> </a:t>
+            </a:r>
+            <a:r>
+              <a:rPr lang="en-US" dirty="0" err="1">
+                <a:latin typeface="Courier New" panose="02070309020205020404" pitchFamily="49" charset="0"/>
+                <a:cs typeface="Courier New" panose="02070309020205020404" pitchFamily="49" charset="0"/>
+              </a:rPr>
+              <a:t>i</a:t>
+            </a:r>
+            <a:r>
+              <a:rPr lang="en-US" dirty="0">
+                <a:latin typeface="Courier New" panose="02070309020205020404" pitchFamily="49" charset="0"/>
+                <a:cs typeface="Courier New" panose="02070309020205020404" pitchFamily="49" charset="0"/>
+              </a:rPr>
+              <a:t>, </a:t>
+            </a:r>
+            <a:r>
+              <a:rPr lang="en-US" dirty="0" err="1">
+                <a:solidFill>
+                  <a:srgbClr val="7F0055"/>
+                </a:solidFill>
+                <a:latin typeface="Courier New" panose="02070309020205020404" pitchFamily="49" charset="0"/>
+                <a:cs typeface="Courier New" panose="02070309020205020404" pitchFamily="49" charset="0"/>
+              </a:rPr>
+              <a:t>const</a:t>
+            </a:r>
+            <a:r>
+              <a:rPr lang="en-US" dirty="0">
+                <a:latin typeface="Courier New" panose="02070309020205020404" pitchFamily="49" charset="0"/>
+                <a:cs typeface="Courier New" panose="02070309020205020404" pitchFamily="49" charset="0"/>
+              </a:rPr>
+              <a:t> </a:t>
+            </a:r>
+            <a:r>
+              <a:rPr lang="en-US" dirty="0">
+                <a:solidFill>
+                  <a:srgbClr val="7F0055"/>
+                </a:solidFill>
+                <a:latin typeface="Courier New" panose="02070309020205020404" pitchFamily="49" charset="0"/>
+                <a:cs typeface="Courier New" panose="02070309020205020404" pitchFamily="49" charset="0"/>
+              </a:rPr>
+              <a:t>char</a:t>
+            </a:r>
+            <a:r>
+              <a:rPr lang="en-US" dirty="0">
+                <a:latin typeface="Courier New" panose="02070309020205020404" pitchFamily="49" charset="0"/>
+                <a:cs typeface="Courier New" panose="02070309020205020404" pitchFamily="49" charset="0"/>
+              </a:rPr>
+              <a:t>* s</a:t>
+            </a:r>
+            <a:r>
+              <a:rPr lang="en-US" dirty="0" smtClean="0">
+                <a:latin typeface="Courier New" panose="02070309020205020404" pitchFamily="49" charset="0"/>
+                <a:cs typeface="Courier New" panose="02070309020205020404" pitchFamily="49" charset="0"/>
+              </a:rPr>
+              <a:t>);</a:t>
+            </a:r>
+          </a:p>
+          <a:p>
+            <a:endParaRPr lang="en-US" dirty="0">
+              <a:latin typeface="Courier New" panose="02070309020205020404" pitchFamily="49" charset="0"/>
+              <a:cs typeface="Courier New" panose="02070309020205020404" pitchFamily="49" charset="0"/>
+            </a:endParaRPr>
+          </a:p>
+          <a:p>
+            <a:r>
+              <a:rPr lang="en-US" dirty="0">
+                <a:solidFill>
+                  <a:srgbClr val="7F0055"/>
+                </a:solidFill>
+                <a:latin typeface="Courier New" panose="02070309020205020404" pitchFamily="49" charset="0"/>
+                <a:cs typeface="Courier New" panose="02070309020205020404" pitchFamily="49" charset="0"/>
+              </a:rPr>
+              <a:t>void</a:t>
+            </a:r>
+            <a:r>
+              <a:rPr lang="en-US" dirty="0">
+                <a:latin typeface="Courier New" panose="02070309020205020404" pitchFamily="49" charset="0"/>
+                <a:cs typeface="Courier New" panose="02070309020205020404" pitchFamily="49" charset="0"/>
+              </a:rPr>
+              <a:t> </a:t>
+            </a:r>
+            <a:r>
+              <a:rPr lang="en-US" dirty="0" err="1" smtClean="0">
+                <a:latin typeface="Courier New" panose="02070309020205020404" pitchFamily="49" charset="0"/>
+                <a:cs typeface="Courier New" panose="02070309020205020404" pitchFamily="49" charset="0"/>
+              </a:rPr>
+              <a:t>just_fine</a:t>
+            </a:r>
+            <a:r>
+              <a:rPr lang="en-US" dirty="0" smtClean="0">
+                <a:latin typeface="Courier New" panose="02070309020205020404" pitchFamily="49" charset="0"/>
+                <a:cs typeface="Courier New" panose="02070309020205020404" pitchFamily="49" charset="0"/>
+              </a:rPr>
+              <a:t>(</a:t>
+            </a:r>
+            <a:r>
+              <a:rPr lang="en-US" dirty="0" err="1" smtClean="0">
+                <a:solidFill>
+                  <a:srgbClr val="7F0055"/>
+                </a:solidFill>
+                <a:latin typeface="Courier New" panose="02070309020205020404" pitchFamily="49" charset="0"/>
+                <a:cs typeface="Courier New" panose="02070309020205020404" pitchFamily="49" charset="0"/>
+              </a:rPr>
+              <a:t>int</a:t>
+            </a:r>
+            <a:r>
+              <a:rPr lang="en-US" dirty="0" smtClean="0">
+                <a:latin typeface="Courier New" panose="02070309020205020404" pitchFamily="49" charset="0"/>
+                <a:cs typeface="Courier New" panose="02070309020205020404" pitchFamily="49" charset="0"/>
+              </a:rPr>
+              <a:t> </a:t>
+            </a:r>
+            <a:r>
+              <a:rPr lang="en-US" dirty="0">
+                <a:latin typeface="Courier New" panose="02070309020205020404" pitchFamily="49" charset="0"/>
+                <a:cs typeface="Courier New" panose="02070309020205020404" pitchFamily="49" charset="0"/>
+              </a:rPr>
+              <a:t>j) {</a:t>
+            </a:r>
+          </a:p>
+          <a:p>
+            <a:r>
+              <a:rPr lang="en-US" dirty="0">
+                <a:solidFill>
+                  <a:srgbClr val="7F0055"/>
+                </a:solidFill>
+                <a:latin typeface="Courier New" panose="02070309020205020404" pitchFamily="49" charset="0"/>
+                <a:cs typeface="Courier New" panose="02070309020205020404" pitchFamily="49" charset="0"/>
+              </a:rPr>
+              <a:t>  char</a:t>
+            </a:r>
+            <a:r>
+              <a:rPr lang="en-US" dirty="0">
+                <a:latin typeface="Courier New" panose="02070309020205020404" pitchFamily="49" charset="0"/>
+                <a:cs typeface="Courier New" panose="02070309020205020404" pitchFamily="49" charset="0"/>
+              </a:rPr>
+              <a:t> buffer[1024];</a:t>
+            </a:r>
+          </a:p>
+          <a:p>
+            <a:r>
+              <a:rPr lang="en-US" dirty="0">
+                <a:solidFill>
+                  <a:srgbClr val="7F0055"/>
+                </a:solidFill>
+                <a:latin typeface="Courier New" panose="02070309020205020404" pitchFamily="49" charset="0"/>
+                <a:cs typeface="Courier New" panose="02070309020205020404" pitchFamily="49" charset="0"/>
+              </a:rPr>
+              <a:t>  </a:t>
+            </a:r>
+            <a:r>
+              <a:rPr lang="en-US" dirty="0" err="1">
+                <a:solidFill>
+                  <a:srgbClr val="7F0055"/>
+                </a:solidFill>
+                <a:latin typeface="Courier New" panose="02070309020205020404" pitchFamily="49" charset="0"/>
+                <a:cs typeface="Courier New" panose="02070309020205020404" pitchFamily="49" charset="0"/>
+              </a:rPr>
+              <a:t>sprintf</a:t>
+            </a:r>
+            <a:r>
+              <a:rPr lang="en-US" dirty="0">
+                <a:latin typeface="Courier New" panose="02070309020205020404" pitchFamily="49" charset="0"/>
+                <a:cs typeface="Courier New" panose="02070309020205020404" pitchFamily="49" charset="0"/>
+              </a:rPr>
+              <a:t>(buffer, </a:t>
+            </a:r>
+            <a:r>
+              <a:rPr lang="en-US" dirty="0">
+                <a:solidFill>
+                  <a:srgbClr val="2A00FF"/>
+                </a:solidFill>
+                <a:latin typeface="Courier New" panose="02070309020205020404" pitchFamily="49" charset="0"/>
+                <a:cs typeface="Courier New" panose="02070309020205020404" pitchFamily="49" charset="0"/>
+              </a:rPr>
+              <a:t>"%</a:t>
+            </a:r>
+            <a:r>
+              <a:rPr lang="en-US" dirty="0" err="1">
+                <a:solidFill>
+                  <a:srgbClr val="2A00FF"/>
+                </a:solidFill>
+                <a:latin typeface="Courier New" panose="02070309020205020404" pitchFamily="49" charset="0"/>
+                <a:cs typeface="Courier New" panose="02070309020205020404" pitchFamily="49" charset="0"/>
+              </a:rPr>
+              <a:t>i</a:t>
+            </a:r>
+            <a:r>
+              <a:rPr lang="en-US" dirty="0">
+                <a:solidFill>
+                  <a:srgbClr val="2A00FF"/>
+                </a:solidFill>
+                <a:latin typeface="Courier New" panose="02070309020205020404" pitchFamily="49" charset="0"/>
+                <a:cs typeface="Courier New" panose="02070309020205020404" pitchFamily="49" charset="0"/>
+              </a:rPr>
+              <a:t>"</a:t>
+            </a:r>
+            <a:r>
+              <a:rPr lang="en-US" dirty="0">
+                <a:latin typeface="Courier New" panose="02070309020205020404" pitchFamily="49" charset="0"/>
+                <a:cs typeface="Courier New" panose="02070309020205020404" pitchFamily="49" charset="0"/>
+              </a:rPr>
+              <a:t>, j);</a:t>
+            </a:r>
+          </a:p>
+          <a:p>
+            <a:r>
+              <a:rPr lang="en-US" dirty="0">
+                <a:latin typeface="Courier New" panose="02070309020205020404" pitchFamily="49" charset="0"/>
+                <a:cs typeface="Courier New" panose="02070309020205020404" pitchFamily="49" charset="0"/>
+              </a:rPr>
+              <a:t>  </a:t>
+            </a:r>
+            <a:r>
+              <a:rPr lang="en-US" dirty="0" err="1">
+                <a:latin typeface="Courier New" panose="02070309020205020404" pitchFamily="49" charset="0"/>
+                <a:cs typeface="Courier New" panose="02070309020205020404" pitchFamily="49" charset="0"/>
+              </a:rPr>
+              <a:t>std</a:t>
+            </a:r>
+            <a:r>
+              <a:rPr lang="en-US" dirty="0">
+                <a:latin typeface="Courier New" panose="02070309020205020404" pitchFamily="49" charset="0"/>
+                <a:cs typeface="Courier New" panose="02070309020205020404" pitchFamily="49" charset="0"/>
+              </a:rPr>
+              <a:t>::thread t(f, 3, buffer);</a:t>
+            </a:r>
+          </a:p>
+          <a:p>
+            <a:r>
+              <a:rPr lang="en-US" dirty="0">
+                <a:solidFill>
+                  <a:schemeClr val="tx2"/>
+                </a:solidFill>
+                <a:latin typeface="Courier New" panose="02070309020205020404" pitchFamily="49" charset="0"/>
+                <a:cs typeface="Courier New" panose="02070309020205020404" pitchFamily="49" charset="0"/>
+              </a:rPr>
+              <a:t>  </a:t>
+            </a:r>
+            <a:r>
+              <a:rPr lang="en-US" dirty="0" err="1" smtClean="0">
+                <a:solidFill>
+                  <a:schemeClr val="tx2"/>
+                </a:solidFill>
+                <a:latin typeface="Courier New" panose="02070309020205020404" pitchFamily="49" charset="0"/>
+                <a:cs typeface="Courier New" panose="02070309020205020404" pitchFamily="49" charset="0"/>
+              </a:rPr>
+              <a:t>t.join</a:t>
+            </a:r>
+            <a:r>
+              <a:rPr lang="en-US" dirty="0" smtClean="0">
+                <a:solidFill>
+                  <a:schemeClr val="tx2"/>
+                </a:solidFill>
+                <a:latin typeface="Courier New" panose="02070309020205020404" pitchFamily="49" charset="0"/>
+                <a:cs typeface="Courier New" panose="02070309020205020404" pitchFamily="49" charset="0"/>
+              </a:rPr>
+              <a:t>();</a:t>
+            </a:r>
+            <a:endParaRPr lang="en-US" dirty="0">
+              <a:solidFill>
+                <a:schemeClr val="tx2"/>
+              </a:solidFill>
+              <a:latin typeface="Courier New" panose="02070309020205020404" pitchFamily="49" charset="0"/>
+              <a:cs typeface="Courier New" panose="02070309020205020404" pitchFamily="49" charset="0"/>
+            </a:endParaRPr>
+          </a:p>
+          <a:p>
+            <a:r>
+              <a:rPr lang="en-US" dirty="0">
+                <a:latin typeface="Courier New" panose="02070309020205020404" pitchFamily="49" charset="0"/>
+                <a:cs typeface="Courier New" panose="02070309020205020404" pitchFamily="49" charset="0"/>
+              </a:rPr>
+              <a:t>}</a:t>
+            </a:r>
+          </a:p>
+          <a:p>
+            <a:endParaRPr lang="en-US" dirty="0">
+              <a:latin typeface="Courier New" panose="02070309020205020404" pitchFamily="49" charset="0"/>
+              <a:cs typeface="Courier New" panose="02070309020205020404" pitchFamily="49" charset="0"/>
+            </a:endParaRPr>
+          </a:p>
+          <a:p>
+            <a:endParaRPr lang="en-US" dirty="0"/>
+          </a:p>
+        </p:txBody>
+      </p:sp>
+      <p:sp>
+        <p:nvSpPr>
+          <p:cNvPr id="4" name="Slide Number Placeholder 3"/>
+          <p:cNvSpPr>
+            <a:spLocks noGrp="1"/>
+          </p:cNvSpPr>
+          <p:nvPr>
+            <p:ph type="sldNum" sz="quarter" idx="12"/>
+          </p:nvPr>
+        </p:nvSpPr>
+        <p:spPr/>
+        <p:txBody>
+          <a:bodyPr/>
+          <a:lstStyle/>
+          <a:p>
+            <a:fld id="{6DA12B36-9664-4CB0-8B2E-F4A2F44AE97E}" type="slidenum">
+              <a:rPr lang="en-US" smtClean="0"/>
+              <a:t>23</a:t>
+            </a:fld>
+            <a:endParaRPr lang="en-US"/>
+          </a:p>
+        </p:txBody>
+      </p:sp>
+      <p:sp>
+        <p:nvSpPr>
+          <p:cNvPr id="5" name="Footer Placeholder 4"/>
+          <p:cNvSpPr>
+            <a:spLocks noGrp="1"/>
+          </p:cNvSpPr>
+          <p:nvPr>
+            <p:ph type="ftr" sz="quarter" idx="11"/>
+          </p:nvPr>
+        </p:nvSpPr>
+        <p:spPr/>
+        <p:txBody>
+          <a:bodyPr/>
+          <a:lstStyle/>
+          <a:p>
+            <a:r>
+              <a:rPr lang="en-US" smtClean="0"/>
+              <a:t>Source: Williams, Chapter 2</a:t>
+            </a:r>
+            <a:endParaRPr lang="en-US"/>
+          </a:p>
+        </p:txBody>
+      </p:sp>
+    </p:spTree>
+    <p:extLst>
+      <p:ext uri="{BB962C8B-B14F-4D97-AF65-F5344CB8AC3E}">
+        <p14:creationId xmlns:p14="http://schemas.microsoft.com/office/powerpoint/2010/main" val="4129911133"/>
+      </p:ext>
+    </p:extLst>
+  </p:cSld>
+  <p:clrMapOvr>
+    <a:masterClrMapping/>
+  </p:clrMapOvr>
+  <p:timing>
+    <p:tnLst>
+      <p:par>
+        <p:cTn id="1" dur="indefinite" restart="never" nodeType="tmRoot"/>
+      </p:par>
+    </p:tnLst>
+  </p:timing>
+</p:sld>
+</file>
+
+<file path=ppt/slides/slide24.xml><?xml version="1.0" encoding="utf-8"?>
+<p:sld xmlns:a="http://schemas.openxmlformats.org/drawingml/2006/main" xmlns:r="http://schemas.openxmlformats.org/officeDocument/2006/relationships" xmlns:p="http://schemas.openxmlformats.org/presentationml/2006/main">
+  <p:cSld>
+    <p:spTree>
+      <p:nvGrpSpPr>
+        <p:cNvPr id="1" name=""/>
+        <p:cNvGrpSpPr/>
+        <p:nvPr/>
+      </p:nvGrpSpPr>
+      <p:grpSpPr>
+        <a:xfrm>
+          <a:off x="0" y="0"/>
+          <a:ext cx="0" cy="0"/>
+          <a:chOff x="0" y="0"/>
+          <a:chExt cx="0" cy="0"/>
+        </a:xfrm>
+      </p:grpSpPr>
+      <p:sp>
+        <p:nvSpPr>
+          <p:cNvPr id="2" name="Title 1"/>
+          <p:cNvSpPr>
+            <a:spLocks noGrp="1"/>
+          </p:cNvSpPr>
+          <p:nvPr>
+            <p:ph type="title"/>
+          </p:nvPr>
+        </p:nvSpPr>
+        <p:spPr/>
+        <p:txBody>
+          <a:bodyPr/>
+          <a:lstStyle/>
+          <a:p>
+            <a:r>
+              <a:rPr lang="en-US" dirty="0" smtClean="0"/>
+              <a:t>What if the calling code throws?</a:t>
+            </a:r>
+            <a:endParaRPr lang="en-US" dirty="0"/>
+          </a:p>
+        </p:txBody>
+      </p:sp>
+      <p:sp>
+        <p:nvSpPr>
+          <p:cNvPr id="3" name="Content Placeholder 2"/>
+          <p:cNvSpPr>
+            <a:spLocks noGrp="1"/>
+          </p:cNvSpPr>
+          <p:nvPr>
+            <p:ph idx="1"/>
+          </p:nvPr>
+        </p:nvSpPr>
+        <p:spPr/>
+        <p:txBody>
+          <a:bodyPr>
+            <a:normAutofit fontScale="92500" lnSpcReduction="10000"/>
+          </a:bodyPr>
+          <a:lstStyle/>
+          <a:p>
+            <a:r>
+              <a:rPr lang="en-US" dirty="0" smtClean="0"/>
+              <a:t>Resource Acquisition Is Initialization (RAII)</a:t>
+            </a:r>
+          </a:p>
+          <a:p>
+            <a:pPr marL="800100" lvl="1" indent="-342900"/>
+            <a:r>
+              <a:rPr lang="en-US" dirty="0" smtClean="0"/>
+              <a:t>Technique in C++ to deal with resource management</a:t>
+            </a:r>
+          </a:p>
+          <a:p>
+            <a:pPr marL="800100" lvl="1" indent="-342900"/>
+            <a:r>
+              <a:rPr lang="en-US" dirty="0" smtClean="0"/>
+              <a:t>Use the constructor to create a resource</a:t>
+            </a:r>
+          </a:p>
+          <a:p>
+            <a:pPr marL="800100" lvl="1" indent="-342900"/>
+            <a:r>
+              <a:rPr lang="en-US" dirty="0" smtClean="0"/>
+              <a:t>Use the destructor to release the resource</a:t>
+            </a:r>
+          </a:p>
+          <a:p>
+            <a:pPr marL="800100" lvl="1" indent="-342900"/>
+            <a:r>
+              <a:rPr lang="en-US" b="1" dirty="0" smtClean="0"/>
+              <a:t>Key:</a:t>
+            </a:r>
+            <a:r>
+              <a:rPr lang="en-US" dirty="0" smtClean="0"/>
+              <a:t> destructors are called for variables on the stack during exception processing</a:t>
+            </a:r>
+          </a:p>
+          <a:p>
+            <a:pPr marL="342900" indent="-342900"/>
+            <a:endParaRPr lang="en-US" dirty="0" smtClean="0">
+              <a:solidFill>
+                <a:srgbClr val="7F0055"/>
+              </a:solidFill>
+              <a:latin typeface="Courier New" panose="02070309020205020404" pitchFamily="49" charset="0"/>
+              <a:cs typeface="Courier New" panose="02070309020205020404" pitchFamily="49" charset="0"/>
+            </a:endParaRPr>
+          </a:p>
+          <a:p>
+            <a:pPr marL="342900" indent="-342900"/>
+            <a:r>
+              <a:rPr lang="en-US" dirty="0" smtClean="0">
+                <a:solidFill>
+                  <a:srgbClr val="7F0055"/>
+                </a:solidFill>
+                <a:latin typeface="Courier New" panose="02070309020205020404" pitchFamily="49" charset="0"/>
+                <a:cs typeface="Courier New" panose="02070309020205020404" pitchFamily="49" charset="0"/>
+              </a:rPr>
+              <a:t>class</a:t>
+            </a:r>
+            <a:r>
+              <a:rPr lang="en-US" dirty="0" smtClean="0">
+                <a:latin typeface="Courier New" panose="02070309020205020404" pitchFamily="49" charset="0"/>
+                <a:cs typeface="Courier New" panose="02070309020205020404" pitchFamily="49" charset="0"/>
+              </a:rPr>
+              <a:t> </a:t>
+            </a:r>
+            <a:r>
+              <a:rPr lang="en-US" dirty="0">
+                <a:latin typeface="Courier New" panose="02070309020205020404" pitchFamily="49" charset="0"/>
+                <a:cs typeface="Courier New" panose="02070309020205020404" pitchFamily="49" charset="0"/>
+              </a:rPr>
+              <a:t>foo { </a:t>
+            </a:r>
+            <a:r>
+              <a:rPr lang="en-US" dirty="0">
+                <a:solidFill>
+                  <a:srgbClr val="7F0055"/>
+                </a:solidFill>
+                <a:latin typeface="Courier New" panose="02070309020205020404" pitchFamily="49" charset="0"/>
+                <a:cs typeface="Courier New" panose="02070309020205020404" pitchFamily="49" charset="0"/>
+              </a:rPr>
+              <a:t>public</a:t>
+            </a:r>
+            <a:r>
+              <a:rPr lang="en-US" dirty="0">
+                <a:latin typeface="Courier New" panose="02070309020205020404" pitchFamily="49" charset="0"/>
+                <a:cs typeface="Courier New" panose="02070309020205020404" pitchFamily="49" charset="0"/>
+              </a:rPr>
+              <a:t>: foo</a:t>
+            </a:r>
+            <a:r>
+              <a:rPr lang="en-US" dirty="0" smtClean="0">
+                <a:latin typeface="Courier New" panose="02070309020205020404" pitchFamily="49" charset="0"/>
+                <a:cs typeface="Courier New" panose="02070309020205020404" pitchFamily="49" charset="0"/>
+              </a:rPr>
+              <a:t>(){} </a:t>
+            </a:r>
+            <a:r>
+              <a:rPr lang="en-US" dirty="0">
+                <a:latin typeface="Courier New" panose="02070309020205020404" pitchFamily="49" charset="0"/>
+                <a:cs typeface="Courier New" panose="02070309020205020404" pitchFamily="49" charset="0"/>
+              </a:rPr>
+              <a:t>~foo</a:t>
+            </a:r>
+            <a:r>
+              <a:rPr lang="en-US" dirty="0" smtClean="0">
+                <a:latin typeface="Courier New" panose="02070309020205020404" pitchFamily="49" charset="0"/>
+                <a:cs typeface="Courier New" panose="02070309020205020404" pitchFamily="49" charset="0"/>
+              </a:rPr>
+              <a:t>(){} };</a:t>
+            </a:r>
+          </a:p>
+          <a:p>
+            <a:pPr marL="342900" indent="-342900"/>
+            <a:r>
+              <a:rPr lang="en-US" dirty="0">
+                <a:solidFill>
+                  <a:srgbClr val="7F0055"/>
+                </a:solidFill>
+                <a:latin typeface="Courier New" panose="02070309020205020404" pitchFamily="49" charset="0"/>
+                <a:cs typeface="Courier New" panose="02070309020205020404" pitchFamily="49" charset="0"/>
+              </a:rPr>
+              <a:t>void</a:t>
+            </a:r>
+            <a:r>
+              <a:rPr lang="en-US" dirty="0">
+                <a:latin typeface="Courier New" panose="02070309020205020404" pitchFamily="49" charset="0"/>
+                <a:cs typeface="Courier New" panose="02070309020205020404" pitchFamily="49" charset="0"/>
+              </a:rPr>
+              <a:t> throws() </a:t>
+            </a:r>
+            <a:r>
+              <a:rPr lang="en-US" dirty="0" smtClean="0">
+                <a:latin typeface="Courier New" panose="02070309020205020404" pitchFamily="49" charset="0"/>
+                <a:cs typeface="Courier New" panose="02070309020205020404" pitchFamily="49" charset="0"/>
+              </a:rPr>
+              <a:t>{</a:t>
+            </a:r>
+          </a:p>
+          <a:p>
+            <a:pPr marL="342900" indent="-342900"/>
+            <a:r>
+              <a:rPr lang="en-US" dirty="0">
+                <a:latin typeface="Courier New" panose="02070309020205020404" pitchFamily="49" charset="0"/>
+                <a:cs typeface="Courier New" panose="02070309020205020404" pitchFamily="49" charset="0"/>
+              </a:rPr>
+              <a:t> </a:t>
+            </a:r>
+            <a:r>
+              <a:rPr lang="en-US" dirty="0" smtClean="0">
+                <a:latin typeface="Courier New" panose="02070309020205020404" pitchFamily="49" charset="0"/>
+                <a:cs typeface="Courier New" panose="02070309020205020404" pitchFamily="49" charset="0"/>
+              </a:rPr>
+              <a:t> foo f;</a:t>
+            </a:r>
+          </a:p>
+          <a:p>
+            <a:pPr marL="342900" indent="-342900"/>
+            <a:r>
+              <a:rPr lang="en-US" dirty="0">
+                <a:solidFill>
+                  <a:srgbClr val="7F0055"/>
+                </a:solidFill>
+                <a:latin typeface="Courier New" panose="02070309020205020404" pitchFamily="49" charset="0"/>
+                <a:cs typeface="Courier New" panose="02070309020205020404" pitchFamily="49" charset="0"/>
+              </a:rPr>
+              <a:t> </a:t>
+            </a:r>
+            <a:r>
+              <a:rPr lang="en-US" dirty="0" smtClean="0">
+                <a:solidFill>
+                  <a:srgbClr val="7F0055"/>
+                </a:solidFill>
+                <a:latin typeface="Courier New" panose="02070309020205020404" pitchFamily="49" charset="0"/>
+                <a:cs typeface="Courier New" panose="02070309020205020404" pitchFamily="49" charset="0"/>
+              </a:rPr>
+              <a:t> throw</a:t>
+            </a:r>
+            <a:r>
+              <a:rPr lang="en-US" dirty="0" smtClean="0">
+                <a:latin typeface="Courier New" panose="02070309020205020404" pitchFamily="49" charset="0"/>
+                <a:cs typeface="Courier New" panose="02070309020205020404" pitchFamily="49" charset="0"/>
+              </a:rPr>
+              <a:t> </a:t>
+            </a:r>
+            <a:r>
+              <a:rPr lang="en-US" dirty="0" err="1">
+                <a:latin typeface="Courier New" panose="02070309020205020404" pitchFamily="49" charset="0"/>
+                <a:cs typeface="Courier New" panose="02070309020205020404" pitchFamily="49" charset="0"/>
+              </a:rPr>
+              <a:t>std</a:t>
+            </a:r>
+            <a:r>
+              <a:rPr lang="en-US" dirty="0">
+                <a:latin typeface="Courier New" panose="02070309020205020404" pitchFamily="49" charset="0"/>
+                <a:cs typeface="Courier New" panose="02070309020205020404" pitchFamily="49" charset="0"/>
+              </a:rPr>
+              <a:t>::</a:t>
+            </a:r>
+            <a:r>
+              <a:rPr lang="en-US" dirty="0">
+                <a:solidFill>
+                  <a:srgbClr val="7F0055"/>
+                </a:solidFill>
+                <a:latin typeface="Courier New" panose="02070309020205020404" pitchFamily="49" charset="0"/>
+                <a:cs typeface="Courier New" panose="02070309020205020404" pitchFamily="49" charset="0"/>
+              </a:rPr>
+              <a:t>exception</a:t>
+            </a:r>
+            <a:r>
+              <a:rPr lang="en-US" dirty="0">
+                <a:latin typeface="Courier New" panose="02070309020205020404" pitchFamily="49" charset="0"/>
+                <a:cs typeface="Courier New" panose="02070309020205020404" pitchFamily="49" charset="0"/>
+              </a:rPr>
+              <a:t>(</a:t>
+            </a:r>
+            <a:r>
+              <a:rPr lang="en-US" dirty="0">
+                <a:solidFill>
+                  <a:srgbClr val="2A00FF"/>
+                </a:solidFill>
+                <a:latin typeface="Courier New" panose="02070309020205020404" pitchFamily="49" charset="0"/>
+                <a:cs typeface="Courier New" panose="02070309020205020404" pitchFamily="49" charset="0"/>
+              </a:rPr>
+              <a:t>"Boom</a:t>
+            </a:r>
+            <a:r>
+              <a:rPr lang="en-US" dirty="0" smtClean="0">
+                <a:solidFill>
+                  <a:srgbClr val="2A00FF"/>
+                </a:solidFill>
+                <a:latin typeface="Courier New" panose="02070309020205020404" pitchFamily="49" charset="0"/>
+                <a:cs typeface="Courier New" panose="02070309020205020404" pitchFamily="49" charset="0"/>
+              </a:rPr>
+              <a:t>!"</a:t>
+            </a:r>
+            <a:r>
+              <a:rPr lang="en-US" dirty="0" smtClean="0">
+                <a:latin typeface="Courier New" panose="02070309020205020404" pitchFamily="49" charset="0"/>
+                <a:cs typeface="Courier New" panose="02070309020205020404" pitchFamily="49" charset="0"/>
+              </a:rPr>
+              <a:t>);</a:t>
+            </a:r>
+          </a:p>
+          <a:p>
+            <a:pPr marL="342900" indent="-342900"/>
+            <a:r>
+              <a:rPr lang="en-US" dirty="0" smtClean="0">
+                <a:latin typeface="Courier New" panose="02070309020205020404" pitchFamily="49" charset="0"/>
+                <a:cs typeface="Courier New" panose="02070309020205020404" pitchFamily="49" charset="0"/>
+              </a:rPr>
+              <a:t>} </a:t>
+            </a:r>
+            <a:r>
+              <a:rPr lang="en-US" dirty="0">
+                <a:solidFill>
+                  <a:srgbClr val="3F7F59"/>
+                </a:solidFill>
+                <a:latin typeface="Courier New" panose="02070309020205020404" pitchFamily="49" charset="0"/>
+                <a:cs typeface="Courier New" panose="02070309020205020404" pitchFamily="49" charset="0"/>
+              </a:rPr>
+              <a:t>// ~foo() will be called</a:t>
+            </a:r>
+            <a:endParaRPr lang="en-US" dirty="0">
+              <a:latin typeface="Courier New" panose="02070309020205020404" pitchFamily="49" charset="0"/>
+              <a:cs typeface="Courier New" panose="02070309020205020404" pitchFamily="49" charset="0"/>
+            </a:endParaRPr>
+          </a:p>
+        </p:txBody>
+      </p:sp>
+      <p:sp>
+        <p:nvSpPr>
+          <p:cNvPr id="4" name="Slide Number Placeholder 3"/>
+          <p:cNvSpPr>
+            <a:spLocks noGrp="1"/>
+          </p:cNvSpPr>
+          <p:nvPr>
+            <p:ph type="sldNum" sz="quarter" idx="12"/>
+          </p:nvPr>
+        </p:nvSpPr>
+        <p:spPr/>
+        <p:txBody>
+          <a:bodyPr/>
+          <a:lstStyle/>
+          <a:p>
+            <a:fld id="{6DA12B36-9664-4CB0-8B2E-F4A2F44AE97E}" type="slidenum">
+              <a:rPr lang="en-US" smtClean="0"/>
+              <a:t>24</a:t>
+            </a:fld>
+            <a:endParaRPr lang="en-US"/>
+          </a:p>
+        </p:txBody>
+      </p:sp>
+    </p:spTree>
+    <p:extLst>
+      <p:ext uri="{BB962C8B-B14F-4D97-AF65-F5344CB8AC3E}">
+        <p14:creationId xmlns:p14="http://schemas.microsoft.com/office/powerpoint/2010/main" val="2361539726"/>
+      </p:ext>
+    </p:extLst>
+  </p:cSld>
+  <p:clrMapOvr>
+    <a:masterClrMapping/>
+  </p:clrMapOvr>
+  <p:timing>
+    <p:tnLst>
+      <p:par>
+        <p:cTn id="1" dur="indefinite" restart="never" nodeType="tmRoot"/>
+      </p:par>
+    </p:tnLst>
+  </p:timing>
+</p:sld>
+</file>
+
+<file path=ppt/slides/slide25.xml><?xml version="1.0" encoding="utf-8"?>
+<p:sld xmlns:a="http://schemas.openxmlformats.org/drawingml/2006/main" xmlns:r="http://schemas.openxmlformats.org/officeDocument/2006/relationships" xmlns:p="http://schemas.openxmlformats.org/presentationml/2006/main">
+  <p:cSld>
+    <p:spTree>
+      <p:nvGrpSpPr>
+        <p:cNvPr id="1" name=""/>
+        <p:cNvGrpSpPr/>
+        <p:nvPr/>
+      </p:nvGrpSpPr>
+      <p:grpSpPr>
+        <a:xfrm>
+          <a:off x="0" y="0"/>
+          <a:ext cx="0" cy="0"/>
+          <a:chOff x="0" y="0"/>
+          <a:chExt cx="0" cy="0"/>
+        </a:xfrm>
+      </p:grpSpPr>
+      <p:sp>
+        <p:nvSpPr>
+          <p:cNvPr id="2" name="Title 1"/>
+          <p:cNvSpPr>
+            <a:spLocks noGrp="1"/>
+          </p:cNvSpPr>
+          <p:nvPr>
+            <p:ph type="title"/>
+          </p:nvPr>
+        </p:nvSpPr>
+        <p:spPr/>
+        <p:txBody>
+          <a:bodyPr/>
+          <a:lstStyle/>
+          <a:p>
+            <a:r>
+              <a:rPr lang="en-US" dirty="0" smtClean="0"/>
+              <a:t>Creating a RAII thread manager</a:t>
+            </a:r>
+            <a:endParaRPr lang="en-US" dirty="0"/>
+          </a:p>
+        </p:txBody>
+      </p:sp>
+      <p:sp>
+        <p:nvSpPr>
+          <p:cNvPr id="3" name="Content Placeholder 2"/>
+          <p:cNvSpPr>
+            <a:spLocks noGrp="1"/>
+          </p:cNvSpPr>
+          <p:nvPr>
+            <p:ph idx="1"/>
+          </p:nvPr>
+        </p:nvSpPr>
+        <p:spPr/>
+        <p:txBody>
+          <a:bodyPr/>
+          <a:lstStyle/>
+          <a:p>
+            <a:r>
+              <a:rPr lang="en-US" dirty="0" smtClean="0"/>
+              <a:t>Let’s use TDD to create a class to manage a thread using RAII.</a:t>
+            </a:r>
+            <a:endParaRPr lang="en-US" dirty="0"/>
+          </a:p>
+        </p:txBody>
+      </p:sp>
+      <p:sp>
+        <p:nvSpPr>
+          <p:cNvPr id="4" name="Slide Number Placeholder 3"/>
+          <p:cNvSpPr>
+            <a:spLocks noGrp="1"/>
+          </p:cNvSpPr>
+          <p:nvPr>
+            <p:ph type="sldNum" sz="quarter" idx="12"/>
+          </p:nvPr>
+        </p:nvSpPr>
+        <p:spPr/>
+        <p:txBody>
+          <a:bodyPr/>
+          <a:lstStyle/>
+          <a:p>
+            <a:fld id="{6DA12B36-9664-4CB0-8B2E-F4A2F44AE97E}" type="slidenum">
+              <a:rPr lang="en-US" smtClean="0"/>
+              <a:t>25</a:t>
+            </a:fld>
+            <a:endParaRPr lang="en-US"/>
+          </a:p>
+        </p:txBody>
+      </p:sp>
+    </p:spTree>
+    <p:extLst>
+      <p:ext uri="{BB962C8B-B14F-4D97-AF65-F5344CB8AC3E}">
+        <p14:creationId xmlns:p14="http://schemas.microsoft.com/office/powerpoint/2010/main" val="3396377568"/>
       </p:ext>
     </p:extLst>
   </p:cSld>

</xml_diff>

<commit_message>
Make two corrections to the code
- Avoid C++'s most vexing parse
- Add a missing ! on the if check in the guard constructor
</commit_message>
<xml_diff>
--- a/Lectures/Threads/Threads.pptx
+++ b/Lectures/Threads/Threads.pptx
@@ -222,7 +222,7 @@
           <a:p>
             <a:fld id="{DBE0ECA1-3FBF-48AE-AD2A-4439AE745E19}" type="datetimeFigureOut">
               <a:rPr lang="en-US" smtClean="0"/>
-              <a:t>11/20/2013</a:t>
+              <a:t>12/31/2013</a:t>
             </a:fld>
             <a:endParaRPr lang="en-US"/>
           </a:p>
@@ -683,7 +683,7 @@
           <a:p>
             <a:fld id="{9769DED8-28D4-45B9-A00F-7CFE9335FEA6}" type="datetime1">
               <a:rPr lang="en-US" smtClean="0"/>
-              <a:t>11/20/2013</a:t>
+              <a:t>12/31/2013</a:t>
             </a:fld>
             <a:endParaRPr lang="en-US"/>
           </a:p>
@@ -948,7 +948,7 @@
           <a:p>
             <a:fld id="{2DB3D439-1F88-44B4-B5F7-F9BCD4064257}" type="datetime1">
               <a:rPr lang="en-US" smtClean="0"/>
-              <a:t>11/20/2013</a:t>
+              <a:t>12/31/2013</a:t>
             </a:fld>
             <a:endParaRPr lang="en-US"/>
           </a:p>
@@ -1123,7 +1123,7 @@
           <a:p>
             <a:fld id="{99C5638F-6F55-4055-935C-67841BE78C36}" type="datetime1">
               <a:rPr lang="en-US" smtClean="0"/>
-              <a:t>11/20/2013</a:t>
+              <a:t>12/31/2013</a:t>
             </a:fld>
             <a:endParaRPr lang="en-US"/>
           </a:p>
@@ -1288,7 +1288,7 @@
           <a:p>
             <a:fld id="{E6987D90-0C92-4B22-A29D-FED15412CED2}" type="datetime1">
               <a:rPr lang="en-US" smtClean="0"/>
-              <a:t>11/20/2013</a:t>
+              <a:t>12/31/2013</a:t>
             </a:fld>
             <a:endParaRPr lang="en-US"/>
           </a:p>
@@ -1537,7 +1537,7 @@
           <a:p>
             <a:fld id="{DDB67BC4-9554-49E0-BCB3-D1EF965BA0B8}" type="datetime1">
               <a:rPr lang="en-US" smtClean="0"/>
-              <a:t>11/20/2013</a:t>
+              <a:t>12/31/2013</a:t>
             </a:fld>
             <a:endParaRPr lang="en-US"/>
           </a:p>
@@ -1820,7 +1820,7 @@
           <a:p>
             <a:fld id="{EC24D770-803D-4E01-921C-9C100DD8230C}" type="datetime1">
               <a:rPr lang="en-US" smtClean="0"/>
-              <a:t>11/20/2013</a:t>
+              <a:t>12/31/2013</a:t>
             </a:fld>
             <a:endParaRPr lang="en-US"/>
           </a:p>
@@ -2259,7 +2259,7 @@
           <a:p>
             <a:fld id="{356AD44B-78A4-4209-8070-7DCBE2DC4992}" type="datetime1">
               <a:rPr lang="en-US" smtClean="0"/>
-              <a:t>11/20/2013</a:t>
+              <a:t>12/31/2013</a:t>
             </a:fld>
             <a:endParaRPr lang="en-US"/>
           </a:p>
@@ -2372,7 +2372,7 @@
           <a:p>
             <a:fld id="{A993C59A-7CA2-467F-B7F1-9096881A01B8}" type="datetime1">
               <a:rPr lang="en-US" smtClean="0"/>
-              <a:t>11/20/2013</a:t>
+              <a:t>12/31/2013</a:t>
             </a:fld>
             <a:endParaRPr lang="en-US"/>
           </a:p>
@@ -2462,7 +2462,7 @@
           <a:p>
             <a:fld id="{2B6B58D0-2488-434A-8ED1-692E09B85CC5}" type="datetime1">
               <a:rPr lang="en-US" smtClean="0"/>
-              <a:t>11/20/2013</a:t>
+              <a:t>12/31/2013</a:t>
             </a:fld>
             <a:endParaRPr lang="en-US"/>
           </a:p>
@@ -2704,7 +2704,7 @@
           <a:p>
             <a:fld id="{FDB0AFC2-7D64-4F61-A7B7-9932D3305DDA}" type="datetime1">
               <a:rPr lang="en-US" smtClean="0"/>
-              <a:t>11/20/2013</a:t>
+              <a:t>12/31/2013</a:t>
             </a:fld>
             <a:endParaRPr lang="en-US"/>
           </a:p>
@@ -2998,7 +2998,7 @@
           <a:p>
             <a:fld id="{4983D17A-D7B2-4ECE-8A2C-93679B9D177B}" type="datetime1">
               <a:rPr lang="en-US" smtClean="0"/>
-              <a:t>11/20/2013</a:t>
+              <a:t>12/31/2013</a:t>
             </a:fld>
             <a:endParaRPr lang="en-US"/>
           </a:p>
@@ -3292,7 +3292,7 @@
           <a:p>
             <a:fld id="{2A5275F7-419E-4C23-8A3D-2EE5742B2EC9}" type="datetime1">
               <a:rPr lang="en-US" smtClean="0"/>
-              <a:t>11/20/2013</a:t>
+              <a:t>12/31/2013</a:t>
             </a:fld>
             <a:endParaRPr lang="en-US"/>
           </a:p>
@@ -8419,23 +8419,7 @@
                   <a:schemeClr val="accent3"/>
                 </a:solidFill>
               </a:rPr>
-              <a:t> on </a:t>
-            </a:r>
-            <a:r>
-              <a:rPr lang="en-US" dirty="0" smtClean="0">
-                <a:solidFill>
-                  <a:schemeClr val="accent3"/>
-                </a:solidFill>
-              </a:rPr>
-              <a:t>background </a:t>
-            </a:r>
-            <a:r>
-              <a:rPr lang="en-US" dirty="0" smtClean="0">
-                <a:solidFill>
-                  <a:schemeClr val="accent3"/>
-                </a:solidFill>
-              </a:rPr>
-              <a:t>threads immediately after they are created.</a:t>
+              <a:t> on background threads immediately after they are created.</a:t>
             </a:r>
             <a:endParaRPr lang="en-US" dirty="0">
               <a:solidFill>
@@ -10451,27 +10435,7 @@
                 <a:latin typeface="Courier New" panose="02070309020205020404" pitchFamily="49" charset="0"/>
                 <a:cs typeface="Courier New" panose="02070309020205020404" pitchFamily="49" charset="0"/>
               </a:rPr>
-              <a:t>Don’t forget </a:t>
-            </a:r>
-            <a:r>
-              <a:rPr lang="en-US" dirty="0" smtClean="0">
-                <a:solidFill>
-                  <a:srgbClr val="3F7F59"/>
-                </a:solidFill>
-                <a:latin typeface="Courier New" panose="02070309020205020404" pitchFamily="49" charset="0"/>
-                <a:cs typeface="Courier New" panose="02070309020205020404" pitchFamily="49" charset="0"/>
-              </a:rPr>
-              <a:t>to remove </a:t>
-            </a:r>
-            <a:r>
-              <a:rPr lang="en-US" dirty="0" smtClean="0">
-                <a:solidFill>
-                  <a:srgbClr val="3F7F59"/>
-                </a:solidFill>
-                <a:latin typeface="Courier New" panose="02070309020205020404" pitchFamily="49" charset="0"/>
-                <a:cs typeface="Courier New" panose="02070309020205020404" pitchFamily="49" charset="0"/>
-              </a:rPr>
-              <a:t>this</a:t>
+              <a:t>Don’t forget to remove this</a:t>
             </a:r>
             <a:endParaRPr lang="en-US" strike="sngStrike" dirty="0" smtClean="0">
               <a:latin typeface="Courier New" panose="02070309020205020404" pitchFamily="49" charset="0"/>
@@ -11588,18 +11552,25 @@
               <a:t> </a:t>
             </a:r>
             <a:r>
-              <a:rPr lang="en-US" dirty="0">
-                <a:latin typeface="Courier New" panose="02070309020205020404" pitchFamily="49" charset="0"/>
-                <a:cs typeface="Courier New" panose="02070309020205020404" pitchFamily="49" charset="0"/>
-              </a:rPr>
-              <a:t>(</a:t>
+              <a:rPr lang="en-US" dirty="0" smtClean="0">
+                <a:latin typeface="Courier New" panose="02070309020205020404" pitchFamily="49" charset="0"/>
+                <a:cs typeface="Courier New" panose="02070309020205020404" pitchFamily="49" charset="0"/>
+              </a:rPr>
+              <a:t>(!</a:t>
+            </a:r>
+            <a:r>
+              <a:rPr lang="en-US" dirty="0" err="1" smtClean="0">
+                <a:latin typeface="Courier New" panose="02070309020205020404" pitchFamily="49" charset="0"/>
+                <a:cs typeface="Courier New" panose="02070309020205020404" pitchFamily="49" charset="0"/>
+              </a:rPr>
+              <a:t>t</a:t>
             </a:r>
             <a:r>
               <a:rPr lang="en-US" dirty="0" err="1">
                 <a:latin typeface="Courier New" panose="02070309020205020404" pitchFamily="49" charset="0"/>
                 <a:cs typeface="Courier New" panose="02070309020205020404" pitchFamily="49" charset="0"/>
               </a:rPr>
-              <a:t>t_.joinable</a:t>
+              <a:t>_.joinable</a:t>
             </a:r>
             <a:r>
               <a:rPr lang="en-US" dirty="0" smtClean="0">
@@ -11743,14 +11714,7 @@
                 <a:latin typeface="Courier New" panose="02070309020205020404" pitchFamily="49" charset="0"/>
                 <a:cs typeface="Courier New" panose="02070309020205020404" pitchFamily="49" charset="0"/>
               </a:rPr>
-              <a:t>t_.</a:t>
-            </a:r>
-            <a:r>
-              <a:rPr lang="en-US" dirty="0" err="1" smtClean="0">
-                <a:latin typeface="Courier New" panose="02070309020205020404" pitchFamily="49" charset="0"/>
-                <a:cs typeface="Courier New" panose="02070309020205020404" pitchFamily="49" charset="0"/>
-              </a:rPr>
-              <a:t>join</a:t>
+              <a:t>t_.join</a:t>
             </a:r>
             <a:r>
               <a:rPr lang="en-US" dirty="0" smtClean="0">
@@ -12780,7 +12744,27 @@
                 <a:latin typeface="Courier New" panose="02070309020205020404" pitchFamily="49" charset="0"/>
                 <a:cs typeface="Courier New" panose="02070309020205020404" pitchFamily="49" charset="0"/>
               </a:rPr>
-              <a:t>::thread(f)</a:t>
+              <a:t>::</a:t>
+            </a:r>
+            <a:r>
+              <a:rPr lang="en-US" dirty="0" smtClean="0">
+                <a:solidFill>
+                  <a:schemeClr val="tx2"/>
+                </a:solidFill>
+                <a:latin typeface="Courier New" panose="02070309020205020404" pitchFamily="49" charset="0"/>
+                <a:cs typeface="Courier New" panose="02070309020205020404" pitchFamily="49" charset="0"/>
+              </a:rPr>
+              <a:t>thread {f</a:t>
+            </a:r>
+            <a:r>
+              <a:rPr lang="en-US" dirty="0">
+                <a:solidFill>
+                  <a:schemeClr val="tx2"/>
+                </a:solidFill>
+                <a:latin typeface="Courier New" panose="02070309020205020404" pitchFamily="49" charset="0"/>
+                <a:cs typeface="Courier New" panose="02070309020205020404" pitchFamily="49" charset="0"/>
+              </a:rPr>
+              <a:t>}</a:t>
             </a:r>
             <a:r>
               <a:rPr lang="en-US" dirty="0" smtClean="0">

</xml_diff>

<commit_message>
Update the threads lecture.
</commit_message>
<xml_diff>
--- a/Lectures/Threads/Threads.pptx
+++ b/Lectures/Threads/Threads.pptx
@@ -220,7 +220,7 @@
           <a:p>
             <a:fld id="{DBE0ECA1-3FBF-48AE-AD2A-4439AE745E19}" type="datetimeFigureOut">
               <a:rPr lang="en-US" smtClean="0"/>
-              <a:t>1/14/2014</a:t>
+              <a:t>1/22/2014</a:t>
             </a:fld>
             <a:endParaRPr lang="en-US"/>
           </a:p>
@@ -681,7 +681,7 @@
           <a:p>
             <a:fld id="{9769DED8-28D4-45B9-A00F-7CFE9335FEA6}" type="datetime1">
               <a:rPr lang="en-US" smtClean="0"/>
-              <a:t>1/14/2014</a:t>
+              <a:t>1/22/2014</a:t>
             </a:fld>
             <a:endParaRPr lang="en-US"/>
           </a:p>
@@ -946,7 +946,7 @@
           <a:p>
             <a:fld id="{2DB3D439-1F88-44B4-B5F7-F9BCD4064257}" type="datetime1">
               <a:rPr lang="en-US" smtClean="0"/>
-              <a:t>1/14/2014</a:t>
+              <a:t>1/22/2014</a:t>
             </a:fld>
             <a:endParaRPr lang="en-US"/>
           </a:p>
@@ -1121,7 +1121,7 @@
           <a:p>
             <a:fld id="{99C5638F-6F55-4055-935C-67841BE78C36}" type="datetime1">
               <a:rPr lang="en-US" smtClean="0"/>
-              <a:t>1/14/2014</a:t>
+              <a:t>1/22/2014</a:t>
             </a:fld>
             <a:endParaRPr lang="en-US"/>
           </a:p>
@@ -1286,7 +1286,7 @@
           <a:p>
             <a:fld id="{E6987D90-0C92-4B22-A29D-FED15412CED2}" type="datetime1">
               <a:rPr lang="en-US" smtClean="0"/>
-              <a:t>1/14/2014</a:t>
+              <a:t>1/22/2014</a:t>
             </a:fld>
             <a:endParaRPr lang="en-US"/>
           </a:p>
@@ -1535,7 +1535,7 @@
           <a:p>
             <a:fld id="{DDB67BC4-9554-49E0-BCB3-D1EF965BA0B8}" type="datetime1">
               <a:rPr lang="en-US" smtClean="0"/>
-              <a:t>1/14/2014</a:t>
+              <a:t>1/22/2014</a:t>
             </a:fld>
             <a:endParaRPr lang="en-US"/>
           </a:p>
@@ -1818,7 +1818,7 @@
           <a:p>
             <a:fld id="{EC24D770-803D-4E01-921C-9C100DD8230C}" type="datetime1">
               <a:rPr lang="en-US" smtClean="0"/>
-              <a:t>1/14/2014</a:t>
+              <a:t>1/22/2014</a:t>
             </a:fld>
             <a:endParaRPr lang="en-US"/>
           </a:p>
@@ -2257,7 +2257,7 @@
           <a:p>
             <a:fld id="{356AD44B-78A4-4209-8070-7DCBE2DC4992}" type="datetime1">
               <a:rPr lang="en-US" smtClean="0"/>
-              <a:t>1/14/2014</a:t>
+              <a:t>1/22/2014</a:t>
             </a:fld>
             <a:endParaRPr lang="en-US"/>
           </a:p>
@@ -2370,7 +2370,7 @@
           <a:p>
             <a:fld id="{A993C59A-7CA2-467F-B7F1-9096881A01B8}" type="datetime1">
               <a:rPr lang="en-US" smtClean="0"/>
-              <a:t>1/14/2014</a:t>
+              <a:t>1/22/2014</a:t>
             </a:fld>
             <a:endParaRPr lang="en-US"/>
           </a:p>
@@ -2460,7 +2460,7 @@
           <a:p>
             <a:fld id="{2B6B58D0-2488-434A-8ED1-692E09B85CC5}" type="datetime1">
               <a:rPr lang="en-US" smtClean="0"/>
-              <a:t>1/14/2014</a:t>
+              <a:t>1/22/2014</a:t>
             </a:fld>
             <a:endParaRPr lang="en-US"/>
           </a:p>
@@ -2702,7 +2702,7 @@
           <a:p>
             <a:fld id="{FDB0AFC2-7D64-4F61-A7B7-9932D3305DDA}" type="datetime1">
               <a:rPr lang="en-US" smtClean="0"/>
-              <a:t>1/14/2014</a:t>
+              <a:t>1/22/2014</a:t>
             </a:fld>
             <a:endParaRPr lang="en-US"/>
           </a:p>
@@ -2996,7 +2996,7 @@
           <a:p>
             <a:fld id="{4983D17A-D7B2-4ECE-8A2C-93679B9D177B}" type="datetime1">
               <a:rPr lang="en-US" smtClean="0"/>
-              <a:t>1/14/2014</a:t>
+              <a:t>1/22/2014</a:t>
             </a:fld>
             <a:endParaRPr lang="en-US"/>
           </a:p>
@@ -3290,7 +3290,7 @@
           <a:p>
             <a:fld id="{2A5275F7-419E-4C23-8A3D-2EE5742B2EC9}" type="datetime1">
               <a:rPr lang="en-US" smtClean="0"/>
-              <a:t>1/14/2014</a:t>
+              <a:t>1/22/2014</a:t>
             </a:fld>
             <a:endParaRPr lang="en-US"/>
           </a:p>
@@ -7121,7 +7121,15 @@
             <a:pPr marL="800100" lvl="1" indent="-342900"/>
             <a:r>
               <a:rPr lang="en-US" dirty="0" smtClean="0"/>
-              <a:t>The thread which started a thread must not exit before the thread exits</a:t>
+              <a:t>The thread which started a thread must not exit before the </a:t>
+            </a:r>
+            <a:r>
+              <a:rPr lang="en-US" dirty="0" smtClean="0"/>
+              <a:t>started thread </a:t>
+            </a:r>
+            <a:r>
+              <a:rPr lang="en-US" dirty="0" smtClean="0"/>
+              <a:t>exits</a:t>
             </a:r>
           </a:p>
           <a:p>
@@ -7393,7 +7401,17 @@
                 <a:latin typeface="Courier New" panose="02070309020205020404" pitchFamily="49" charset="0"/>
                 <a:cs typeface="Courier New" panose="02070309020205020404" pitchFamily="49" charset="0"/>
               </a:rPr>
-              <a:t>// Oops!</a:t>
+              <a:t>// </a:t>
+            </a:r>
+            <a:r>
+              <a:rPr lang="en-US" dirty="0" smtClean="0">
+                <a:solidFill>
+                  <a:srgbClr val="3F7F59"/>
+                </a:solidFill>
+                <a:latin typeface="Courier New" panose="02070309020205020404" pitchFamily="49" charset="0"/>
+                <a:cs typeface="Courier New" panose="02070309020205020404" pitchFamily="49" charset="0"/>
+              </a:rPr>
+              <a:t>No problems now</a:t>
             </a:r>
             <a:endParaRPr lang="en-US" dirty="0">
               <a:latin typeface="Courier New" panose="02070309020205020404" pitchFamily="49" charset="0"/>
@@ -8013,8 +8031,13 @@
             <a:pPr marL="1485900" lvl="2" indent="-342900"/>
             <a:r>
               <a:rPr lang="en-US" dirty="0" smtClean="0"/>
-              <a:t>Usually, you want to detach immediately creation</a:t>
-            </a:r>
+              <a:t>Usually, you want to detach immediately </a:t>
+            </a:r>
+            <a:r>
+              <a:rPr lang="en-US" dirty="0" smtClean="0"/>
+              <a:t>after creation</a:t>
+            </a:r>
+            <a:endParaRPr lang="en-US" dirty="0" smtClean="0"/>
           </a:p>
           <a:p>
             <a:pPr marL="342900" indent="-342900"/>
@@ -9567,7 +9590,7 @@
               <a:t>()) </a:t>
             </a:r>
             <a:r>
-              <a:rPr lang="en-US" smtClean="0">
+              <a:rPr lang="en-US" dirty="0" err="1" smtClean="0">
                 <a:latin typeface="Courier New" panose="02070309020205020404" pitchFamily="49" charset="0"/>
                 <a:cs typeface="Courier New" panose="02070309020205020404" pitchFamily="49" charset="0"/>
               </a:rPr>

</xml_diff>